<commit_message>
Finalize Python course part 2 and 3
</commit_message>
<xml_diff>
--- a/python_course/2_production_code/python_cursus_2.pptx
+++ b/python_course/2_production_code/python_cursus_2.pptx
@@ -16,11 +16,11 @@
     <p:sldId id="329" r:id="rId7"/>
     <p:sldId id="327" r:id="rId8"/>
     <p:sldId id="260" r:id="rId9"/>
-    <p:sldId id="355" r:id="rId10"/>
-    <p:sldId id="328" r:id="rId11"/>
+    <p:sldId id="328" r:id="rId10"/>
+    <p:sldId id="355" r:id="rId11"/>
     <p:sldId id="367" r:id="rId12"/>
-    <p:sldId id="332" r:id="rId13"/>
-    <p:sldId id="361" r:id="rId14"/>
+    <p:sldId id="361" r:id="rId13"/>
+    <p:sldId id="332" r:id="rId14"/>
     <p:sldId id="333" r:id="rId15"/>
     <p:sldId id="335" r:id="rId16"/>
     <p:sldId id="334" r:id="rId17"/>
@@ -271,7 +271,7 @@
           <a:p>
             <a:fld id="{7D183437-14DE-4969-B062-63D9C4A2E219}" type="datetimeFigureOut">
               <a:rPr lang="nl-NL" smtClean="0"/>
-              <a:t>29-8-2024</a:t>
+              <a:t>13-9-2024</a:t>
             </a:fld>
             <a:endParaRPr lang="nl-NL"/>
           </a:p>
@@ -624,7 +624,7 @@
           <a:p>
             <a:fld id="{9583DEA5-E342-4DB2-B087-D0B9C490B19E}" type="slidenum">
               <a:rPr lang="nl-NL" smtClean="0"/>
-              <a:t>9</a:t>
+              <a:t>10</a:t>
             </a:fld>
             <a:endParaRPr lang="nl-NL"/>
           </a:p>
@@ -1260,7 +1260,7 @@
           <a:p>
             <a:fld id="{0EBB069A-003F-4FC0-8534-236B0C5C7B5F}" type="datetimeFigureOut">
               <a:rPr lang="en-NL" smtClean="0"/>
-              <a:t>29/08/2024</a:t>
+              <a:t>13/09/2024</a:t>
             </a:fld>
             <a:endParaRPr lang="en-NL"/>
           </a:p>
@@ -1460,7 +1460,7 @@
           <a:p>
             <a:fld id="{0EBB069A-003F-4FC0-8534-236B0C5C7B5F}" type="datetimeFigureOut">
               <a:rPr lang="en-NL" smtClean="0"/>
-              <a:t>29/08/2024</a:t>
+              <a:t>13/09/2024</a:t>
             </a:fld>
             <a:endParaRPr lang="en-NL"/>
           </a:p>
@@ -1670,7 +1670,7 @@
           <a:p>
             <a:fld id="{0EBB069A-003F-4FC0-8534-236B0C5C7B5F}" type="datetimeFigureOut">
               <a:rPr lang="en-NL" smtClean="0"/>
-              <a:t>29/08/2024</a:t>
+              <a:t>13/09/2024</a:t>
             </a:fld>
             <a:endParaRPr lang="en-NL"/>
           </a:p>
@@ -1870,7 +1870,7 @@
           <a:p>
             <a:fld id="{0EBB069A-003F-4FC0-8534-236B0C5C7B5F}" type="datetimeFigureOut">
               <a:rPr lang="en-NL" smtClean="0"/>
-              <a:t>29/08/2024</a:t>
+              <a:t>13/09/2024</a:t>
             </a:fld>
             <a:endParaRPr lang="en-NL"/>
           </a:p>
@@ -2146,7 +2146,7 @@
           <a:p>
             <a:fld id="{0EBB069A-003F-4FC0-8534-236B0C5C7B5F}" type="datetimeFigureOut">
               <a:rPr lang="en-NL" smtClean="0"/>
-              <a:t>29/08/2024</a:t>
+              <a:t>13/09/2024</a:t>
             </a:fld>
             <a:endParaRPr lang="en-NL"/>
           </a:p>
@@ -2414,7 +2414,7 @@
           <a:p>
             <a:fld id="{0EBB069A-003F-4FC0-8534-236B0C5C7B5F}" type="datetimeFigureOut">
               <a:rPr lang="en-NL" smtClean="0"/>
-              <a:t>29/08/2024</a:t>
+              <a:t>13/09/2024</a:t>
             </a:fld>
             <a:endParaRPr lang="en-NL"/>
           </a:p>
@@ -2829,7 +2829,7 @@
           <a:p>
             <a:fld id="{0EBB069A-003F-4FC0-8534-236B0C5C7B5F}" type="datetimeFigureOut">
               <a:rPr lang="en-NL" smtClean="0"/>
-              <a:t>29/08/2024</a:t>
+              <a:t>13/09/2024</a:t>
             </a:fld>
             <a:endParaRPr lang="en-NL"/>
           </a:p>
@@ -2971,7 +2971,7 @@
           <a:p>
             <a:fld id="{0EBB069A-003F-4FC0-8534-236B0C5C7B5F}" type="datetimeFigureOut">
               <a:rPr lang="en-NL" smtClean="0"/>
-              <a:t>29/08/2024</a:t>
+              <a:t>13/09/2024</a:t>
             </a:fld>
             <a:endParaRPr lang="en-NL"/>
           </a:p>
@@ -3084,7 +3084,7 @@
           <a:p>
             <a:fld id="{0EBB069A-003F-4FC0-8534-236B0C5C7B5F}" type="datetimeFigureOut">
               <a:rPr lang="en-NL" smtClean="0"/>
-              <a:t>29/08/2024</a:t>
+              <a:t>13/09/2024</a:t>
             </a:fld>
             <a:endParaRPr lang="en-NL"/>
           </a:p>
@@ -3397,7 +3397,7 @@
           <a:p>
             <a:fld id="{0EBB069A-003F-4FC0-8534-236B0C5C7B5F}" type="datetimeFigureOut">
               <a:rPr lang="en-NL" smtClean="0"/>
-              <a:t>29/08/2024</a:t>
+              <a:t>13/09/2024</a:t>
             </a:fld>
             <a:endParaRPr lang="en-NL"/>
           </a:p>
@@ -3686,7 +3686,7 @@
           <a:p>
             <a:fld id="{0EBB069A-003F-4FC0-8534-236B0C5C7B5F}" type="datetimeFigureOut">
               <a:rPr lang="en-NL" smtClean="0"/>
-              <a:t>29/08/2024</a:t>
+              <a:t>13/09/2024</a:t>
             </a:fld>
             <a:endParaRPr lang="en-NL"/>
           </a:p>
@@ -3929,7 +3929,7 @@
           <a:p>
             <a:fld id="{0EBB069A-003F-4FC0-8534-236B0C5C7B5F}" type="datetimeFigureOut">
               <a:rPr lang="en-NL" smtClean="0"/>
-              <a:t>29/08/2024</a:t>
+              <a:t>13/09/2024</a:t>
             </a:fld>
             <a:endParaRPr lang="en-NL"/>
           </a:p>
@@ -4462,7 +4462,7 @@
           <a:p>
             <a:r>
               <a:rPr lang="nl-NL" sz="3600" noProof="0" dirty="0"/>
-              <a:t>Leesbaar: Notebooks documenteren</a:t>
+              <a:t>Plug-ins voor VS Code</a:t>
             </a:r>
           </a:p>
         </p:txBody>
@@ -4495,142 +4495,195 @@
           </a:bodyPr>
           <a:lstStyle/>
           <a:p>
-            <a:pPr>
-              <a:buFontTx/>
-              <a:buChar char="-"/>
-            </a:pPr>
-            <a:r>
-              <a:rPr lang="nl-NL" sz="2000" noProof="0" dirty="0">
-                <a:cs typeface="Courier New" panose="02070309020205020404" pitchFamily="49" charset="0"/>
-              </a:rPr>
-              <a:t>Geef het Notebook een descriptieve naam!</a:t>
-            </a:r>
-          </a:p>
-          <a:p>
-            <a:pPr>
-              <a:buFontTx/>
-              <a:buChar char="-"/>
-            </a:pPr>
-            <a:endParaRPr lang="nl-NL" sz="2000" noProof="0" dirty="0">
+            <a:pPr marL="0" indent="0">
+              <a:buNone/>
+            </a:pPr>
+            <a:r>
+              <a:rPr lang="nl-NL" sz="1800" b="1" noProof="0" dirty="0" err="1"/>
+              <a:t>PyLance</a:t>
+            </a:r>
+            <a:endParaRPr lang="nl-NL" sz="1800" b="1" noProof="0" dirty="0"/>
+          </a:p>
+          <a:p>
+            <a:pPr marL="0" indent="0">
+              <a:buNone/>
+            </a:pPr>
+            <a:r>
+              <a:rPr lang="nl-NL" sz="1800" noProof="0" dirty="0">
+                <a:hlinkClick r:id="rId3"/>
+              </a:rPr>
+              <a:t>https://marketplace.visualstudio.com/items?itemName=ms-python.vscode-pylance</a:t>
+            </a:r>
+            <a:endParaRPr lang="nl-NL" sz="1800" dirty="0"/>
+          </a:p>
+          <a:p>
+            <a:pPr marL="0" indent="0">
+              <a:buNone/>
+            </a:pPr>
+            <a:r>
+              <a:rPr lang="nl-NL" sz="1800" noProof="0" dirty="0"/>
+              <a:t>Checkt code, geeft suggesties, vult aan met tab, toont </a:t>
+            </a:r>
+            <a:r>
+              <a:rPr lang="nl-NL" sz="1800" noProof="0" dirty="0" err="1"/>
+              <a:t>docstrings</a:t>
+            </a:r>
+            <a:r>
+              <a:rPr lang="nl-NL" sz="1800" noProof="0" dirty="0"/>
+              <a:t>.</a:t>
+            </a:r>
+          </a:p>
+          <a:p>
+            <a:pPr marL="0" indent="0">
+              <a:buNone/>
+            </a:pPr>
+            <a:endParaRPr lang="nl-NL" sz="1800" b="1" noProof="0" dirty="0"/>
+          </a:p>
+          <a:p>
+            <a:pPr marL="0" indent="0">
+              <a:buNone/>
+            </a:pPr>
+            <a:r>
+              <a:rPr lang="nl-NL" sz="1800" b="1" noProof="0" dirty="0" err="1"/>
+              <a:t>AutoDocstring</a:t>
+            </a:r>
+            <a:endParaRPr lang="nl-NL" sz="1800" dirty="0">
               <a:cs typeface="Courier New" panose="02070309020205020404" pitchFamily="49" charset="0"/>
             </a:endParaRPr>
           </a:p>
           <a:p>
-            <a:pPr>
-              <a:buFontTx/>
-              <a:buChar char="-"/>
-            </a:pPr>
-            <a:r>
-              <a:rPr lang="nl-NL" sz="2000" dirty="0">
-                <a:cs typeface="Courier New" panose="02070309020205020404" pitchFamily="49" charset="0"/>
-              </a:rPr>
-              <a:t>Omschrijf doel van het Notebook in eerste cel.</a:t>
-            </a:r>
-          </a:p>
-          <a:p>
-            <a:pPr>
-              <a:buFontTx/>
-              <a:buChar char="-"/>
-            </a:pPr>
-            <a:endParaRPr lang="nl-NL" sz="2000" noProof="0" dirty="0">
+            <a:pPr marL="0" indent="0">
+              <a:buNone/>
+            </a:pPr>
+            <a:r>
+              <a:rPr lang="nl-NL" sz="1800" noProof="0" dirty="0">
+                <a:cs typeface="Courier New" panose="02070309020205020404" pitchFamily="49" charset="0"/>
+                <a:hlinkClick r:id="rId4"/>
+              </a:rPr>
+              <a:t>https://marketplace.visualstudio.com/items?itemName=njpwerner.autodocstring</a:t>
+            </a:r>
+            <a:endParaRPr lang="nl-NL" sz="1800" noProof="0" dirty="0">
               <a:cs typeface="Courier New" panose="02070309020205020404" pitchFamily="49" charset="0"/>
             </a:endParaRPr>
           </a:p>
           <a:p>
-            <a:pPr>
-              <a:buFontTx/>
-              <a:buChar char="-"/>
-            </a:pPr>
-            <a:r>
-              <a:rPr lang="nl-NL" sz="2000" dirty="0">
-                <a:cs typeface="Courier New" panose="02070309020205020404" pitchFamily="49" charset="0"/>
-              </a:rPr>
-              <a:t>Gebruik kopjes voor secties in het Notebook.</a:t>
-            </a:r>
-          </a:p>
-          <a:p>
-            <a:pPr>
-              <a:buFontTx/>
-              <a:buChar char="-"/>
-            </a:pPr>
-            <a:endParaRPr lang="nl-NL" sz="2000" dirty="0">
+            <a:pPr marL="0" indent="0">
+              <a:buNone/>
+            </a:pPr>
+            <a:r>
+              <a:rPr lang="nl-NL" sz="1800" dirty="0">
+                <a:cs typeface="Courier New" panose="02070309020205020404" pitchFamily="49" charset="0"/>
+              </a:rPr>
+              <a:t>Genereert automatisch </a:t>
+            </a:r>
+            <a:r>
+              <a:rPr lang="nl-NL" sz="1800" dirty="0" err="1">
+                <a:cs typeface="Courier New" panose="02070309020205020404" pitchFamily="49" charset="0"/>
+              </a:rPr>
+              <a:t>docstrings</a:t>
+            </a:r>
+            <a:r>
+              <a:rPr lang="nl-NL" sz="1800" dirty="0">
+                <a:cs typeface="Courier New" panose="02070309020205020404" pitchFamily="49" charset="0"/>
+              </a:rPr>
+              <a:t> aan de hand van de functie definitie.</a:t>
+            </a:r>
+          </a:p>
+          <a:p>
+            <a:pPr marL="0" indent="0">
+              <a:buNone/>
+            </a:pPr>
+            <a:endParaRPr lang="nl-NL" sz="1800" b="1" dirty="0">
               <a:cs typeface="Courier New" panose="02070309020205020404" pitchFamily="49" charset="0"/>
             </a:endParaRPr>
           </a:p>
           <a:p>
-            <a:pPr>
-              <a:buFontTx/>
-              <a:buChar char="-"/>
-            </a:pPr>
-            <a:r>
-              <a:rPr lang="nl-NL" sz="2000" dirty="0">
-                <a:cs typeface="Courier New" panose="02070309020205020404" pitchFamily="49" charset="0"/>
-              </a:rPr>
-              <a:t>Documenteer code zoals gebruikelijk.</a:t>
-            </a:r>
-          </a:p>
-          <a:p>
-            <a:pPr>
-              <a:buFontTx/>
-              <a:buChar char="-"/>
-            </a:pPr>
-            <a:endParaRPr lang="nl-NL" sz="2000" dirty="0">
+            <a:pPr marL="0" indent="0">
+              <a:buNone/>
+            </a:pPr>
+            <a:r>
+              <a:rPr lang="nl-NL" sz="1800" b="1" noProof="0" dirty="0" err="1">
+                <a:cs typeface="Courier New" panose="02070309020205020404" pitchFamily="49" charset="0"/>
+              </a:rPr>
+              <a:t>Markdown</a:t>
+            </a:r>
+            <a:r>
+              <a:rPr lang="nl-NL" sz="1800" b="1" noProof="0" dirty="0">
+                <a:cs typeface="Courier New" panose="02070309020205020404" pitchFamily="49" charset="0"/>
+              </a:rPr>
+              <a:t> All-in-One</a:t>
+            </a:r>
+            <a:endParaRPr lang="nl-NL" sz="1800" noProof="0" dirty="0">
               <a:cs typeface="Courier New" panose="02070309020205020404" pitchFamily="49" charset="0"/>
             </a:endParaRPr>
           </a:p>
           <a:p>
-            <a:pPr>
-              <a:buFontTx/>
-              <a:buChar char="-"/>
-            </a:pPr>
-            <a:r>
-              <a:rPr lang="nl-NL" sz="2000" dirty="0">
-                <a:cs typeface="Courier New" panose="02070309020205020404" pitchFamily="49" charset="0"/>
-              </a:rPr>
-              <a:t>Ruim Notebooks regelmatig op!</a:t>
-            </a:r>
+            <a:pPr marL="0" indent="0">
+              <a:buNone/>
+            </a:pPr>
+            <a:r>
+              <a:rPr lang="nl-NL" sz="1800" dirty="0">
+                <a:cs typeface="Courier New" panose="02070309020205020404" pitchFamily="49" charset="0"/>
+                <a:hlinkClick r:id="rId5"/>
+              </a:rPr>
+              <a:t>https://marketplace.visualstudio.com/items?itemName=yzhang.markdown-all-in-one</a:t>
+            </a:r>
+            <a:endParaRPr lang="nl-NL" sz="1800" dirty="0">
+              <a:cs typeface="Courier New" panose="02070309020205020404" pitchFamily="49" charset="0"/>
+            </a:endParaRPr>
+          </a:p>
+          <a:p>
+            <a:pPr marL="0" indent="0">
+              <a:buNone/>
+            </a:pPr>
+            <a:r>
+              <a:rPr lang="nl-NL" sz="1800" noProof="0" dirty="0">
+                <a:cs typeface="Courier New" panose="02070309020205020404" pitchFamily="49" charset="0"/>
+              </a:rPr>
+              <a:t>Uitbreiding voor </a:t>
+            </a:r>
+            <a:r>
+              <a:rPr lang="nl-NL" sz="1800" noProof="0" dirty="0" err="1">
+                <a:cs typeface="Courier New" panose="02070309020205020404" pitchFamily="49" charset="0"/>
+              </a:rPr>
+              <a:t>Markdown</a:t>
+            </a:r>
+            <a:r>
+              <a:rPr lang="nl-NL" sz="1800" noProof="0" dirty="0">
+                <a:cs typeface="Courier New" panose="02070309020205020404" pitchFamily="49" charset="0"/>
+              </a:rPr>
+              <a:t> ondersteuning; hot </a:t>
+            </a:r>
+            <a:r>
+              <a:rPr lang="nl-NL" sz="1800" noProof="0" dirty="0" err="1">
+                <a:cs typeface="Courier New" panose="02070309020205020404" pitchFamily="49" charset="0"/>
+              </a:rPr>
+              <a:t>keys</a:t>
+            </a:r>
+            <a:r>
+              <a:rPr lang="nl-NL" sz="1800" dirty="0">
+                <a:cs typeface="Courier New" panose="02070309020205020404" pitchFamily="49" charset="0"/>
+              </a:rPr>
+              <a:t>, inhoudsopgave, etc.</a:t>
+            </a:r>
+            <a:endParaRPr lang="nl-NL" sz="1800" noProof="0" dirty="0">
+              <a:cs typeface="Courier New" panose="02070309020205020404" pitchFamily="49" charset="0"/>
+            </a:endParaRPr>
+          </a:p>
+          <a:p>
+            <a:pPr marL="0" indent="0">
+              <a:buNone/>
+            </a:pPr>
+            <a:endParaRPr lang="nl-NL" sz="1800" noProof="0" dirty="0">
+              <a:cs typeface="Courier New" panose="02070309020205020404" pitchFamily="49" charset="0"/>
+            </a:endParaRPr>
           </a:p>
         </p:txBody>
       </p:sp>
-      <p:pic>
-        <p:nvPicPr>
-          <p:cNvPr id="8" name="Picture 7">
-            <a:extLst>
-              <a:ext uri="{FF2B5EF4-FFF2-40B4-BE49-F238E27FC236}">
-                <a16:creationId xmlns:a16="http://schemas.microsoft.com/office/drawing/2014/main" id="{5A5B03C0-3C43-2436-4168-E252ED7D55DE}"/>
-              </a:ext>
-            </a:extLst>
-          </p:cNvPr>
-          <p:cNvPicPr>
-            <a:picLocks noChangeAspect="1"/>
-          </p:cNvPicPr>
-          <p:nvPr/>
-        </p:nvPicPr>
-        <p:blipFill>
-          <a:blip r:embed="rId2"/>
-          <a:stretch>
-            <a:fillRect/>
-          </a:stretch>
-        </p:blipFill>
-        <p:spPr>
-          <a:xfrm>
-            <a:off x="7485360" y="1456267"/>
-            <a:ext cx="3868440" cy="4720696"/>
-          </a:xfrm>
-          <a:prstGeom prst="rect">
-            <a:avLst/>
-          </a:prstGeom>
-          <a:ln>
-            <a:solidFill>
-              <a:schemeClr val="tx1"/>
-            </a:solidFill>
-          </a:ln>
-        </p:spPr>
-      </p:pic>
     </p:spTree>
     <p:extLst>
       <p:ext uri="{BB962C8B-B14F-4D97-AF65-F5344CB8AC3E}">
-        <p14:creationId xmlns:p14="http://schemas.microsoft.com/office/powerpoint/2010/main" val="2412723340"/>
+        <p14:creationId xmlns:p14="http://schemas.microsoft.com/office/powerpoint/2010/main" val="3018676715"/>
       </p:ext>
     </p:extLst>
   </p:cSld>
@@ -4724,7 +4777,7 @@
 </file>
 
 <file path=ppt/slides/slide12.xml><?xml version="1.0" encoding="utf-8"?>
-<p:sld xmlns:a="http://schemas.openxmlformats.org/drawingml/2006/main" xmlns:r="http://schemas.openxmlformats.org/officeDocument/2006/relationships" xmlns:p="http://schemas.openxmlformats.org/presentationml/2006/main" show="0">
+<p:sld xmlns:a="http://schemas.openxmlformats.org/drawingml/2006/main" xmlns:r="http://schemas.openxmlformats.org/officeDocument/2006/relationships" xmlns:p="http://schemas.openxmlformats.org/presentationml/2006/main">
   <p:cSld>
     <p:spTree>
       <p:nvGrpSpPr>
@@ -4770,7 +4823,7 @@
           <a:p>
             <a:r>
               <a:rPr lang="nl-NL" sz="3600" noProof="0" dirty="0"/>
-              <a:t>Structuur</a:t>
+              <a:t>Structuur bestanden</a:t>
             </a:r>
           </a:p>
         </p:txBody>
@@ -4830,11 +4883,11 @@
             </a:pPr>
             <a:r>
               <a:rPr lang="nl-NL" sz="2000" dirty="0"/>
-              <a:t>Aparte scripts / Notebooks.</a:t>
-            </a:r>
-          </a:p>
-          <a:p>
-            <a:pPr>
+              <a:t>Folders</a:t>
+            </a:r>
+          </a:p>
+          <a:p>
+            <a:pPr lvl="1">
               <a:lnSpc>
                 <a:spcPct val="150000"/>
               </a:lnSpc>
@@ -4846,50 +4899,11 @@
             </a:pPr>
             <a:r>
               <a:rPr lang="nl-NL" sz="2000" dirty="0"/>
-              <a:t>Verschillende classes / functies.</a:t>
-            </a:r>
-          </a:p>
-          <a:p>
-            <a:pPr marL="0" indent="0">
-              <a:lnSpc>
-                <a:spcPct val="150000"/>
-              </a:lnSpc>
-              <a:spcBef>
-                <a:spcPts val="0"/>
-              </a:spcBef>
-              <a:buNone/>
-            </a:pPr>
-            <a:endParaRPr lang="nl-NL" sz="2000" dirty="0"/>
-          </a:p>
-          <a:p>
-            <a:pPr marL="0" indent="0">
-              <a:lnSpc>
-                <a:spcPct val="150000"/>
-              </a:lnSpc>
-              <a:spcBef>
-                <a:spcPts val="0"/>
-              </a:spcBef>
-              <a:buNone/>
-            </a:pPr>
-            <a:endParaRPr lang="nl-NL" sz="2000" dirty="0"/>
-          </a:p>
-          <a:p>
-            <a:pPr marL="0" indent="0">
-              <a:lnSpc>
-                <a:spcPct val="150000"/>
-              </a:lnSpc>
-              <a:spcBef>
-                <a:spcPts val="0"/>
-              </a:spcBef>
-              <a:buNone/>
-            </a:pPr>
-            <a:r>
-              <a:rPr lang="nl-NL" sz="2000" dirty="0"/>
-              <a:t>Elk onderdeel heeft één duidelijk doel:</a:t>
-            </a:r>
-          </a:p>
-          <a:p>
-            <a:pPr>
+              <a:t>Notebooks en scripts</a:t>
+            </a:r>
+          </a:p>
+          <a:p>
+            <a:pPr lvl="2">
               <a:lnSpc>
                 <a:spcPct val="150000"/>
               </a:lnSpc>
@@ -4900,12 +4914,51 @@
               <a:buChar char="-"/>
             </a:pPr>
             <a:r>
+              <a:rPr lang="nl-NL" dirty="0"/>
+              <a:t>Classes en functies</a:t>
+            </a:r>
+          </a:p>
+          <a:p>
+            <a:pPr marL="0" indent="0">
+              <a:lnSpc>
+                <a:spcPct val="150000"/>
+              </a:lnSpc>
+              <a:spcBef>
+                <a:spcPts val="0"/>
+              </a:spcBef>
+              <a:buNone/>
+            </a:pPr>
+            <a:endParaRPr lang="nl-NL" sz="2000" dirty="0"/>
+          </a:p>
+          <a:p>
+            <a:pPr marL="0" indent="0">
+              <a:lnSpc>
+                <a:spcPct val="150000"/>
+              </a:lnSpc>
+              <a:spcBef>
+                <a:spcPts val="0"/>
+              </a:spcBef>
+              <a:buNone/>
+            </a:pPr>
+            <a:endParaRPr lang="nl-NL" sz="2000" dirty="0"/>
+          </a:p>
+          <a:p>
+            <a:pPr marL="0" indent="0">
+              <a:lnSpc>
+                <a:spcPct val="150000"/>
+              </a:lnSpc>
+              <a:spcBef>
+                <a:spcPts val="0"/>
+              </a:spcBef>
+              <a:buNone/>
+            </a:pPr>
+            <a:r>
               <a:rPr lang="en-US" sz="2000" dirty="0"/>
               <a:t>Separation of concerns</a:t>
             </a:r>
             <a:r>
               <a:rPr lang="nl-NL" sz="2000" dirty="0"/>
-              <a:t>.</a:t>
+              <a:t>:</a:t>
             </a:r>
           </a:p>
           <a:p>
@@ -4921,7 +4974,23 @@
             </a:pPr>
             <a:r>
               <a:rPr lang="nl-NL" sz="2000" dirty="0"/>
-              <a:t>Makkelijker om problemen te lokaliseren.</a:t>
+              <a:t>Elk onderdeel heeft één duidelijke taak.</a:t>
+            </a:r>
+          </a:p>
+          <a:p>
+            <a:pPr>
+              <a:lnSpc>
+                <a:spcPct val="150000"/>
+              </a:lnSpc>
+              <a:spcBef>
+                <a:spcPts val="0"/>
+              </a:spcBef>
+              <a:buFontTx/>
+              <a:buChar char="-"/>
+            </a:pPr>
+            <a:r>
+              <a:rPr lang="nl-NL" sz="2000" dirty="0"/>
+              <a:t>Lokaliseren van problemen makkelijker.</a:t>
             </a:r>
           </a:p>
         </p:txBody>
@@ -4942,8 +5011,8 @@
         </p:nvSpPr>
         <p:spPr>
           <a:xfrm>
-            <a:off x="7101415" y="560916"/>
-            <a:ext cx="4715935" cy="5827183"/>
+            <a:off x="7101415" y="1456267"/>
+            <a:ext cx="4715935" cy="4931832"/>
           </a:xfrm>
           <a:prstGeom prst="rect">
             <a:avLst/>
@@ -4951,7 +5020,7 @@
         </p:spPr>
         <p:txBody>
           <a:bodyPr vert="horz" lIns="91440" tIns="45720" rIns="91440" bIns="45720" rtlCol="0">
-            <a:normAutofit fontScale="85000" lnSpcReduction="20000"/>
+            <a:normAutofit/>
           </a:bodyPr>
           <a:lstStyle>
             <a:lvl1pPr marL="228600" indent="-228600" algn="l" defTabSz="914400" rtl="0" eaLnBrk="1" latinLnBrk="0" hangingPunct="1">
@@ -5119,9 +5188,6 @@
           </a:lstStyle>
           <a:p>
             <a:pPr marL="0" indent="0">
-              <a:lnSpc>
-                <a:spcPct val="110000"/>
-              </a:lnSpc>
               <a:spcBef>
                 <a:spcPts val="0"/>
               </a:spcBef>
@@ -5129,25 +5195,15 @@
               <a:buNone/>
             </a:pPr>
             <a:r>
-              <a:rPr lang="nl-NL" sz="2000" dirty="0" err="1">
-                <a:latin typeface="Courier New" panose="02070309020205020404" pitchFamily="49" charset="0"/>
-                <a:cs typeface="Courier New" panose="02070309020205020404" pitchFamily="49" charset="0"/>
-              </a:rPr>
-              <a:t>azure</a:t>
-            </a:r>
-            <a:r>
-              <a:rPr lang="nl-NL" sz="2000" dirty="0">
-                <a:latin typeface="Courier New" panose="02070309020205020404" pitchFamily="49" charset="0"/>
-                <a:cs typeface="Courier New" panose="02070309020205020404" pitchFamily="49" charset="0"/>
-              </a:rPr>
-              <a:t>-database/</a:t>
-            </a:r>
-          </a:p>
-          <a:p>
-            <a:pPr marL="0" indent="0">
-              <a:lnSpc>
-                <a:spcPct val="110000"/>
-              </a:lnSpc>
+              <a:rPr lang="nl-NL" sz="1700" dirty="0">
+                <a:latin typeface="Courier New" panose="02070309020205020404" pitchFamily="49" charset="0"/>
+                <a:cs typeface="Courier New" panose="02070309020205020404" pitchFamily="49" charset="0"/>
+              </a:rPr>
+              <a:t>project/</a:t>
+            </a:r>
+          </a:p>
+          <a:p>
+            <a:pPr marL="0" indent="0">
               <a:spcBef>
                 <a:spcPts val="0"/>
               </a:spcBef>
@@ -5155,7 +5211,7 @@
               <a:buNone/>
             </a:pPr>
             <a:r>
-              <a:rPr lang="nl-NL" sz="2000" dirty="0">
+              <a:rPr lang="nl-NL" sz="1700" dirty="0">
                 <a:latin typeface="Courier New" panose="02070309020205020404" pitchFamily="49" charset="0"/>
                 <a:cs typeface="Courier New" panose="02070309020205020404" pitchFamily="49" charset="0"/>
               </a:rPr>
@@ -5164,148 +5220,139 @@
           </a:p>
           <a:p>
             <a:pPr marL="0" indent="0">
-              <a:lnSpc>
-                <a:spcPct val="110000"/>
-              </a:lnSpc>
               <a:spcBef>
                 <a:spcPts val="0"/>
               </a:spcBef>
               <a:buNone/>
             </a:pPr>
             <a:r>
-              <a:rPr lang="nl-NL" sz="2000" dirty="0">
+              <a:rPr lang="nl-NL" sz="1700" dirty="0">
+                <a:latin typeface="Courier New" panose="02070309020205020404" pitchFamily="49" charset="0"/>
+                <a:cs typeface="Courier New" panose="02070309020205020404" pitchFamily="49" charset="0"/>
+              </a:rPr>
+              <a:t>├─ helpers/</a:t>
+            </a:r>
+          </a:p>
+          <a:p>
+            <a:pPr marL="0" indent="0">
+              <a:spcBef>
+                <a:spcPts val="0"/>
+              </a:spcBef>
+              <a:buNone/>
+            </a:pPr>
+            <a:r>
+              <a:rPr lang="nl-NL" sz="1700" dirty="0">
+                <a:latin typeface="Courier New" panose="02070309020205020404" pitchFamily="49" charset="0"/>
+                <a:cs typeface="Courier New" panose="02070309020205020404" pitchFamily="49" charset="0"/>
+              </a:rPr>
+              <a:t>│  │  </a:t>
+            </a:r>
+          </a:p>
+          <a:p>
+            <a:pPr marL="0" indent="0">
+              <a:spcBef>
+                <a:spcPts val="0"/>
+              </a:spcBef>
+              <a:buNone/>
+            </a:pPr>
+            <a:r>
+              <a:rPr lang="nl-NL" sz="1700" dirty="0">
+                <a:latin typeface="Courier New" panose="02070309020205020404" pitchFamily="49" charset="0"/>
+                <a:cs typeface="Courier New" panose="02070309020205020404" pitchFamily="49" charset="0"/>
+              </a:rPr>
+              <a:t>│  ├─ plotting.py</a:t>
+            </a:r>
+          </a:p>
+          <a:p>
+            <a:pPr marL="0" indent="0">
+              <a:spcBef>
+                <a:spcPts val="0"/>
+              </a:spcBef>
+              <a:buNone/>
+            </a:pPr>
+            <a:r>
+              <a:rPr lang="nl-NL" sz="1700" dirty="0">
+                <a:latin typeface="Courier New" panose="02070309020205020404" pitchFamily="49" charset="0"/>
+                <a:cs typeface="Courier New" panose="02070309020205020404" pitchFamily="49" charset="0"/>
+              </a:rPr>
+              <a:t>│  │</a:t>
+            </a:r>
+          </a:p>
+          <a:p>
+            <a:pPr marL="0" indent="0">
+              <a:spcBef>
+                <a:spcPts val="0"/>
+              </a:spcBef>
+              <a:buFont typeface="Arial" panose="020B0604020202020204" pitchFamily="34" charset="0"/>
+              <a:buNone/>
+            </a:pPr>
+            <a:r>
+              <a:rPr lang="nl-NL" sz="1700" dirty="0">
+                <a:latin typeface="Courier New" panose="02070309020205020404" pitchFamily="49" charset="0"/>
+                <a:cs typeface="Courier New" panose="02070309020205020404" pitchFamily="49" charset="0"/>
+              </a:rPr>
+              <a:t>│  └─ clean_text.py</a:t>
+            </a:r>
+          </a:p>
+          <a:p>
+            <a:pPr marL="0" indent="0">
+              <a:spcBef>
+                <a:spcPts val="0"/>
+              </a:spcBef>
+              <a:buNone/>
+            </a:pPr>
+            <a:r>
+              <a:rPr lang="nl-NL" sz="1700" dirty="0">
+                <a:latin typeface="Courier New" panose="02070309020205020404" pitchFamily="49" charset="0"/>
+                <a:cs typeface="Courier New" panose="02070309020205020404" pitchFamily="49" charset="0"/>
+              </a:rPr>
+              <a:t>│</a:t>
+            </a:r>
+          </a:p>
+          <a:p>
+            <a:pPr marL="0" indent="0">
+              <a:spcBef>
+                <a:spcPts val="0"/>
+              </a:spcBef>
+              <a:buNone/>
+            </a:pPr>
+            <a:r>
+              <a:rPr lang="nl-NL" sz="1700" dirty="0">
+                <a:latin typeface="Courier New" panose="02070309020205020404" pitchFamily="49" charset="0"/>
+                <a:cs typeface="Courier New" panose="02070309020205020404" pitchFamily="49" charset="0"/>
+              </a:rPr>
+              <a:t>│</a:t>
+            </a:r>
+          </a:p>
+          <a:p>
+            <a:pPr marL="0" indent="0">
+              <a:spcBef>
+                <a:spcPts val="0"/>
+              </a:spcBef>
+              <a:buFont typeface="Arial" panose="020B0604020202020204" pitchFamily="34" charset="0"/>
+              <a:buNone/>
+            </a:pPr>
+            <a:r>
+              <a:rPr lang="nl-NL" sz="1700" dirty="0">
                 <a:latin typeface="Courier New" panose="02070309020205020404" pitchFamily="49" charset="0"/>
                 <a:cs typeface="Courier New" panose="02070309020205020404" pitchFamily="49" charset="0"/>
               </a:rPr>
               <a:t>├─ </a:t>
             </a:r>
             <a:r>
-              <a:rPr lang="nl-NL" sz="2000" dirty="0" err="1">
-                <a:latin typeface="Courier New" panose="02070309020205020404" pitchFamily="49" charset="0"/>
-                <a:cs typeface="Courier New" panose="02070309020205020404" pitchFamily="49" charset="0"/>
-              </a:rPr>
-              <a:t>docs</a:t>
-            </a:r>
-            <a:r>
-              <a:rPr lang="nl-NL" sz="2000" dirty="0">
-                <a:latin typeface="Courier New" panose="02070309020205020404" pitchFamily="49" charset="0"/>
-                <a:cs typeface="Courier New" panose="02070309020205020404" pitchFamily="49" charset="0"/>
-              </a:rPr>
-              <a:t>/</a:t>
-            </a:r>
-          </a:p>
-          <a:p>
-            <a:pPr marL="0" indent="0">
-              <a:lnSpc>
-                <a:spcPct val="110000"/>
-              </a:lnSpc>
-              <a:spcBef>
-                <a:spcPts val="0"/>
-              </a:spcBef>
-              <a:buNone/>
-            </a:pPr>
-            <a:r>
-              <a:rPr lang="nl-NL" sz="2000" dirty="0">
-                <a:latin typeface="Courier New" panose="02070309020205020404" pitchFamily="49" charset="0"/>
-                <a:cs typeface="Courier New" panose="02070309020205020404" pitchFamily="49" charset="0"/>
-              </a:rPr>
-              <a:t>│</a:t>
-            </a:r>
-          </a:p>
-          <a:p>
-            <a:pPr marL="0" indent="0">
-              <a:lnSpc>
-                <a:spcPct val="110000"/>
-              </a:lnSpc>
-              <a:spcBef>
-                <a:spcPts val="0"/>
-              </a:spcBef>
-              <a:buFont typeface="Arial" panose="020B0604020202020204" pitchFamily="34" charset="0"/>
-              <a:buNone/>
-            </a:pPr>
-            <a:r>
-              <a:rPr lang="nl-NL" sz="2000" dirty="0">
-                <a:latin typeface="Courier New" panose="02070309020205020404" pitchFamily="49" charset="0"/>
-                <a:cs typeface="Courier New" panose="02070309020205020404" pitchFamily="49" charset="0"/>
-              </a:rPr>
-              <a:t>├─ </a:t>
-            </a:r>
-            <a:r>
-              <a:rPr lang="nl-NL" sz="2000" dirty="0" err="1">
-                <a:latin typeface="Courier New" panose="02070309020205020404" pitchFamily="49" charset="0"/>
-                <a:cs typeface="Courier New" panose="02070309020205020404" pitchFamily="49" charset="0"/>
-              </a:rPr>
-              <a:t>src</a:t>
-            </a:r>
-            <a:r>
-              <a:rPr lang="nl-NL" sz="2000" dirty="0">
-                <a:latin typeface="Courier New" panose="02070309020205020404" pitchFamily="49" charset="0"/>
-                <a:cs typeface="Courier New" panose="02070309020205020404" pitchFamily="49" charset="0"/>
-              </a:rPr>
-              <a:t>/</a:t>
-            </a:r>
-          </a:p>
-          <a:p>
-            <a:pPr marL="0" indent="0">
-              <a:lnSpc>
-                <a:spcPct val="110000"/>
-              </a:lnSpc>
-              <a:spcBef>
-                <a:spcPts val="0"/>
-              </a:spcBef>
-              <a:buFont typeface="Arial" panose="020B0604020202020204" pitchFamily="34" charset="0"/>
-              <a:buNone/>
-            </a:pPr>
-            <a:r>
-              <a:rPr lang="nl-NL" sz="2000" dirty="0">
-                <a:latin typeface="Courier New" panose="02070309020205020404" pitchFamily="49" charset="0"/>
-                <a:cs typeface="Courier New" panose="02070309020205020404" pitchFamily="49" charset="0"/>
-              </a:rPr>
-              <a:t>│  │</a:t>
-            </a:r>
-          </a:p>
-          <a:p>
-            <a:pPr marL="0" indent="0">
-              <a:lnSpc>
-                <a:spcPct val="110000"/>
-              </a:lnSpc>
-              <a:spcBef>
-                <a:spcPts val="0"/>
-              </a:spcBef>
-              <a:buFont typeface="Arial" panose="020B0604020202020204" pitchFamily="34" charset="0"/>
-              <a:buNone/>
-            </a:pPr>
-            <a:r>
-              <a:rPr lang="nl-NL" sz="2000" dirty="0">
-                <a:latin typeface="Courier New" panose="02070309020205020404" pitchFamily="49" charset="0"/>
-                <a:cs typeface="Courier New" panose="02070309020205020404" pitchFamily="49" charset="0"/>
-              </a:rPr>
-              <a:t>│  └─ </a:t>
-            </a:r>
-            <a:r>
-              <a:rPr lang="nl-NL" sz="2000" dirty="0" err="1">
-                <a:latin typeface="Courier New" panose="02070309020205020404" pitchFamily="49" charset="0"/>
-                <a:cs typeface="Courier New" panose="02070309020205020404" pitchFamily="49" charset="0"/>
-              </a:rPr>
-              <a:t>azure_database</a:t>
-            </a:r>
-            <a:r>
-              <a:rPr lang="nl-NL" sz="2000">
-                <a:latin typeface="Courier New" panose="02070309020205020404" pitchFamily="49" charset="0"/>
-                <a:cs typeface="Courier New" panose="02070309020205020404" pitchFamily="49" charset="0"/>
-              </a:rPr>
-              <a:t>/</a:t>
-            </a:r>
-            <a:endParaRPr lang="nl-NL" sz="2000" dirty="0">
+              <a:rPr lang="nl-NL" sz="1700" dirty="0" err="1">
+                <a:latin typeface="Courier New" panose="02070309020205020404" pitchFamily="49" charset="0"/>
+                <a:cs typeface="Courier New" panose="02070309020205020404" pitchFamily="49" charset="0"/>
+              </a:rPr>
+              <a:t>data_prep.ipynb</a:t>
+            </a:r>
+            <a:endParaRPr lang="nl-NL" sz="1700" dirty="0">
               <a:latin typeface="Courier New" panose="02070309020205020404" pitchFamily="49" charset="0"/>
               <a:cs typeface="Courier New" panose="02070309020205020404" pitchFamily="49" charset="0"/>
             </a:endParaRPr>
           </a:p>
           <a:p>
             <a:pPr marL="0" indent="0">
-              <a:lnSpc>
-                <a:spcPct val="110000"/>
-              </a:lnSpc>
               <a:spcBef>
                 <a:spcPts val="0"/>
               </a:spcBef>
@@ -5313,18 +5360,15 @@
               <a:buNone/>
             </a:pPr>
             <a:r>
-              <a:rPr lang="nl-NL" sz="2000" dirty="0">
-                <a:latin typeface="Courier New" panose="02070309020205020404" pitchFamily="49" charset="0"/>
-                <a:cs typeface="Courier New" panose="02070309020205020404" pitchFamily="49" charset="0"/>
-              </a:rPr>
-              <a:t>│     │</a:t>
-            </a:r>
-          </a:p>
-          <a:p>
-            <a:pPr marL="0" indent="0">
-              <a:lnSpc>
-                <a:spcPct val="110000"/>
-              </a:lnSpc>
+              <a:rPr lang="nl-NL" sz="1700" dirty="0">
+                <a:latin typeface="Courier New" panose="02070309020205020404" pitchFamily="49" charset="0"/>
+                <a:cs typeface="Courier New" panose="02070309020205020404" pitchFamily="49" charset="0"/>
+              </a:rPr>
+              <a:t>│</a:t>
+            </a:r>
+          </a:p>
+          <a:p>
+            <a:pPr marL="0" indent="0">
               <a:spcBef>
                 <a:spcPts val="0"/>
               </a:spcBef>
@@ -5332,273 +5376,26 @@
               <a:buNone/>
             </a:pPr>
             <a:r>
-              <a:rPr lang="nl-NL" sz="2000" dirty="0">
-                <a:latin typeface="Courier New" panose="02070309020205020404" pitchFamily="49" charset="0"/>
-                <a:cs typeface="Courier New" panose="02070309020205020404" pitchFamily="49" charset="0"/>
-              </a:rPr>
-              <a:t>│     ├─ __init__.py</a:t>
-            </a:r>
-          </a:p>
-          <a:p>
-            <a:pPr marL="0" indent="0">
-              <a:lnSpc>
-                <a:spcPct val="110000"/>
-              </a:lnSpc>
-              <a:spcBef>
-                <a:spcPts val="0"/>
-              </a:spcBef>
-              <a:buFont typeface="Arial" panose="020B0604020202020204" pitchFamily="34" charset="0"/>
-              <a:buNone/>
-            </a:pPr>
-            <a:r>
-              <a:rPr lang="nl-NL" sz="2000" dirty="0">
-                <a:latin typeface="Courier New" panose="02070309020205020404" pitchFamily="49" charset="0"/>
-                <a:cs typeface="Courier New" panose="02070309020205020404" pitchFamily="49" charset="0"/>
-              </a:rPr>
-              <a:t>│     │</a:t>
-            </a:r>
-          </a:p>
-          <a:p>
-            <a:pPr marL="0" indent="0">
-              <a:lnSpc>
-                <a:spcPct val="110000"/>
-              </a:lnSpc>
-              <a:spcBef>
-                <a:spcPts val="0"/>
-              </a:spcBef>
-              <a:buFont typeface="Arial" panose="020B0604020202020204" pitchFamily="34" charset="0"/>
-              <a:buNone/>
-            </a:pPr>
-            <a:r>
-              <a:rPr lang="nl-NL" sz="2000" dirty="0">
-                <a:latin typeface="Courier New" panose="02070309020205020404" pitchFamily="49" charset="0"/>
-                <a:cs typeface="Courier New" panose="02070309020205020404" pitchFamily="49" charset="0"/>
-              </a:rPr>
-              <a:t>│     ├─ basic.py</a:t>
-            </a:r>
-          </a:p>
-          <a:p>
-            <a:pPr marL="0" indent="0">
-              <a:lnSpc>
-                <a:spcPct val="110000"/>
-              </a:lnSpc>
-              <a:spcBef>
-                <a:spcPts val="0"/>
-              </a:spcBef>
-              <a:buFont typeface="Arial" panose="020B0604020202020204" pitchFamily="34" charset="0"/>
-              <a:buNone/>
-            </a:pPr>
-            <a:r>
-              <a:rPr lang="nl-NL" sz="2000" dirty="0">
-                <a:latin typeface="Courier New" panose="02070309020205020404" pitchFamily="49" charset="0"/>
-                <a:cs typeface="Courier New" panose="02070309020205020404" pitchFamily="49" charset="0"/>
-              </a:rPr>
-              <a:t>│     │</a:t>
-            </a:r>
-          </a:p>
-          <a:p>
-            <a:pPr marL="0" indent="0">
-              <a:lnSpc>
-                <a:spcPct val="110000"/>
-              </a:lnSpc>
-              <a:spcBef>
-                <a:spcPts val="0"/>
-              </a:spcBef>
-              <a:buFont typeface="Arial" panose="020B0604020202020204" pitchFamily="34" charset="0"/>
-              <a:buNone/>
-            </a:pPr>
-            <a:r>
-              <a:rPr lang="nl-NL" sz="2000" dirty="0">
-                <a:latin typeface="Courier New" panose="02070309020205020404" pitchFamily="49" charset="0"/>
-                <a:cs typeface="Courier New" panose="02070309020205020404" pitchFamily="49" charset="0"/>
-              </a:rPr>
-              <a:t>│     ├─ errors.py</a:t>
-            </a:r>
-          </a:p>
-          <a:p>
-            <a:pPr marL="0" indent="0">
-              <a:lnSpc>
-                <a:spcPct val="110000"/>
-              </a:lnSpc>
-              <a:spcBef>
-                <a:spcPts val="0"/>
-              </a:spcBef>
-              <a:buFont typeface="Arial" panose="020B0604020202020204" pitchFamily="34" charset="0"/>
-              <a:buNone/>
-            </a:pPr>
-            <a:r>
-              <a:rPr lang="nl-NL" sz="2000" dirty="0">
-                <a:latin typeface="Courier New" panose="02070309020205020404" pitchFamily="49" charset="0"/>
-                <a:cs typeface="Courier New" panose="02070309020205020404" pitchFamily="49" charset="0"/>
-              </a:rPr>
-              <a:t>│     │</a:t>
-            </a:r>
-          </a:p>
-          <a:p>
-            <a:pPr marL="0" indent="0">
-              <a:lnSpc>
-                <a:spcPct val="110000"/>
-              </a:lnSpc>
-              <a:spcBef>
-                <a:spcPts val="0"/>
-              </a:spcBef>
-              <a:buFont typeface="Arial" panose="020B0604020202020204" pitchFamily="34" charset="0"/>
-              <a:buNone/>
-            </a:pPr>
-            <a:r>
-              <a:rPr lang="nl-NL" sz="2000" dirty="0">
-                <a:latin typeface="Courier New" panose="02070309020205020404" pitchFamily="49" charset="0"/>
-                <a:cs typeface="Courier New" panose="02070309020205020404" pitchFamily="49" charset="0"/>
-              </a:rPr>
-              <a:t>│     ├─ extended.py</a:t>
-            </a:r>
-          </a:p>
-          <a:p>
-            <a:pPr marL="0" indent="0">
-              <a:lnSpc>
-                <a:spcPct val="110000"/>
-              </a:lnSpc>
-              <a:spcBef>
-                <a:spcPts val="0"/>
-              </a:spcBef>
-              <a:buFont typeface="Arial" panose="020B0604020202020204" pitchFamily="34" charset="0"/>
-              <a:buNone/>
-            </a:pPr>
-            <a:r>
-              <a:rPr lang="nl-NL" sz="2000" dirty="0">
-                <a:latin typeface="Courier New" panose="02070309020205020404" pitchFamily="49" charset="0"/>
-                <a:cs typeface="Courier New" panose="02070309020205020404" pitchFamily="49" charset="0"/>
-              </a:rPr>
-              <a:t>│     │</a:t>
-            </a:r>
-          </a:p>
-          <a:p>
-            <a:pPr marL="0" indent="0">
-              <a:lnSpc>
-                <a:spcPct val="110000"/>
-              </a:lnSpc>
-              <a:spcBef>
-                <a:spcPts val="0"/>
-              </a:spcBef>
-              <a:buFont typeface="Arial" panose="020B0604020202020204" pitchFamily="34" charset="0"/>
-              <a:buNone/>
-            </a:pPr>
-            <a:r>
-              <a:rPr lang="nl-NL" sz="2000" dirty="0">
-                <a:latin typeface="Courier New" panose="02070309020205020404" pitchFamily="49" charset="0"/>
-                <a:cs typeface="Courier New" panose="02070309020205020404" pitchFamily="49" charset="0"/>
-              </a:rPr>
-              <a:t>│     ├─ reserved.py</a:t>
-            </a:r>
-          </a:p>
-          <a:p>
-            <a:pPr marL="0" indent="0">
-              <a:lnSpc>
-                <a:spcPct val="110000"/>
-              </a:lnSpc>
-              <a:spcBef>
-                <a:spcPts val="0"/>
-              </a:spcBef>
-              <a:buNone/>
-            </a:pPr>
-            <a:r>
-              <a:rPr lang="nl-NL" sz="2000" dirty="0">
-                <a:latin typeface="Courier New" panose="02070309020205020404" pitchFamily="49" charset="0"/>
-                <a:cs typeface="Courier New" panose="02070309020205020404" pitchFamily="49" charset="0"/>
-              </a:rPr>
-              <a:t>│     │</a:t>
-            </a:r>
-          </a:p>
-          <a:p>
-            <a:pPr marL="0" indent="0">
-              <a:lnSpc>
-                <a:spcPct val="110000"/>
-              </a:lnSpc>
-              <a:spcBef>
-                <a:spcPts val="0"/>
-              </a:spcBef>
-              <a:buNone/>
-            </a:pPr>
-            <a:r>
-              <a:rPr lang="nl-NL" sz="2000" dirty="0">
-                <a:latin typeface="Courier New" panose="02070309020205020404" pitchFamily="49" charset="0"/>
-                <a:cs typeface="Courier New" panose="02070309020205020404" pitchFamily="49" charset="0"/>
-              </a:rPr>
-              <a:t>│     └─ resultset.py</a:t>
-            </a:r>
-          </a:p>
-          <a:p>
-            <a:pPr marL="0" indent="0">
-              <a:lnSpc>
-                <a:spcPct val="110000"/>
-              </a:lnSpc>
-              <a:spcBef>
-                <a:spcPts val="0"/>
-              </a:spcBef>
-              <a:buFont typeface="Arial" panose="020B0604020202020204" pitchFamily="34" charset="0"/>
-              <a:buNone/>
-            </a:pPr>
-            <a:r>
-              <a:rPr lang="nl-NL" sz="2000" dirty="0">
-                <a:latin typeface="Courier New" panose="02070309020205020404" pitchFamily="49" charset="0"/>
-                <a:cs typeface="Courier New" panose="02070309020205020404" pitchFamily="49" charset="0"/>
-              </a:rPr>
-              <a:t>│</a:t>
-            </a:r>
-          </a:p>
-          <a:p>
-            <a:pPr marL="0" indent="0">
-              <a:lnSpc>
-                <a:spcPct val="110000"/>
-              </a:lnSpc>
-              <a:spcBef>
-                <a:spcPts val="0"/>
-              </a:spcBef>
-              <a:buNone/>
-            </a:pPr>
-            <a:r>
-              <a:rPr lang="nl-NL" sz="2000" dirty="0">
-                <a:latin typeface="Courier New" panose="02070309020205020404" pitchFamily="49" charset="0"/>
-                <a:cs typeface="Courier New" panose="02070309020205020404" pitchFamily="49" charset="0"/>
-              </a:rPr>
-              <a:t>│</a:t>
-            </a:r>
-          </a:p>
-          <a:p>
-            <a:pPr marL="0" indent="0">
-              <a:lnSpc>
-                <a:spcPct val="110000"/>
-              </a:lnSpc>
-              <a:spcBef>
-                <a:spcPts val="0"/>
-              </a:spcBef>
-              <a:buFont typeface="Arial" panose="020B0604020202020204" pitchFamily="34" charset="0"/>
-              <a:buNone/>
-            </a:pPr>
-            <a:r>
-              <a:rPr lang="nl-NL" sz="2000" dirty="0">
+              <a:rPr lang="nl-NL" sz="1700" dirty="0">
                 <a:latin typeface="Courier New" panose="02070309020205020404" pitchFamily="49" charset="0"/>
                 <a:cs typeface="Courier New" panose="02070309020205020404" pitchFamily="49" charset="0"/>
               </a:rPr>
               <a:t>├─ </a:t>
             </a:r>
             <a:r>
-              <a:rPr lang="nl-NL" sz="2000" dirty="0" err="1">
-                <a:latin typeface="Courier New" panose="02070309020205020404" pitchFamily="49" charset="0"/>
-                <a:cs typeface="Courier New" panose="02070309020205020404" pitchFamily="49" charset="0"/>
-              </a:rPr>
-              <a:t>pyproject.toml</a:t>
-            </a:r>
-            <a:endParaRPr lang="nl-NL" sz="2000" dirty="0">
+              <a:rPr lang="nl-NL" sz="1700" dirty="0" err="1">
+                <a:latin typeface="Courier New" panose="02070309020205020404" pitchFamily="49" charset="0"/>
+                <a:cs typeface="Courier New" panose="02070309020205020404" pitchFamily="49" charset="0"/>
+              </a:rPr>
+              <a:t>modelling.ipynb</a:t>
+            </a:r>
+            <a:endParaRPr lang="nl-NL" sz="1700" dirty="0">
               <a:latin typeface="Courier New" panose="02070309020205020404" pitchFamily="49" charset="0"/>
               <a:cs typeface="Courier New" panose="02070309020205020404" pitchFamily="49" charset="0"/>
             </a:endParaRPr>
           </a:p>
           <a:p>
             <a:pPr marL="0" indent="0">
-              <a:lnSpc>
-                <a:spcPct val="110000"/>
-              </a:lnSpc>
               <a:spcBef>
                 <a:spcPts val="0"/>
               </a:spcBef>
@@ -5606,7 +5403,7 @@
               <a:buNone/>
             </a:pPr>
             <a:r>
-              <a:rPr lang="nl-NL" sz="2000" dirty="0">
+              <a:rPr lang="nl-NL" sz="1700" dirty="0">
                 <a:latin typeface="Courier New" panose="02070309020205020404" pitchFamily="49" charset="0"/>
                 <a:cs typeface="Courier New" panose="02070309020205020404" pitchFamily="49" charset="0"/>
               </a:rPr>
@@ -5615,9 +5412,6 @@
           </a:p>
           <a:p>
             <a:pPr marL="0" indent="0">
-              <a:lnSpc>
-                <a:spcPct val="110000"/>
-              </a:lnSpc>
               <a:spcBef>
                 <a:spcPts val="0"/>
               </a:spcBef>
@@ -5625,7 +5419,7 @@
               <a:buNone/>
             </a:pPr>
             <a:r>
-              <a:rPr lang="nl-NL" sz="2000" dirty="0">
+              <a:rPr lang="nl-NL" sz="1700" dirty="0">
                 <a:latin typeface="Courier New" panose="02070309020205020404" pitchFamily="49" charset="0"/>
                 <a:cs typeface="Courier New" panose="02070309020205020404" pitchFamily="49" charset="0"/>
               </a:rPr>
@@ -5637,7 +5431,7 @@
     </p:spTree>
     <p:extLst>
       <p:ext uri="{BB962C8B-B14F-4D97-AF65-F5344CB8AC3E}">
-        <p14:creationId xmlns:p14="http://schemas.microsoft.com/office/powerpoint/2010/main" val="3000154375"/>
+        <p14:creationId xmlns:p14="http://schemas.microsoft.com/office/powerpoint/2010/main" val="4219705117"/>
       </p:ext>
     </p:extLst>
   </p:cSld>
@@ -5694,7 +5488,7 @@
           <a:p>
             <a:r>
               <a:rPr lang="nl-NL" sz="3600" noProof="0" dirty="0"/>
-              <a:t>Structuur</a:t>
+              <a:t>Structuur package</a:t>
             </a:r>
           </a:p>
         </p:txBody>
@@ -5754,11 +5548,11 @@
             </a:pPr>
             <a:r>
               <a:rPr lang="nl-NL" sz="2000" dirty="0"/>
-              <a:t>Folders</a:t>
-            </a:r>
-          </a:p>
-          <a:p>
-            <a:pPr lvl="1">
+              <a:t>Aparte scripts / Notebooks.</a:t>
+            </a:r>
+          </a:p>
+          <a:p>
+            <a:pPr>
               <a:lnSpc>
                 <a:spcPct val="150000"/>
               </a:lnSpc>
@@ -5770,11 +5564,50 @@
             </a:pPr>
             <a:r>
               <a:rPr lang="nl-NL" sz="2000" dirty="0"/>
-              <a:t>Notebooks en scripts</a:t>
-            </a:r>
-          </a:p>
-          <a:p>
-            <a:pPr lvl="2">
+              <a:t>Verschillende classes / functies.</a:t>
+            </a:r>
+          </a:p>
+          <a:p>
+            <a:pPr marL="0" indent="0">
+              <a:lnSpc>
+                <a:spcPct val="150000"/>
+              </a:lnSpc>
+              <a:spcBef>
+                <a:spcPts val="0"/>
+              </a:spcBef>
+              <a:buNone/>
+            </a:pPr>
+            <a:endParaRPr lang="nl-NL" sz="2000" dirty="0"/>
+          </a:p>
+          <a:p>
+            <a:pPr marL="0" indent="0">
+              <a:lnSpc>
+                <a:spcPct val="150000"/>
+              </a:lnSpc>
+              <a:spcBef>
+                <a:spcPts val="0"/>
+              </a:spcBef>
+              <a:buNone/>
+            </a:pPr>
+            <a:endParaRPr lang="nl-NL" sz="2000" dirty="0"/>
+          </a:p>
+          <a:p>
+            <a:pPr marL="0" indent="0">
+              <a:lnSpc>
+                <a:spcPct val="150000"/>
+              </a:lnSpc>
+              <a:spcBef>
+                <a:spcPts val="0"/>
+              </a:spcBef>
+              <a:buNone/>
+            </a:pPr>
+            <a:r>
+              <a:rPr lang="nl-NL" sz="2000" dirty="0"/>
+              <a:t>Elk onderdeel heeft één duidelijk doel:</a:t>
+            </a:r>
+          </a:p>
+          <a:p>
+            <a:pPr>
               <a:lnSpc>
                 <a:spcPct val="150000"/>
               </a:lnSpc>
@@ -5785,51 +5618,12 @@
               <a:buChar char="-"/>
             </a:pPr>
             <a:r>
-              <a:rPr lang="nl-NL" dirty="0"/>
-              <a:t>Classes en functies</a:t>
-            </a:r>
-          </a:p>
-          <a:p>
-            <a:pPr marL="0" indent="0">
-              <a:lnSpc>
-                <a:spcPct val="150000"/>
-              </a:lnSpc>
-              <a:spcBef>
-                <a:spcPts val="0"/>
-              </a:spcBef>
-              <a:buNone/>
-            </a:pPr>
-            <a:endParaRPr lang="nl-NL" sz="2000" dirty="0"/>
-          </a:p>
-          <a:p>
-            <a:pPr marL="0" indent="0">
-              <a:lnSpc>
-                <a:spcPct val="150000"/>
-              </a:lnSpc>
-              <a:spcBef>
-                <a:spcPts val="0"/>
-              </a:spcBef>
-              <a:buNone/>
-            </a:pPr>
-            <a:endParaRPr lang="nl-NL" sz="2000" dirty="0"/>
-          </a:p>
-          <a:p>
-            <a:pPr marL="0" indent="0">
-              <a:lnSpc>
-                <a:spcPct val="150000"/>
-              </a:lnSpc>
-              <a:spcBef>
-                <a:spcPts val="0"/>
-              </a:spcBef>
-              <a:buNone/>
-            </a:pPr>
-            <a:r>
               <a:rPr lang="en-US" sz="2000" dirty="0"/>
               <a:t>Separation of concerns</a:t>
             </a:r>
             <a:r>
               <a:rPr lang="nl-NL" sz="2000" dirty="0"/>
-              <a:t>:</a:t>
+              <a:t>.</a:t>
             </a:r>
           </a:p>
           <a:p>
@@ -5845,23 +5639,7 @@
             </a:pPr>
             <a:r>
               <a:rPr lang="nl-NL" sz="2000" dirty="0"/>
-              <a:t>Elk onderdeel heeft één duidelijke taak.</a:t>
-            </a:r>
-          </a:p>
-          <a:p>
-            <a:pPr>
-              <a:lnSpc>
-                <a:spcPct val="150000"/>
-              </a:lnSpc>
-              <a:spcBef>
-                <a:spcPts val="0"/>
-              </a:spcBef>
-              <a:buFontTx/>
-              <a:buChar char="-"/>
-            </a:pPr>
-            <a:r>
-              <a:rPr lang="nl-NL" sz="2000" dirty="0"/>
-              <a:t>Lokaliseren van problemen makkelijker.</a:t>
+              <a:t>Makkelijker om problemen te lokaliseren.</a:t>
             </a:r>
           </a:p>
         </p:txBody>
@@ -5872,6 +5650,215 @@
             <a:extLst>
               <a:ext uri="{FF2B5EF4-FFF2-40B4-BE49-F238E27FC236}">
                 <a16:creationId xmlns:a16="http://schemas.microsoft.com/office/drawing/2014/main" id="{2688404D-BDBE-36DD-1A0C-F3B32E5240B3}"/>
+              </a:ext>
+            </a:extLst>
+          </p:cNvPr>
+          <p:cNvSpPr txBox="1">
+            <a:spLocks/>
+          </p:cNvSpPr>
+          <p:nvPr/>
+        </p:nvSpPr>
+        <p:spPr>
+          <a:xfrm>
+            <a:off x="7101415" y="560916"/>
+            <a:ext cx="4715935" cy="5827183"/>
+          </a:xfrm>
+          <a:prstGeom prst="rect">
+            <a:avLst/>
+          </a:prstGeom>
+        </p:spPr>
+        <p:txBody>
+          <a:bodyPr vert="horz" lIns="91440" tIns="45720" rIns="91440" bIns="45720" rtlCol="0">
+            <a:noAutofit/>
+          </a:bodyPr>
+          <a:lstStyle>
+            <a:lvl1pPr marL="228600" indent="-228600" algn="l" defTabSz="914400" rtl="0" eaLnBrk="1" latinLnBrk="0" hangingPunct="1">
+              <a:lnSpc>
+                <a:spcPct val="90000"/>
+              </a:lnSpc>
+              <a:spcBef>
+                <a:spcPts val="1000"/>
+              </a:spcBef>
+              <a:buFont typeface="Arial" panose="020B0604020202020204" pitchFamily="34" charset="0"/>
+              <a:buChar char="•"/>
+              <a:defRPr sz="2800" kern="1200">
+                <a:solidFill>
+                  <a:schemeClr val="tx1"/>
+                </a:solidFill>
+                <a:latin typeface="+mn-lt"/>
+                <a:ea typeface="+mn-ea"/>
+                <a:cs typeface="+mn-cs"/>
+              </a:defRPr>
+            </a:lvl1pPr>
+            <a:lvl2pPr marL="685800" indent="-228600" algn="l" defTabSz="914400" rtl="0" eaLnBrk="1" latinLnBrk="0" hangingPunct="1">
+              <a:lnSpc>
+                <a:spcPct val="90000"/>
+              </a:lnSpc>
+              <a:spcBef>
+                <a:spcPts val="500"/>
+              </a:spcBef>
+              <a:buFont typeface="Arial" panose="020B0604020202020204" pitchFamily="34" charset="0"/>
+              <a:buChar char="•"/>
+              <a:defRPr sz="2400" kern="1200">
+                <a:solidFill>
+                  <a:schemeClr val="tx1"/>
+                </a:solidFill>
+                <a:latin typeface="+mn-lt"/>
+                <a:ea typeface="+mn-ea"/>
+                <a:cs typeface="+mn-cs"/>
+              </a:defRPr>
+            </a:lvl2pPr>
+            <a:lvl3pPr marL="1143000" indent="-228600" algn="l" defTabSz="914400" rtl="0" eaLnBrk="1" latinLnBrk="0" hangingPunct="1">
+              <a:lnSpc>
+                <a:spcPct val="90000"/>
+              </a:lnSpc>
+              <a:spcBef>
+                <a:spcPts val="500"/>
+              </a:spcBef>
+              <a:buFont typeface="Arial" panose="020B0604020202020204" pitchFamily="34" charset="0"/>
+              <a:buChar char="•"/>
+              <a:defRPr sz="2000" kern="1200">
+                <a:solidFill>
+                  <a:schemeClr val="tx1"/>
+                </a:solidFill>
+                <a:latin typeface="+mn-lt"/>
+                <a:ea typeface="+mn-ea"/>
+                <a:cs typeface="+mn-cs"/>
+              </a:defRPr>
+            </a:lvl3pPr>
+            <a:lvl4pPr marL="1600200" indent="-228600" algn="l" defTabSz="914400" rtl="0" eaLnBrk="1" latinLnBrk="0" hangingPunct="1">
+              <a:lnSpc>
+                <a:spcPct val="90000"/>
+              </a:lnSpc>
+              <a:spcBef>
+                <a:spcPts val="500"/>
+              </a:spcBef>
+              <a:buFont typeface="Arial" panose="020B0604020202020204" pitchFamily="34" charset="0"/>
+              <a:buChar char="•"/>
+              <a:defRPr sz="1800" kern="1200">
+                <a:solidFill>
+                  <a:schemeClr val="tx1"/>
+                </a:solidFill>
+                <a:latin typeface="+mn-lt"/>
+                <a:ea typeface="+mn-ea"/>
+                <a:cs typeface="+mn-cs"/>
+              </a:defRPr>
+            </a:lvl4pPr>
+            <a:lvl5pPr marL="2057400" indent="-228600" algn="l" defTabSz="914400" rtl="0" eaLnBrk="1" latinLnBrk="0" hangingPunct="1">
+              <a:lnSpc>
+                <a:spcPct val="90000"/>
+              </a:lnSpc>
+              <a:spcBef>
+                <a:spcPts val="500"/>
+              </a:spcBef>
+              <a:buFont typeface="Arial" panose="020B0604020202020204" pitchFamily="34" charset="0"/>
+              <a:buChar char="•"/>
+              <a:defRPr sz="1800" kern="1200">
+                <a:solidFill>
+                  <a:schemeClr val="tx1"/>
+                </a:solidFill>
+                <a:latin typeface="+mn-lt"/>
+                <a:ea typeface="+mn-ea"/>
+                <a:cs typeface="+mn-cs"/>
+              </a:defRPr>
+            </a:lvl5pPr>
+            <a:lvl6pPr marL="2514600" indent="-228600" algn="l" defTabSz="914400" rtl="0" eaLnBrk="1" latinLnBrk="0" hangingPunct="1">
+              <a:lnSpc>
+                <a:spcPct val="90000"/>
+              </a:lnSpc>
+              <a:spcBef>
+                <a:spcPts val="500"/>
+              </a:spcBef>
+              <a:buFont typeface="Arial" panose="020B0604020202020204" pitchFamily="34" charset="0"/>
+              <a:buChar char="•"/>
+              <a:defRPr sz="1800" kern="1200">
+                <a:solidFill>
+                  <a:schemeClr val="tx1"/>
+                </a:solidFill>
+                <a:latin typeface="+mn-lt"/>
+                <a:ea typeface="+mn-ea"/>
+                <a:cs typeface="+mn-cs"/>
+              </a:defRPr>
+            </a:lvl6pPr>
+            <a:lvl7pPr marL="2971800" indent="-228600" algn="l" defTabSz="914400" rtl="0" eaLnBrk="1" latinLnBrk="0" hangingPunct="1">
+              <a:lnSpc>
+                <a:spcPct val="90000"/>
+              </a:lnSpc>
+              <a:spcBef>
+                <a:spcPts val="500"/>
+              </a:spcBef>
+              <a:buFont typeface="Arial" panose="020B0604020202020204" pitchFamily="34" charset="0"/>
+              <a:buChar char="•"/>
+              <a:defRPr sz="1800" kern="1200">
+                <a:solidFill>
+                  <a:schemeClr val="tx1"/>
+                </a:solidFill>
+                <a:latin typeface="+mn-lt"/>
+                <a:ea typeface="+mn-ea"/>
+                <a:cs typeface="+mn-cs"/>
+              </a:defRPr>
+            </a:lvl7pPr>
+            <a:lvl8pPr marL="3429000" indent="-228600" algn="l" defTabSz="914400" rtl="0" eaLnBrk="1" latinLnBrk="0" hangingPunct="1">
+              <a:lnSpc>
+                <a:spcPct val="90000"/>
+              </a:lnSpc>
+              <a:spcBef>
+                <a:spcPts val="500"/>
+              </a:spcBef>
+              <a:buFont typeface="Arial" panose="020B0604020202020204" pitchFamily="34" charset="0"/>
+              <a:buChar char="•"/>
+              <a:defRPr sz="1800" kern="1200">
+                <a:solidFill>
+                  <a:schemeClr val="tx1"/>
+                </a:solidFill>
+                <a:latin typeface="+mn-lt"/>
+                <a:ea typeface="+mn-ea"/>
+                <a:cs typeface="+mn-cs"/>
+              </a:defRPr>
+            </a:lvl8pPr>
+            <a:lvl9pPr marL="3886200" indent="-228600" algn="l" defTabSz="914400" rtl="0" eaLnBrk="1" latinLnBrk="0" hangingPunct="1">
+              <a:lnSpc>
+                <a:spcPct val="90000"/>
+              </a:lnSpc>
+              <a:spcBef>
+                <a:spcPts val="500"/>
+              </a:spcBef>
+              <a:buFont typeface="Arial" panose="020B0604020202020204" pitchFamily="34" charset="0"/>
+              <a:buChar char="•"/>
+              <a:defRPr sz="1800" kern="1200">
+                <a:solidFill>
+                  <a:schemeClr val="tx1"/>
+                </a:solidFill>
+                <a:latin typeface="+mn-lt"/>
+                <a:ea typeface="+mn-ea"/>
+                <a:cs typeface="+mn-cs"/>
+              </a:defRPr>
+            </a:lvl9pPr>
+          </a:lstStyle>
+          <a:p>
+            <a:pPr marL="0" indent="0">
+              <a:lnSpc>
+                <a:spcPct val="100000"/>
+              </a:lnSpc>
+              <a:spcBef>
+                <a:spcPts val="0"/>
+              </a:spcBef>
+              <a:buFont typeface="Arial" panose="020B0604020202020204" pitchFamily="34" charset="0"/>
+              <a:buNone/>
+            </a:pPr>
+            <a:endParaRPr lang="nl-NL" sz="1600" dirty="0">
+              <a:latin typeface="Courier New" panose="02070309020205020404" pitchFamily="49" charset="0"/>
+              <a:cs typeface="Courier New" panose="02070309020205020404" pitchFamily="49" charset="0"/>
+            </a:endParaRPr>
+          </a:p>
+        </p:txBody>
+      </p:sp>
+      <p:sp>
+        <p:nvSpPr>
+          <p:cNvPr id="7" name="Content Placeholder 2">
+            <a:extLst>
+              <a:ext uri="{FF2B5EF4-FFF2-40B4-BE49-F238E27FC236}">
+                <a16:creationId xmlns:a16="http://schemas.microsoft.com/office/drawing/2014/main" id="{04C3531A-A28C-33C5-982C-88EE47557481}"/>
               </a:ext>
             </a:extLst>
           </p:cNvPr>
@@ -5891,7 +5878,7 @@
         </p:spPr>
         <p:txBody>
           <a:bodyPr vert="horz" lIns="91440" tIns="45720" rIns="91440" bIns="45720" rtlCol="0">
-            <a:normAutofit/>
+            <a:normAutofit lnSpcReduction="10000"/>
           </a:bodyPr>
           <a:lstStyle>
             <a:lvl1pPr marL="228600" indent="-228600" algn="l" defTabSz="914400" rtl="0" eaLnBrk="1" latinLnBrk="0" hangingPunct="1">
@@ -6066,11 +6053,18 @@
               <a:buNone/>
             </a:pPr>
             <a:r>
+              <a:rPr lang="nl-NL" sz="1700" dirty="0" err="1">
+                <a:latin typeface="Courier New" panose="02070309020205020404" pitchFamily="49" charset="0"/>
+                <a:cs typeface="Courier New" panose="02070309020205020404" pitchFamily="49" charset="0"/>
+              </a:rPr>
+              <a:t>azure</a:t>
+            </a:r>
+            <a:r>
               <a:rPr lang="nl-NL" sz="1700" dirty="0">
                 <a:latin typeface="Courier New" panose="02070309020205020404" pitchFamily="49" charset="0"/>
                 <a:cs typeface="Courier New" panose="02070309020205020404" pitchFamily="49" charset="0"/>
               </a:rPr>
-              <a:t>project/</a:t>
+              <a:t>-database/</a:t>
             </a:r>
           </a:p>
           <a:p>
@@ -6094,6 +6088,7 @@
               <a:spcBef>
                 <a:spcPts val="0"/>
               </a:spcBef>
+              <a:buFont typeface="Arial" panose="020B0604020202020204" pitchFamily="34" charset="0"/>
               <a:buNone/>
             </a:pPr>
             <a:r>
@@ -6101,7 +6096,21 @@
                 <a:latin typeface="Courier New" panose="02070309020205020404" pitchFamily="49" charset="0"/>
                 <a:cs typeface="Courier New" panose="02070309020205020404" pitchFamily="49" charset="0"/>
               </a:rPr>
-              <a:t>├─ helpers/</a:t>
+              <a:t>├─ </a:t>
+            </a:r>
+            <a:r>
+              <a:rPr lang="nl-NL" sz="1700" dirty="0" err="1">
+                <a:latin typeface="Courier New" panose="02070309020205020404" pitchFamily="49" charset="0"/>
+                <a:cs typeface="Courier New" panose="02070309020205020404" pitchFamily="49" charset="0"/>
+              </a:rPr>
+              <a:t>src</a:t>
+            </a:r>
+            <a:r>
+              <a:rPr lang="nl-NL" sz="1700" dirty="0">
+                <a:latin typeface="Courier New" panose="02070309020205020404" pitchFamily="49" charset="0"/>
+                <a:cs typeface="Courier New" panose="02070309020205020404" pitchFamily="49" charset="0"/>
+              </a:rPr>
+              <a:t>/</a:t>
             </a:r>
           </a:p>
           <a:p>
@@ -6109,6 +6118,7 @@
               <a:spcBef>
                 <a:spcPts val="0"/>
               </a:spcBef>
+              <a:buFont typeface="Arial" panose="020B0604020202020204" pitchFamily="34" charset="0"/>
               <a:buNone/>
             </a:pPr>
             <a:r>
@@ -6116,7 +6126,7 @@
                 <a:latin typeface="Courier New" panose="02070309020205020404" pitchFamily="49" charset="0"/>
                 <a:cs typeface="Courier New" panose="02070309020205020404" pitchFamily="49" charset="0"/>
               </a:rPr>
-              <a:t>│  │  </a:t>
+              <a:t>│  │</a:t>
             </a:r>
           </a:p>
           <a:p>
@@ -6124,6 +6134,7 @@
               <a:spcBef>
                 <a:spcPts val="0"/>
               </a:spcBef>
+              <a:buFont typeface="Arial" panose="020B0604020202020204" pitchFamily="34" charset="0"/>
               <a:buNone/>
             </a:pPr>
             <a:r>
@@ -6131,7 +6142,21 @@
                 <a:latin typeface="Courier New" panose="02070309020205020404" pitchFamily="49" charset="0"/>
                 <a:cs typeface="Courier New" panose="02070309020205020404" pitchFamily="49" charset="0"/>
               </a:rPr>
-              <a:t>│  ├─ plotting.py</a:t>
+              <a:t>│  └─ </a:t>
+            </a:r>
+            <a:r>
+              <a:rPr lang="nl-NL" sz="1700" dirty="0" err="1">
+                <a:latin typeface="Courier New" panose="02070309020205020404" pitchFamily="49" charset="0"/>
+                <a:cs typeface="Courier New" panose="02070309020205020404" pitchFamily="49" charset="0"/>
+              </a:rPr>
+              <a:t>azure_database</a:t>
+            </a:r>
+            <a:r>
+              <a:rPr lang="nl-NL" sz="1700" dirty="0">
+                <a:latin typeface="Courier New" panose="02070309020205020404" pitchFamily="49" charset="0"/>
+                <a:cs typeface="Courier New" panose="02070309020205020404" pitchFamily="49" charset="0"/>
+              </a:rPr>
+              <a:t>/</a:t>
             </a:r>
           </a:p>
           <a:p>
@@ -6139,6 +6164,7 @@
               <a:spcBef>
                 <a:spcPts val="0"/>
               </a:spcBef>
+              <a:buFont typeface="Arial" panose="020B0604020202020204" pitchFamily="34" charset="0"/>
               <a:buNone/>
             </a:pPr>
             <a:r>
@@ -6146,7 +6172,7 @@
                 <a:latin typeface="Courier New" panose="02070309020205020404" pitchFamily="49" charset="0"/>
                 <a:cs typeface="Courier New" panose="02070309020205020404" pitchFamily="49" charset="0"/>
               </a:rPr>
-              <a:t>│  │</a:t>
+              <a:t>│     │</a:t>
             </a:r>
           </a:p>
           <a:p>
@@ -6162,7 +6188,7 @@
                 <a:latin typeface="Courier New" panose="02070309020205020404" pitchFamily="49" charset="0"/>
                 <a:cs typeface="Courier New" panose="02070309020205020404" pitchFamily="49" charset="0"/>
               </a:rPr>
-              <a:t>│  └─ clean_text.py</a:t>
+              <a:t>│     ├─ __init__.py</a:t>
             </a:r>
           </a:p>
           <a:p>
@@ -6170,6 +6196,7 @@
               <a:spcBef>
                 <a:spcPts val="0"/>
               </a:spcBef>
+              <a:buFont typeface="Arial" panose="020B0604020202020204" pitchFamily="34" charset="0"/>
               <a:buNone/>
             </a:pPr>
             <a:r>
@@ -6177,6 +6204,166 @@
                 <a:latin typeface="Courier New" panose="02070309020205020404" pitchFamily="49" charset="0"/>
                 <a:cs typeface="Courier New" panose="02070309020205020404" pitchFamily="49" charset="0"/>
               </a:rPr>
+              <a:t>│     │</a:t>
+            </a:r>
+          </a:p>
+          <a:p>
+            <a:pPr marL="0" indent="0">
+              <a:spcBef>
+                <a:spcPts val="0"/>
+              </a:spcBef>
+              <a:buFont typeface="Arial" panose="020B0604020202020204" pitchFamily="34" charset="0"/>
+              <a:buNone/>
+            </a:pPr>
+            <a:r>
+              <a:rPr lang="nl-NL" sz="1700" dirty="0">
+                <a:latin typeface="Courier New" panose="02070309020205020404" pitchFamily="49" charset="0"/>
+                <a:cs typeface="Courier New" panose="02070309020205020404" pitchFamily="49" charset="0"/>
+              </a:rPr>
+              <a:t>│     ├─ basic.py</a:t>
+            </a:r>
+          </a:p>
+          <a:p>
+            <a:pPr marL="0" indent="0">
+              <a:spcBef>
+                <a:spcPts val="0"/>
+              </a:spcBef>
+              <a:buFont typeface="Arial" panose="020B0604020202020204" pitchFamily="34" charset="0"/>
+              <a:buNone/>
+            </a:pPr>
+            <a:r>
+              <a:rPr lang="nl-NL" sz="1700" dirty="0">
+                <a:latin typeface="Courier New" panose="02070309020205020404" pitchFamily="49" charset="0"/>
+                <a:cs typeface="Courier New" panose="02070309020205020404" pitchFamily="49" charset="0"/>
+              </a:rPr>
+              <a:t>│     │</a:t>
+            </a:r>
+          </a:p>
+          <a:p>
+            <a:pPr marL="0" indent="0">
+              <a:spcBef>
+                <a:spcPts val="0"/>
+              </a:spcBef>
+              <a:buFont typeface="Arial" panose="020B0604020202020204" pitchFamily="34" charset="0"/>
+              <a:buNone/>
+            </a:pPr>
+            <a:r>
+              <a:rPr lang="nl-NL" sz="1700" dirty="0">
+                <a:latin typeface="Courier New" panose="02070309020205020404" pitchFamily="49" charset="0"/>
+                <a:cs typeface="Courier New" panose="02070309020205020404" pitchFamily="49" charset="0"/>
+              </a:rPr>
+              <a:t>│     ├─ errors.py</a:t>
+            </a:r>
+          </a:p>
+          <a:p>
+            <a:pPr marL="0" indent="0">
+              <a:spcBef>
+                <a:spcPts val="0"/>
+              </a:spcBef>
+              <a:buFont typeface="Arial" panose="020B0604020202020204" pitchFamily="34" charset="0"/>
+              <a:buNone/>
+            </a:pPr>
+            <a:r>
+              <a:rPr lang="nl-NL" sz="1700" dirty="0">
+                <a:latin typeface="Courier New" panose="02070309020205020404" pitchFamily="49" charset="0"/>
+                <a:cs typeface="Courier New" panose="02070309020205020404" pitchFamily="49" charset="0"/>
+              </a:rPr>
+              <a:t>│     │</a:t>
+            </a:r>
+          </a:p>
+          <a:p>
+            <a:pPr marL="0" indent="0">
+              <a:spcBef>
+                <a:spcPts val="0"/>
+              </a:spcBef>
+              <a:buFont typeface="Arial" panose="020B0604020202020204" pitchFamily="34" charset="0"/>
+              <a:buNone/>
+            </a:pPr>
+            <a:r>
+              <a:rPr lang="nl-NL" sz="1700" dirty="0">
+                <a:latin typeface="Courier New" panose="02070309020205020404" pitchFamily="49" charset="0"/>
+                <a:cs typeface="Courier New" panose="02070309020205020404" pitchFamily="49" charset="0"/>
+              </a:rPr>
+              <a:t>│     ├─ extended.py</a:t>
+            </a:r>
+          </a:p>
+          <a:p>
+            <a:pPr marL="0" indent="0">
+              <a:spcBef>
+                <a:spcPts val="0"/>
+              </a:spcBef>
+              <a:buFont typeface="Arial" panose="020B0604020202020204" pitchFamily="34" charset="0"/>
+              <a:buNone/>
+            </a:pPr>
+            <a:r>
+              <a:rPr lang="nl-NL" sz="1700" dirty="0">
+                <a:latin typeface="Courier New" panose="02070309020205020404" pitchFamily="49" charset="0"/>
+                <a:cs typeface="Courier New" panose="02070309020205020404" pitchFamily="49" charset="0"/>
+              </a:rPr>
+              <a:t>│     │</a:t>
+            </a:r>
+          </a:p>
+          <a:p>
+            <a:pPr marL="0" indent="0">
+              <a:spcBef>
+                <a:spcPts val="0"/>
+              </a:spcBef>
+              <a:buFont typeface="Arial" panose="020B0604020202020204" pitchFamily="34" charset="0"/>
+              <a:buNone/>
+            </a:pPr>
+            <a:r>
+              <a:rPr lang="nl-NL" sz="1700" dirty="0">
+                <a:latin typeface="Courier New" panose="02070309020205020404" pitchFamily="49" charset="0"/>
+                <a:cs typeface="Courier New" panose="02070309020205020404" pitchFamily="49" charset="0"/>
+              </a:rPr>
+              <a:t>│     ├─ reserved.py</a:t>
+            </a:r>
+          </a:p>
+          <a:p>
+            <a:pPr marL="0" indent="0">
+              <a:spcBef>
+                <a:spcPts val="0"/>
+              </a:spcBef>
+              <a:buFont typeface="Arial" panose="020B0604020202020204" pitchFamily="34" charset="0"/>
+              <a:buNone/>
+            </a:pPr>
+            <a:r>
+              <a:rPr lang="nl-NL" sz="1700" dirty="0">
+                <a:latin typeface="Courier New" panose="02070309020205020404" pitchFamily="49" charset="0"/>
+                <a:cs typeface="Courier New" panose="02070309020205020404" pitchFamily="49" charset="0"/>
+              </a:rPr>
+              <a:t>│     │</a:t>
+            </a:r>
+          </a:p>
+          <a:p>
+            <a:pPr marL="0" indent="0">
+              <a:spcBef>
+                <a:spcPts val="0"/>
+              </a:spcBef>
+              <a:buFont typeface="Arial" panose="020B0604020202020204" pitchFamily="34" charset="0"/>
+              <a:buNone/>
+            </a:pPr>
+            <a:r>
+              <a:rPr lang="nl-NL" sz="1700" dirty="0">
+                <a:latin typeface="Courier New" panose="02070309020205020404" pitchFamily="49" charset="0"/>
+                <a:cs typeface="Courier New" panose="02070309020205020404" pitchFamily="49" charset="0"/>
+              </a:rPr>
+              <a:t>│     └─ resultset.py</a:t>
+            </a:r>
+          </a:p>
+          <a:p>
+            <a:pPr marL="0" indent="0">
+              <a:spcBef>
+                <a:spcPts val="0"/>
+              </a:spcBef>
+              <a:buFont typeface="Arial" panose="020B0604020202020204" pitchFamily="34" charset="0"/>
+              <a:buNone/>
+            </a:pPr>
+            <a:r>
+              <a:rPr lang="nl-NL" sz="1700" dirty="0">
+                <a:latin typeface="Courier New" panose="02070309020205020404" pitchFamily="49" charset="0"/>
+                <a:cs typeface="Courier New" panose="02070309020205020404" pitchFamily="49" charset="0"/>
+              </a:rPr>
               <a:t>│</a:t>
             </a:r>
           </a:p>
@@ -6185,6 +6372,7 @@
               <a:spcBef>
                 <a:spcPts val="0"/>
               </a:spcBef>
+              <a:buFont typeface="Arial" panose="020B0604020202020204" pitchFamily="34" charset="0"/>
               <a:buNone/>
             </a:pPr>
             <a:r>
@@ -6215,50 +6403,7 @@
                 <a:latin typeface="Courier New" panose="02070309020205020404" pitchFamily="49" charset="0"/>
                 <a:cs typeface="Courier New" panose="02070309020205020404" pitchFamily="49" charset="0"/>
               </a:rPr>
-              <a:t>data_prep.ipynb</a:t>
-            </a:r>
-            <a:endParaRPr lang="nl-NL" sz="1700" dirty="0">
-              <a:latin typeface="Courier New" panose="02070309020205020404" pitchFamily="49" charset="0"/>
-              <a:cs typeface="Courier New" panose="02070309020205020404" pitchFamily="49" charset="0"/>
-            </a:endParaRPr>
-          </a:p>
-          <a:p>
-            <a:pPr marL="0" indent="0">
-              <a:spcBef>
-                <a:spcPts val="0"/>
-              </a:spcBef>
-              <a:buFont typeface="Arial" panose="020B0604020202020204" pitchFamily="34" charset="0"/>
-              <a:buNone/>
-            </a:pPr>
-            <a:r>
-              <a:rPr lang="nl-NL" sz="1700" dirty="0">
-                <a:latin typeface="Courier New" panose="02070309020205020404" pitchFamily="49" charset="0"/>
-                <a:cs typeface="Courier New" panose="02070309020205020404" pitchFamily="49" charset="0"/>
-              </a:rPr>
-              <a:t>│</a:t>
-            </a:r>
-          </a:p>
-          <a:p>
-            <a:pPr marL="0" indent="0">
-              <a:spcBef>
-                <a:spcPts val="0"/>
-              </a:spcBef>
-              <a:buFont typeface="Arial" panose="020B0604020202020204" pitchFamily="34" charset="0"/>
-              <a:buNone/>
-            </a:pPr>
-            <a:r>
-              <a:rPr lang="nl-NL" sz="1700" dirty="0">
-                <a:latin typeface="Courier New" panose="02070309020205020404" pitchFamily="49" charset="0"/>
-                <a:cs typeface="Courier New" panose="02070309020205020404" pitchFamily="49" charset="0"/>
-              </a:rPr>
-              <a:t>├─ </a:t>
-            </a:r>
-            <a:r>
-              <a:rPr lang="nl-NL" sz="1700" dirty="0" err="1">
-                <a:latin typeface="Courier New" panose="02070309020205020404" pitchFamily="49" charset="0"/>
-                <a:cs typeface="Courier New" panose="02070309020205020404" pitchFamily="49" charset="0"/>
-              </a:rPr>
-              <a:t>modelling.ipynb</a:t>
+              <a:t>pyproject.toml</a:t>
             </a:r>
             <a:endParaRPr lang="nl-NL" sz="1700" dirty="0">
               <a:latin typeface="Courier New" panose="02070309020205020404" pitchFamily="49" charset="0"/>
@@ -6302,7 +6447,7 @@
     </p:spTree>
     <p:extLst>
       <p:ext uri="{BB962C8B-B14F-4D97-AF65-F5344CB8AC3E}">
-        <p14:creationId xmlns:p14="http://schemas.microsoft.com/office/powerpoint/2010/main" val="4219705117"/>
+        <p14:creationId xmlns:p14="http://schemas.microsoft.com/office/powerpoint/2010/main" val="3000154375"/>
       </p:ext>
     </p:extLst>
   </p:cSld>
@@ -9769,12 +9914,8 @@
           <a:lstStyle/>
           <a:p>
             <a:r>
-              <a:rPr lang="nl-NL" sz="3600" dirty="0"/>
-              <a:t>Eenvoud</a:t>
-            </a:r>
-            <a:r>
               <a:rPr lang="en-US" sz="3600" dirty="0"/>
-              <a:t>: DRY </a:t>
+              <a:t>DRY </a:t>
             </a:r>
             <a:r>
               <a:rPr lang="en-US" sz="3600" dirty="0" err="1"/>
@@ -10799,7 +10940,7 @@
               <a:buNone/>
             </a:pPr>
             <a:r>
-              <a:rPr lang="en-US" sz="1600" b="1" dirty="0">
+              <a:rPr lang="en-US" sz="1400" b="1" dirty="0">
                 <a:latin typeface="Courier New" panose="02070309020205020404" pitchFamily="49" charset="0"/>
                 <a:cs typeface="Courier New" panose="02070309020205020404" pitchFamily="49" charset="0"/>
               </a:rPr>
@@ -10811,21 +10952,21 @@
               <a:buNone/>
             </a:pPr>
             <a:r>
-              <a:rPr lang="en-US" sz="1600" dirty="0">
+              <a:rPr lang="en-US" sz="1400" dirty="0">
                 <a:latin typeface="Courier New" panose="02070309020205020404" pitchFamily="49" charset="0"/>
                 <a:cs typeface="Courier New" panose="02070309020205020404" pitchFamily="49" charset="0"/>
               </a:rPr>
               <a:t>  return sum(x) / </a:t>
             </a:r>
             <a:r>
-              <a:rPr lang="en-US" sz="1600" dirty="0" err="1">
+              <a:rPr lang="en-US" sz="1400" dirty="0" err="1">
                 <a:latin typeface="Courier New" panose="02070309020205020404" pitchFamily="49" charset="0"/>
                 <a:cs typeface="Courier New" panose="02070309020205020404" pitchFamily="49" charset="0"/>
               </a:rPr>
               <a:t>len</a:t>
             </a:r>
             <a:r>
-              <a:rPr lang="en-US" sz="1600" dirty="0">
+              <a:rPr lang="en-US" sz="1400" dirty="0">
                 <a:latin typeface="Courier New" panose="02070309020205020404" pitchFamily="49" charset="0"/>
                 <a:cs typeface="Courier New" panose="02070309020205020404" pitchFamily="49" charset="0"/>
               </a:rPr>
@@ -11033,7 +11174,7 @@
         </p:spPr>
         <p:txBody>
           <a:bodyPr vert="horz" lIns="91440" tIns="45720" rIns="91440" bIns="45720" rtlCol="0">
-            <a:normAutofit fontScale="92500" lnSpcReduction="10000"/>
+            <a:noAutofit/>
           </a:bodyPr>
           <a:lstStyle>
             <a:lvl1pPr marL="228600" indent="-228600" algn="l" defTabSz="914400" rtl="0" eaLnBrk="1" latinLnBrk="0" hangingPunct="1">
@@ -11204,7 +11345,7 @@
               <a:buNone/>
             </a:pPr>
             <a:r>
-              <a:rPr lang="en-US" sz="1600" b="1" dirty="0">
+              <a:rPr lang="en-US" sz="1400" b="1" dirty="0">
                 <a:latin typeface="Courier New" panose="02070309020205020404" pitchFamily="49" charset="0"/>
                 <a:cs typeface="Courier New" panose="02070309020205020404" pitchFamily="49" charset="0"/>
               </a:rPr>
@@ -11216,7 +11357,7 @@
               <a:buNone/>
             </a:pPr>
             <a:r>
-              <a:rPr lang="en-US" sz="1600" dirty="0">
+              <a:rPr lang="en-US" sz="1400" dirty="0">
                 <a:solidFill>
                   <a:schemeClr val="accent2">
                     <a:lumMod val="75000"/>
@@ -11232,7 +11373,7 @@
             <a:pPr marL="0" indent="0">
               <a:buNone/>
             </a:pPr>
-            <a:endParaRPr lang="en-US" sz="1600" dirty="0">
+            <a:endParaRPr lang="en-US" sz="1400" dirty="0">
               <a:solidFill>
                 <a:schemeClr val="accent2">
                   <a:lumMod val="75000"/>
@@ -11247,7 +11388,7 @@
               <a:buNone/>
             </a:pPr>
             <a:r>
-              <a:rPr lang="en-US" sz="1600" dirty="0">
+              <a:rPr lang="en-US" sz="1400" dirty="0">
                 <a:solidFill>
                   <a:schemeClr val="accent2">
                     <a:lumMod val="75000"/>
@@ -11264,7 +11405,7 @@
               <a:buNone/>
             </a:pPr>
             <a:r>
-              <a:rPr lang="en-US" sz="1600" dirty="0">
+              <a:rPr lang="en-US" sz="1400" dirty="0">
                 <a:solidFill>
                   <a:schemeClr val="accent2">
                     <a:lumMod val="75000"/>
@@ -11281,7 +11422,7 @@
               <a:buNone/>
             </a:pPr>
             <a:r>
-              <a:rPr lang="en-US" sz="1600" dirty="0">
+              <a:rPr lang="en-US" sz="1400" dirty="0">
                 <a:solidFill>
                   <a:schemeClr val="accent2">
                     <a:lumMod val="75000"/>
@@ -11298,7 +11439,7 @@
               <a:buNone/>
             </a:pPr>
             <a:r>
-              <a:rPr lang="en-US" sz="1600" dirty="0">
+              <a:rPr lang="en-US" sz="1400" dirty="0">
                 <a:solidFill>
                   <a:schemeClr val="accent2">
                     <a:lumMod val="75000"/>
@@ -11307,15 +11448,15 @@
                 <a:latin typeface="Courier New" panose="02070309020205020404" pitchFamily="49" charset="0"/>
                 <a:cs typeface="Courier New" panose="02070309020205020404" pitchFamily="49" charset="0"/>
               </a:rPr>
-              <a:t>	List of numeric values, cannot</a:t>
-            </a:r>
-          </a:p>
-          <a:p>
-            <a:pPr marL="0" indent="0">
-              <a:buNone/>
-            </a:pPr>
-            <a:r>
-              <a:rPr lang="en-US" sz="1600" dirty="0">
+              <a:t>    List of numeric values, cannot</a:t>
+            </a:r>
+          </a:p>
+          <a:p>
+            <a:pPr marL="0" indent="0">
+              <a:buNone/>
+            </a:pPr>
+            <a:r>
+              <a:rPr lang="en-US" sz="1400" dirty="0">
                 <a:solidFill>
                   <a:schemeClr val="accent2">
                     <a:lumMod val="75000"/>
@@ -11324,15 +11465,15 @@
                 <a:latin typeface="Courier New" panose="02070309020205020404" pitchFamily="49" charset="0"/>
                 <a:cs typeface="Courier New" panose="02070309020205020404" pitchFamily="49" charset="0"/>
               </a:rPr>
-              <a:t>        include missing values.</a:t>
-            </a:r>
-          </a:p>
-          <a:p>
-            <a:pPr marL="0" indent="0">
-              <a:buNone/>
-            </a:pPr>
-            <a:r>
-              <a:rPr lang="en-US" sz="1600" dirty="0">
+              <a:t>    include missing values.</a:t>
+            </a:r>
+          </a:p>
+          <a:p>
+            <a:pPr marL="0" indent="0">
+              <a:buNone/>
+            </a:pPr>
+            <a:r>
+              <a:rPr lang="en-US" sz="1400" dirty="0">
                 <a:solidFill>
                   <a:schemeClr val="accent2">
                     <a:lumMod val="75000"/>
@@ -11349,7 +11490,7 @@
               <a:buNone/>
             </a:pPr>
             <a:r>
-              <a:rPr lang="en-US" sz="1600" dirty="0">
+              <a:rPr lang="en-US" sz="1400" dirty="0">
                 <a:solidFill>
                   <a:schemeClr val="accent2">
                     <a:lumMod val="75000"/>
@@ -11366,7 +11507,7 @@
               <a:buNone/>
             </a:pPr>
             <a:r>
-              <a:rPr lang="en-US" sz="1600" dirty="0">
+              <a:rPr lang="en-US" sz="1400" dirty="0">
                 <a:solidFill>
                   <a:schemeClr val="accent2">
                     <a:lumMod val="75000"/>
@@ -11383,7 +11524,7 @@
               <a:buNone/>
             </a:pPr>
             <a:r>
-              <a:rPr lang="en-US" sz="1600" dirty="0">
+              <a:rPr lang="en-US" sz="1400" dirty="0">
                 <a:solidFill>
                   <a:schemeClr val="accent2">
                     <a:lumMod val="75000"/>
@@ -11400,7 +11541,7 @@
               <a:buNone/>
             </a:pPr>
             <a:r>
-              <a:rPr lang="en-US" sz="1600" dirty="0">
+              <a:rPr lang="en-US" sz="1400" dirty="0">
                 <a:solidFill>
                   <a:schemeClr val="accent2">
                     <a:lumMod val="75000"/>
@@ -11409,15 +11550,15 @@
                 <a:latin typeface="Courier New" panose="02070309020205020404" pitchFamily="49" charset="0"/>
                 <a:cs typeface="Courier New" panose="02070309020205020404" pitchFamily="49" charset="0"/>
               </a:rPr>
-              <a:t>     Mean of the list of values.</a:t>
-            </a:r>
-          </a:p>
-          <a:p>
-            <a:pPr marL="0" indent="0">
-              <a:buNone/>
-            </a:pPr>
-            <a:r>
-              <a:rPr lang="en-US" sz="1600" dirty="0">
+              <a:t>     Mean of values.</a:t>
+            </a:r>
+          </a:p>
+          <a:p>
+            <a:pPr marL="0" indent="0">
+              <a:buNone/>
+            </a:pPr>
+            <a:r>
+              <a:rPr lang="en-US" sz="1400" dirty="0">
                 <a:solidFill>
                   <a:schemeClr val="accent2">
                     <a:lumMod val="75000"/>
@@ -11434,27 +11575,27 @@
               <a:buNone/>
             </a:pPr>
             <a:r>
-              <a:rPr lang="en-US" sz="1600" dirty="0">
+              <a:rPr lang="en-US" sz="1400" dirty="0">
                 <a:latin typeface="Courier New" panose="02070309020205020404" pitchFamily="49" charset="0"/>
                 <a:cs typeface="Courier New" panose="02070309020205020404" pitchFamily="49" charset="0"/>
               </a:rPr>
               <a:t>  return sum(values) / </a:t>
             </a:r>
             <a:r>
-              <a:rPr lang="en-US" sz="1600" dirty="0" err="1">
+              <a:rPr lang="en-US" sz="1400" dirty="0" err="1">
                 <a:latin typeface="Courier New" panose="02070309020205020404" pitchFamily="49" charset="0"/>
                 <a:cs typeface="Courier New" panose="02070309020205020404" pitchFamily="49" charset="0"/>
               </a:rPr>
               <a:t>len</a:t>
             </a:r>
             <a:r>
-              <a:rPr lang="en-US" sz="1600" dirty="0">
+              <a:rPr lang="en-US" sz="1400" dirty="0">
                 <a:latin typeface="Courier New" panose="02070309020205020404" pitchFamily="49" charset="0"/>
                 <a:cs typeface="Courier New" panose="02070309020205020404" pitchFamily="49" charset="0"/>
               </a:rPr>
               <a:t>(values)</a:t>
             </a:r>
-            <a:endParaRPr lang="en-US" sz="1600" dirty="0">
+            <a:endParaRPr lang="en-US" sz="1400" dirty="0">
               <a:solidFill>
                 <a:schemeClr val="accent6">
                   <a:lumMod val="75000"/>
@@ -11602,64 +11743,7 @@
             </a:pPr>
             <a:r>
               <a:rPr lang="nl-NL" sz="2000" b="1" dirty="0"/>
-              <a:t>Maak keuzes expliciet, bijvoorbeeld:</a:t>
-            </a:r>
-          </a:p>
-          <a:p>
-            <a:pPr>
-              <a:buFontTx/>
-              <a:buChar char="-"/>
-            </a:pPr>
-            <a:r>
-              <a:rPr lang="nl-NL" sz="2000" dirty="0"/>
-              <a:t>Wat is het doel van een class / functie?</a:t>
-            </a:r>
-          </a:p>
-          <a:p>
-            <a:pPr>
-              <a:buFontTx/>
-              <a:buChar char="-"/>
-            </a:pPr>
-            <a:r>
-              <a:rPr lang="nl-NL" sz="2000" dirty="0"/>
-              <a:t>Wat zijn geldige opties of waardes?</a:t>
-            </a:r>
-          </a:p>
-          <a:p>
-            <a:pPr>
-              <a:buFontTx/>
-              <a:buChar char="-"/>
-            </a:pPr>
-            <a:r>
-              <a:rPr lang="nl-NL" sz="2000" dirty="0"/>
-              <a:t>Wat gebeurt er bij ongeldige of ontbrekende waardes?</a:t>
-            </a:r>
-          </a:p>
-          <a:p>
-            <a:pPr marL="0" indent="0">
-              <a:buNone/>
-            </a:pPr>
-            <a:endParaRPr lang="nl-NL" sz="2000" dirty="0"/>
-          </a:p>
-          <a:p>
-            <a:pPr marL="0" indent="0">
-              <a:buNone/>
-            </a:pPr>
-            <a:endParaRPr lang="nl-NL" sz="2000" dirty="0"/>
-          </a:p>
-          <a:p>
-            <a:pPr marL="0" indent="0">
-              <a:buNone/>
-            </a:pPr>
-            <a:endParaRPr lang="nl-NL" sz="2000" dirty="0"/>
-          </a:p>
-          <a:p>
-            <a:pPr marL="0" indent="0">
-              <a:buNone/>
-            </a:pPr>
-            <a:r>
-              <a:rPr lang="nl-NL" sz="2000" b="1" dirty="0"/>
-              <a:t>Documenteer je keuzes:</a:t>
+              <a:t>Documenteer keuzes en aannames:</a:t>
             </a:r>
           </a:p>
           <a:p>
@@ -11936,21 +12020,47 @@
               <a:buNone/>
             </a:pPr>
             <a:r>
+              <a:rPr lang="en-US" sz="1600" dirty="0">
+                <a:solidFill>
+                  <a:schemeClr val="accent2">
+                    <a:lumMod val="75000"/>
+                  </a:schemeClr>
+                </a:solidFill>
+                <a:latin typeface="Courier New" panose="02070309020205020404" pitchFamily="49" charset="0"/>
+                <a:cs typeface="Courier New" panose="02070309020205020404" pitchFamily="49" charset="0"/>
+              </a:rPr>
+              <a:t>" "</a:t>
+            </a:r>
+            <a:r>
               <a:rPr lang="en-US" sz="1600" b="1" dirty="0">
                 <a:latin typeface="Courier New" panose="02070309020205020404" pitchFamily="49" charset="0"/>
                 <a:cs typeface="Courier New" panose="02070309020205020404" pitchFamily="49" charset="0"/>
               </a:rPr>
-              <a:t>" ".join(</a:t>
+              <a:t>.join</a:t>
+            </a:r>
+            <a:r>
+              <a:rPr lang="en-US" sz="1600" dirty="0">
+                <a:latin typeface="Courier New" panose="02070309020205020404" pitchFamily="49" charset="0"/>
+                <a:cs typeface="Courier New" panose="02070309020205020404" pitchFamily="49" charset="0"/>
+              </a:rPr>
+              <a:t>(</a:t>
+            </a:r>
+            <a:r>
+              <a:rPr lang="en-US" sz="1600" dirty="0" err="1">
+                <a:latin typeface="Courier New" panose="02070309020205020404" pitchFamily="49" charset="0"/>
+                <a:cs typeface="Courier New" panose="02070309020205020404" pitchFamily="49" charset="0"/>
+              </a:rPr>
+              <a:t>text_input</a:t>
             </a:r>
             <a:r>
               <a:rPr lang="en-US" sz="1600" b="1" dirty="0" err="1">
                 <a:latin typeface="Courier New" panose="02070309020205020404" pitchFamily="49" charset="0"/>
                 <a:cs typeface="Courier New" panose="02070309020205020404" pitchFamily="49" charset="0"/>
               </a:rPr>
-              <a:t>text_input.split</a:t>
-            </a:r>
-            <a:r>
-              <a:rPr lang="en-US" sz="1600" b="1" dirty="0">
+              <a:t>.split</a:t>
+            </a:r>
+            <a:r>
+              <a:rPr lang="en-US" sz="1600" dirty="0">
                 <a:latin typeface="Courier New" panose="02070309020205020404" pitchFamily="49" charset="0"/>
                 <a:cs typeface="Courier New" panose="02070309020205020404" pitchFamily="49" charset="0"/>
               </a:rPr>
@@ -12022,7 +12132,7 @@
                 <a:latin typeface="Courier New" panose="02070309020205020404" pitchFamily="49" charset="0"/>
                 <a:cs typeface="Courier New" panose="02070309020205020404" pitchFamily="49" charset="0"/>
               </a:rPr>
-              <a:t># Convert whitespace to a single space.</a:t>
+              <a:t># Compact whitespace to a single space.</a:t>
             </a:r>
           </a:p>
           <a:p>
@@ -12047,30 +12157,59 @@
               <a:buNone/>
             </a:pPr>
             <a:r>
+              <a:rPr lang="en-US" sz="1600" dirty="0">
+                <a:solidFill>
+                  <a:schemeClr val="accent2">
+                    <a:lumMod val="75000"/>
+                  </a:schemeClr>
+                </a:solidFill>
+                <a:latin typeface="Courier New" panose="02070309020205020404" pitchFamily="49" charset="0"/>
+                <a:cs typeface="Courier New" panose="02070309020205020404" pitchFamily="49" charset="0"/>
+              </a:rPr>
+              <a:t>" "</a:t>
+            </a:r>
+            <a:r>
+              <a:rPr lang="en-US" sz="1600" dirty="0">
+                <a:latin typeface="Courier New" panose="02070309020205020404" pitchFamily="49" charset="0"/>
+                <a:cs typeface="Courier New" panose="02070309020205020404" pitchFamily="49" charset="0"/>
+              </a:rPr>
+              <a:t>.</a:t>
+            </a:r>
+            <a:r>
               <a:rPr lang="en-US" sz="1600" b="1" dirty="0">
                 <a:latin typeface="Courier New" panose="02070309020205020404" pitchFamily="49" charset="0"/>
                 <a:cs typeface="Courier New" panose="02070309020205020404" pitchFamily="49" charset="0"/>
               </a:rPr>
-              <a:t>" ".join(</a:t>
+              <a:t>join</a:t>
+            </a:r>
+            <a:r>
+              <a:rPr lang="en-US" sz="1600" dirty="0">
+                <a:latin typeface="Courier New" panose="02070309020205020404" pitchFamily="49" charset="0"/>
+                <a:cs typeface="Courier New" panose="02070309020205020404" pitchFamily="49" charset="0"/>
+              </a:rPr>
+              <a:t>(</a:t>
+            </a:r>
+            <a:r>
+              <a:rPr lang="en-US" sz="1600" dirty="0" err="1">
+                <a:latin typeface="Courier New" panose="02070309020205020404" pitchFamily="49" charset="0"/>
+                <a:cs typeface="Courier New" panose="02070309020205020404" pitchFamily="49" charset="0"/>
+              </a:rPr>
+              <a:t>text_input.</a:t>
             </a:r>
             <a:r>
               <a:rPr lang="en-US" sz="1600" b="1" dirty="0" err="1">
                 <a:latin typeface="Courier New" panose="02070309020205020404" pitchFamily="49" charset="0"/>
                 <a:cs typeface="Courier New" panose="02070309020205020404" pitchFamily="49" charset="0"/>
               </a:rPr>
-              <a:t>text_input.split</a:t>
-            </a:r>
-            <a:r>
-              <a:rPr lang="en-US" sz="1600" b="1" dirty="0">
+              <a:t>split</a:t>
+            </a:r>
+            <a:r>
+              <a:rPr lang="en-US" sz="1600" dirty="0">
                 <a:latin typeface="Courier New" panose="02070309020205020404" pitchFamily="49" charset="0"/>
                 <a:cs typeface="Courier New" panose="02070309020205020404" pitchFamily="49" charset="0"/>
               </a:rPr>
               <a:t>())</a:t>
             </a:r>
-            <a:endParaRPr lang="en-US" sz="1600" dirty="0">
-              <a:latin typeface="Courier New" panose="02070309020205020404" pitchFamily="49" charset="0"/>
-              <a:cs typeface="Courier New" panose="02070309020205020404" pitchFamily="49" charset="0"/>
-            </a:endParaRPr>
           </a:p>
         </p:txBody>
       </p:sp>
@@ -12358,7 +12497,7 @@
           <a:p>
             <a:r>
               <a:rPr lang="nl-NL" sz="3600" noProof="0" dirty="0"/>
-              <a:t>Oplossing I</a:t>
+              <a:t>Oplossingen I</a:t>
             </a:r>
           </a:p>
         </p:txBody>
@@ -12395,7 +12534,7 @@
               <a:buNone/>
             </a:pPr>
             <a:r>
-              <a:rPr lang="nl-NL" sz="2000" noProof="0" dirty="0"/>
+              <a:rPr lang="nl-NL" sz="1800" noProof="0" dirty="0"/>
               <a:t>Kritiekpunten:</a:t>
             </a:r>
           </a:p>
@@ -12403,7 +12542,7 @@
             <a:pPr marL="0" indent="0">
               <a:buNone/>
             </a:pPr>
-            <a:endParaRPr lang="nl-NL" sz="2000" dirty="0"/>
+            <a:endParaRPr lang="nl-NL" sz="1800" dirty="0"/>
           </a:p>
           <a:p>
             <a:pPr>
@@ -12411,7 +12550,7 @@
               <a:buChar char="-"/>
             </a:pPr>
             <a:r>
-              <a:rPr lang="nl-NL" sz="2000" noProof="0" dirty="0"/>
+              <a:rPr lang="nl-NL" sz="1800" noProof="0" dirty="0"/>
               <a:t>Weinig / geen documentatie.</a:t>
             </a:r>
           </a:p>
@@ -12421,7 +12560,7 @@
               <a:buChar char="-"/>
             </a:pPr>
             <a:r>
-              <a:rPr lang="nl-NL" sz="2000" noProof="0" dirty="0"/>
+              <a:rPr lang="nl-NL" sz="1800" noProof="0" dirty="0"/>
               <a:t>Slechte namen voor variabelen.</a:t>
             </a:r>
           </a:p>
@@ -12431,7 +12570,7 @@
               <a:buChar char="-"/>
             </a:pPr>
             <a:r>
-              <a:rPr lang="nl-NL" sz="2000" dirty="0"/>
+              <a:rPr lang="nl-NL" sz="1800" dirty="0"/>
               <a:t>Configuratie tussen de code.</a:t>
             </a:r>
           </a:p>
@@ -12440,7 +12579,7 @@
               <a:buFontTx/>
               <a:buChar char="-"/>
             </a:pPr>
-            <a:endParaRPr lang="nl-NL" sz="2000" noProof="0" dirty="0"/>
+            <a:endParaRPr lang="nl-NL" sz="1800" noProof="0" dirty="0"/>
           </a:p>
           <a:p>
             <a:pPr>
@@ -12448,7 +12587,7 @@
               <a:buChar char="-"/>
             </a:pPr>
             <a:r>
-              <a:rPr lang="nl-NL" sz="2000" noProof="0" dirty="0"/>
+              <a:rPr lang="nl-NL" sz="1800" noProof="0" dirty="0"/>
               <a:t>Geen opsplitsing in functies.</a:t>
             </a:r>
           </a:p>
@@ -12458,7 +12597,7 @@
               <a:buChar char="-"/>
             </a:pPr>
             <a:r>
-              <a:rPr lang="nl-NL" sz="2000" dirty="0"/>
+              <a:rPr lang="nl-NL" sz="1800" dirty="0"/>
               <a:t>Heel veel herhaling.</a:t>
             </a:r>
           </a:p>
@@ -12468,7 +12607,7 @@
               <a:buChar char="-"/>
             </a:pPr>
             <a:r>
-              <a:rPr lang="nl-NL" sz="2000" noProof="0" dirty="0"/>
+              <a:rPr lang="nl-NL" sz="1800" noProof="0" dirty="0"/>
               <a:t>Onnodige conversies.</a:t>
             </a:r>
           </a:p>
@@ -12674,118 +12813,98 @@
               <a:buNone/>
             </a:pPr>
             <a:r>
+              <a:rPr lang="nl-NL" sz="1800" dirty="0"/>
+              <a:t>Taken:</a:t>
+            </a:r>
+          </a:p>
+          <a:p>
+            <a:pPr marL="0" indent="0">
+              <a:spcBef>
+                <a:spcPts val="0"/>
+              </a:spcBef>
+              <a:buFont typeface="Arial" panose="020B0604020202020204" pitchFamily="34" charset="0"/>
+              <a:buNone/>
+            </a:pPr>
+            <a:endParaRPr lang="nl-NL" sz="1800" dirty="0"/>
+          </a:p>
+          <a:p>
+            <a:pPr marL="457200" indent="-457200">
+              <a:spcBef>
+                <a:spcPts val="0"/>
+              </a:spcBef>
+              <a:buFont typeface="Arial" panose="020B0604020202020204" pitchFamily="34" charset="0"/>
+              <a:buAutoNum type="arabicPeriod"/>
+            </a:pPr>
+            <a:r>
+              <a:rPr lang="nl-NL" sz="1800" dirty="0"/>
+              <a:t>Data inlezen en filteren op datum.</a:t>
+            </a:r>
+          </a:p>
+          <a:p>
+            <a:pPr marL="457200" indent="-457200">
+              <a:spcBef>
+                <a:spcPts val="0"/>
+              </a:spcBef>
+              <a:buFont typeface="Arial" panose="020B0604020202020204" pitchFamily="34" charset="0"/>
+              <a:buAutoNum type="arabicPeriod"/>
+            </a:pPr>
+            <a:endParaRPr lang="nl-NL" sz="1800" dirty="0"/>
+          </a:p>
+          <a:p>
+            <a:pPr marL="457200" indent="-457200">
+              <a:spcBef>
+                <a:spcPts val="0"/>
+              </a:spcBef>
+              <a:buFont typeface="Arial" panose="020B0604020202020204" pitchFamily="34" charset="0"/>
+              <a:buAutoNum type="arabicPeriod"/>
+            </a:pPr>
+            <a:r>
+              <a:rPr lang="nl-NL" sz="1800" dirty="0"/>
+              <a:t>Aantal unieke klanten tellen.</a:t>
+            </a:r>
+          </a:p>
+          <a:p>
+            <a:pPr marL="457200" indent="-457200">
+              <a:spcBef>
+                <a:spcPts val="0"/>
+              </a:spcBef>
+              <a:buFont typeface="Arial" panose="020B0604020202020204" pitchFamily="34" charset="0"/>
+              <a:buAutoNum type="arabicPeriod"/>
+            </a:pPr>
+            <a:endParaRPr lang="nl-NL" sz="1800" dirty="0"/>
+          </a:p>
+          <a:p>
+            <a:pPr marL="457200" indent="-457200">
+              <a:spcBef>
+                <a:spcPts val="0"/>
+              </a:spcBef>
+              <a:buFont typeface="Arial" panose="020B0604020202020204" pitchFamily="34" charset="0"/>
+              <a:buAutoNum type="arabicPeriod"/>
+            </a:pPr>
+            <a:r>
+              <a:rPr lang="nl-NL" sz="1800" dirty="0"/>
+              <a:t>Bereken totalen voor:</a:t>
+            </a:r>
+          </a:p>
+          <a:p>
+            <a:pPr lvl="1">
+              <a:spcBef>
+                <a:spcPts val="0"/>
+              </a:spcBef>
+            </a:pPr>
+            <a:r>
               <a:rPr lang="nl-NL" sz="1600" dirty="0"/>
-              <a:t>Taken:</a:t>
-            </a:r>
-          </a:p>
-          <a:p>
-            <a:pPr marL="0" indent="0">
+              <a:t>Aantal producten.</a:t>
+            </a:r>
+          </a:p>
+          <a:p>
+            <a:pPr lvl="1">
               <a:spcBef>
                 <a:spcPts val="0"/>
               </a:spcBef>
-              <a:buFont typeface="Arial" panose="020B0604020202020204" pitchFamily="34" charset="0"/>
-              <a:buNone/>
-            </a:pPr>
-            <a:endParaRPr lang="nl-NL" sz="1600" dirty="0"/>
-          </a:p>
-          <a:p>
-            <a:pPr marL="457200" indent="-457200">
-              <a:spcBef>
-                <a:spcPts val="0"/>
-              </a:spcBef>
-              <a:buFont typeface="Arial" panose="020B0604020202020204" pitchFamily="34" charset="0"/>
-              <a:buAutoNum type="arabicPeriod"/>
             </a:pPr>
             <a:r>
               <a:rPr lang="nl-NL" sz="1600" dirty="0"/>
-              <a:t>Data inlezen en filteren op datum.</a:t>
-            </a:r>
-          </a:p>
-          <a:p>
-            <a:pPr marL="457200" indent="-457200">
-              <a:spcBef>
-                <a:spcPts val="0"/>
-              </a:spcBef>
-              <a:buFont typeface="Arial" panose="020B0604020202020204" pitchFamily="34" charset="0"/>
-              <a:buAutoNum type="arabicPeriod"/>
-            </a:pPr>
-            <a:endParaRPr lang="nl-NL" sz="1600" dirty="0"/>
-          </a:p>
-          <a:p>
-            <a:pPr marL="457200" indent="-457200">
-              <a:spcBef>
-                <a:spcPts val="0"/>
-              </a:spcBef>
-              <a:buFont typeface="Arial" panose="020B0604020202020204" pitchFamily="34" charset="0"/>
-              <a:buAutoNum type="arabicPeriod"/>
-            </a:pPr>
-            <a:endParaRPr lang="nl-NL" sz="1600" dirty="0"/>
-          </a:p>
-          <a:p>
-            <a:pPr marL="457200" indent="-457200">
-              <a:spcBef>
-                <a:spcPts val="0"/>
-              </a:spcBef>
-              <a:buFont typeface="Arial" panose="020B0604020202020204" pitchFamily="34" charset="0"/>
-              <a:buAutoNum type="arabicPeriod"/>
-            </a:pPr>
-            <a:r>
-              <a:rPr lang="nl-NL" sz="1600" dirty="0"/>
-              <a:t>Aantal unieke klanten tellen.</a:t>
-            </a:r>
-          </a:p>
-          <a:p>
-            <a:pPr marL="457200" indent="-457200">
-              <a:spcBef>
-                <a:spcPts val="0"/>
-              </a:spcBef>
-              <a:buFont typeface="Arial" panose="020B0604020202020204" pitchFamily="34" charset="0"/>
-              <a:buAutoNum type="arabicPeriod"/>
-            </a:pPr>
-            <a:endParaRPr lang="nl-NL" sz="1600" dirty="0"/>
-          </a:p>
-          <a:p>
-            <a:pPr marL="457200" indent="-457200">
-              <a:spcBef>
-                <a:spcPts val="0"/>
-              </a:spcBef>
-              <a:buFont typeface="Arial" panose="020B0604020202020204" pitchFamily="34" charset="0"/>
-              <a:buAutoNum type="arabicPeriod"/>
-            </a:pPr>
-            <a:endParaRPr lang="nl-NL" sz="1600" dirty="0"/>
-          </a:p>
-          <a:p>
-            <a:pPr marL="457200" indent="-457200">
-              <a:spcBef>
-                <a:spcPts val="0"/>
-              </a:spcBef>
-              <a:buFont typeface="Arial" panose="020B0604020202020204" pitchFamily="34" charset="0"/>
-              <a:buAutoNum type="arabicPeriod"/>
-            </a:pPr>
-            <a:r>
-              <a:rPr lang="nl-NL" sz="1600" dirty="0"/>
-              <a:t>Bereken totalen voor:</a:t>
-            </a:r>
-          </a:p>
-          <a:p>
-            <a:pPr lvl="1">
-              <a:spcBef>
-                <a:spcPts val="0"/>
-              </a:spcBef>
-            </a:pPr>
-            <a:r>
-              <a:rPr lang="nl-NL" sz="1400" dirty="0"/>
-              <a:t>Aantal producten.</a:t>
-            </a:r>
-          </a:p>
-          <a:p>
-            <a:pPr lvl="1">
-              <a:spcBef>
-                <a:spcPts val="0"/>
-              </a:spcBef>
-            </a:pPr>
-            <a:r>
-              <a:rPr lang="nl-NL" sz="1400" dirty="0"/>
               <a:t>Totale omzet.</a:t>
             </a:r>
           </a:p>
@@ -12797,7 +12916,7 @@
               <a:buFont typeface="+mj-lt"/>
               <a:buAutoNum type="arabicPeriod"/>
             </a:pPr>
-            <a:endParaRPr lang="nl-NL" sz="1600" dirty="0"/>
+            <a:endParaRPr lang="nl-NL" sz="1800" dirty="0"/>
           </a:p>
           <a:p>
             <a:pPr marL="457200" indent="-457200">
@@ -12807,7 +12926,32 @@
               <a:buFont typeface="+mj-lt"/>
               <a:buAutoNum type="arabicPeriod"/>
             </a:pPr>
-            <a:endParaRPr lang="nl-NL" sz="1600" dirty="0"/>
+            <a:r>
+              <a:rPr lang="nl-NL" sz="1800" dirty="0"/>
+              <a:t>Uitrekenen gemiddelde per klant:</a:t>
+            </a:r>
+          </a:p>
+          <a:p>
+            <a:pPr lvl="1">
+              <a:spcBef>
+                <a:spcPts val="0"/>
+              </a:spcBef>
+            </a:pPr>
+            <a:r>
+              <a:rPr lang="nl-NL" sz="1600" dirty="0"/>
+              <a:t>Aantal producten.</a:t>
+            </a:r>
+          </a:p>
+          <a:p>
+            <a:pPr lvl="1">
+              <a:spcBef>
+                <a:spcPts val="0"/>
+              </a:spcBef>
+            </a:pPr>
+            <a:r>
+              <a:rPr lang="nl-NL" sz="1600" dirty="0"/>
+              <a:t>Totale omzet.</a:t>
+            </a:r>
           </a:p>
           <a:p>
             <a:pPr marL="457200" indent="-457200">
@@ -12817,32 +12961,7 @@
               <a:buFont typeface="+mj-lt"/>
               <a:buAutoNum type="arabicPeriod"/>
             </a:pPr>
-            <a:r>
-              <a:rPr lang="nl-NL" sz="1600" dirty="0"/>
-              <a:t>Uitrekenen gemiddelde per klant:</a:t>
-            </a:r>
-          </a:p>
-          <a:p>
-            <a:pPr lvl="1">
-              <a:spcBef>
-                <a:spcPts val="0"/>
-              </a:spcBef>
-            </a:pPr>
-            <a:r>
-              <a:rPr lang="nl-NL" sz="1400" dirty="0"/>
-              <a:t>Aantal producten.</a:t>
-            </a:r>
-          </a:p>
-          <a:p>
-            <a:pPr lvl="1">
-              <a:spcBef>
-                <a:spcPts val="0"/>
-              </a:spcBef>
-            </a:pPr>
-            <a:r>
-              <a:rPr lang="nl-NL" sz="1400" dirty="0"/>
-              <a:t>Totale omzet.</a:t>
-            </a:r>
+            <a:endParaRPr lang="nl-NL" sz="1800" dirty="0"/>
           </a:p>
           <a:p>
             <a:pPr marL="457200" indent="-457200">
@@ -12852,56 +12971,36 @@
               <a:buFont typeface="+mj-lt"/>
               <a:buAutoNum type="arabicPeriod"/>
             </a:pPr>
-            <a:endParaRPr lang="nl-NL" sz="1600" dirty="0"/>
-          </a:p>
-          <a:p>
-            <a:pPr marL="457200" indent="-457200">
+            <a:r>
+              <a:rPr lang="nl-NL" sz="1800" dirty="0"/>
+              <a:t>Hoogste omzet voor:</a:t>
+            </a:r>
+          </a:p>
+          <a:p>
+            <a:pPr lvl="1">
+              <a:lnSpc>
+                <a:spcPct val="100000"/>
+              </a:lnSpc>
               <a:spcBef>
                 <a:spcPts val="0"/>
               </a:spcBef>
-              <a:buFont typeface="+mj-lt"/>
-              <a:buAutoNum type="arabicPeriod"/>
-            </a:pPr>
-            <a:endParaRPr lang="nl-NL" sz="1600" dirty="0"/>
-          </a:p>
-          <a:p>
-            <a:pPr marL="457200" indent="-457200">
+            </a:pPr>
+            <a:r>
+              <a:rPr lang="nl-NL" sz="1600" dirty="0"/>
+              <a:t>Klant</a:t>
+            </a:r>
+          </a:p>
+          <a:p>
+            <a:pPr lvl="1">
+              <a:lnSpc>
+                <a:spcPct val="100000"/>
+              </a:lnSpc>
               <a:spcBef>
                 <a:spcPts val="0"/>
               </a:spcBef>
-              <a:buFont typeface="+mj-lt"/>
-              <a:buAutoNum type="arabicPeriod"/>
             </a:pPr>
             <a:r>
               <a:rPr lang="nl-NL" sz="1600" dirty="0"/>
-              <a:t>Hoogste omzet voor:</a:t>
-            </a:r>
-          </a:p>
-          <a:p>
-            <a:pPr lvl="1">
-              <a:lnSpc>
-                <a:spcPct val="100000"/>
-              </a:lnSpc>
-              <a:spcBef>
-                <a:spcPts val="0"/>
-              </a:spcBef>
-            </a:pPr>
-            <a:r>
-              <a:rPr lang="nl-NL" sz="1400" dirty="0"/>
-              <a:t>Klant</a:t>
-            </a:r>
-          </a:p>
-          <a:p>
-            <a:pPr lvl="1">
-              <a:lnSpc>
-                <a:spcPct val="100000"/>
-              </a:lnSpc>
-              <a:spcBef>
-                <a:spcPts val="0"/>
-              </a:spcBef>
-            </a:pPr>
-            <a:r>
-              <a:rPr lang="nl-NL" sz="1400" dirty="0"/>
               <a:t>Product</a:t>
             </a:r>
           </a:p>
@@ -15312,7 +15411,7 @@
                 <a:latin typeface="Courier New" panose="02070309020205020404" pitchFamily="49" charset="0"/>
                 <a:cs typeface="Courier New" panose="02070309020205020404" pitchFamily="49" charset="0"/>
               </a:rPr>
-              <a:t># Log message using the root logger</a:t>
+              <a:t># Log message through the root logger.</a:t>
             </a:r>
           </a:p>
           <a:p>
@@ -15369,7 +15468,7 @@
                 <a:latin typeface="Courier New" panose="02070309020205020404" pitchFamily="49" charset="0"/>
                 <a:cs typeface="Courier New" panose="02070309020205020404" pitchFamily="49" charset="0"/>
               </a:rPr>
-              <a:t># Get reference to root logger</a:t>
+              <a:t># Get reference to root logger.</a:t>
             </a:r>
           </a:p>
           <a:p>
@@ -15463,7 +15562,7 @@
                 <a:latin typeface="Courier New" panose="02070309020205020404" pitchFamily="49" charset="0"/>
                 <a:cs typeface="Courier New" panose="02070309020205020404" pitchFamily="49" charset="0"/>
               </a:rPr>
-              <a:t># Configure the root logger</a:t>
+              <a:t># Configure the root logger.</a:t>
             </a:r>
           </a:p>
           <a:p>
@@ -17272,43 +17371,6 @@
               </a:defRPr>
             </a:lvl9pPr>
           </a:lstStyle>
-          <a:p>
-            <a:pPr marL="0" indent="0">
-              <a:buNone/>
-            </a:pPr>
-            <a:r>
-              <a:rPr lang="nl-NL" sz="2000" dirty="0">
-                <a:latin typeface="Courier New" panose="02070309020205020404" pitchFamily="49" charset="0"/>
-                <a:cs typeface="Courier New" panose="02070309020205020404" pitchFamily="49" charset="0"/>
-              </a:rPr>
-              <a:t>Logger</a:t>
-            </a:r>
-            <a:r>
-              <a:rPr lang="nl-NL" sz="2000" dirty="0"/>
-              <a:t> kan zowel berichten maken als ontvangen.</a:t>
-            </a:r>
-          </a:p>
-          <a:p>
-            <a:pPr marL="0" indent="0">
-              <a:buNone/>
-            </a:pPr>
-            <a:endParaRPr lang="nl-NL" sz="2000" dirty="0"/>
-          </a:p>
-          <a:p>
-            <a:pPr marL="0" indent="0">
-              <a:buNone/>
-            </a:pPr>
-            <a:r>
-              <a:rPr lang="nl-NL" sz="2000" dirty="0"/>
-              <a:t>Berichten doorgestuurd via hiërarchie, eindigen bij root logger.</a:t>
-            </a:r>
-          </a:p>
-          <a:p>
-            <a:pPr marL="0" indent="0">
-              <a:buNone/>
-            </a:pPr>
-            <a:endParaRPr lang="nl-NL" sz="2000" dirty="0"/>
-          </a:p>
           <a:p>
             <a:pPr marL="0" indent="0">
               <a:buNone/>
@@ -18053,43 +18115,6 @@
             </a:pPr>
             <a:r>
               <a:rPr lang="nl-NL" sz="2000" dirty="0">
-                <a:latin typeface="Courier New" panose="02070309020205020404" pitchFamily="49" charset="0"/>
-                <a:cs typeface="Courier New" panose="02070309020205020404" pitchFamily="49" charset="0"/>
-              </a:rPr>
-              <a:t>Logger</a:t>
-            </a:r>
-            <a:r>
-              <a:rPr lang="nl-NL" sz="2000" dirty="0"/>
-              <a:t> kan zowel berichten maken als ontvangen.</a:t>
-            </a:r>
-          </a:p>
-          <a:p>
-            <a:pPr marL="0" indent="0">
-              <a:buNone/>
-            </a:pPr>
-            <a:endParaRPr lang="nl-NL" sz="2000" dirty="0"/>
-          </a:p>
-          <a:p>
-            <a:pPr marL="0" indent="0">
-              <a:buNone/>
-            </a:pPr>
-            <a:r>
-              <a:rPr lang="nl-NL" sz="2000" dirty="0"/>
-              <a:t>Berichten doorgestuurd via hiërarchie, eindigen bij root logger.</a:t>
-            </a:r>
-          </a:p>
-          <a:p>
-            <a:pPr marL="0" indent="0">
-              <a:buNone/>
-            </a:pPr>
-            <a:endParaRPr lang="nl-NL" sz="2000" dirty="0"/>
-          </a:p>
-          <a:p>
-            <a:pPr marL="0" indent="0">
-              <a:buNone/>
-            </a:pPr>
-            <a:r>
-              <a:rPr lang="nl-NL" sz="2000" dirty="0">
                 <a:cs typeface="Courier New" panose="02070309020205020404" pitchFamily="49" charset="0"/>
               </a:rPr>
               <a:t>Een </a:t>
@@ -18104,6 +18129,32 @@
             <a:r>
               <a:rPr lang="nl-NL" sz="2000" dirty="0"/>
               <a:t> zorgt voor het wegschrijven van berichten.</a:t>
+            </a:r>
+          </a:p>
+          <a:p>
+            <a:pPr marL="0" indent="0">
+              <a:buNone/>
+            </a:pPr>
+            <a:endParaRPr lang="nl-NL" sz="2000" dirty="0"/>
+          </a:p>
+          <a:p>
+            <a:pPr marL="0" indent="0">
+              <a:buNone/>
+            </a:pPr>
+            <a:r>
+              <a:rPr lang="nl-NL" sz="2000" dirty="0"/>
+              <a:t>De root logger heeft standaard een </a:t>
+            </a:r>
+            <a:r>
+              <a:rPr lang="nl-NL" sz="2000" dirty="0" err="1">
+                <a:latin typeface="Courier New" panose="02070309020205020404" pitchFamily="49" charset="0"/>
+                <a:cs typeface="Courier New" panose="02070309020205020404" pitchFamily="49" charset="0"/>
+              </a:rPr>
+              <a:t>StreamHandler</a:t>
+            </a:r>
+            <a:r>
+              <a:rPr lang="nl-NL" sz="2000" dirty="0"/>
+              <a:t>.</a:t>
             </a:r>
           </a:p>
           <a:p>
@@ -18924,71 +18975,6 @@
               <a:buNone/>
             </a:pPr>
             <a:r>
-              <a:rPr lang="nl-NL" sz="2000" dirty="0">
-                <a:latin typeface="Courier New" panose="02070309020205020404" pitchFamily="49" charset="0"/>
-                <a:cs typeface="Courier New" panose="02070309020205020404" pitchFamily="49" charset="0"/>
-              </a:rPr>
-              <a:t>Logger</a:t>
-            </a:r>
-            <a:r>
-              <a:rPr lang="nl-NL" sz="2000" dirty="0"/>
-              <a:t> kan zowel berichten maken als ontvangen.</a:t>
-            </a:r>
-          </a:p>
-          <a:p>
-            <a:pPr marL="0" indent="0">
-              <a:buNone/>
-            </a:pPr>
-            <a:endParaRPr lang="nl-NL" sz="2000" dirty="0"/>
-          </a:p>
-          <a:p>
-            <a:pPr marL="0" indent="0">
-              <a:buNone/>
-            </a:pPr>
-            <a:r>
-              <a:rPr lang="nl-NL" sz="2000" dirty="0"/>
-              <a:t>Berichten doorgestuurd via hiërarchie, eindigen bij root logger.</a:t>
-            </a:r>
-          </a:p>
-          <a:p>
-            <a:pPr marL="0" indent="0">
-              <a:buNone/>
-            </a:pPr>
-            <a:endParaRPr lang="nl-NL" sz="2000" dirty="0"/>
-          </a:p>
-          <a:p>
-            <a:pPr marL="0" indent="0">
-              <a:buNone/>
-            </a:pPr>
-            <a:r>
-              <a:rPr lang="nl-NL" sz="2000" dirty="0">
-                <a:cs typeface="Courier New" panose="02070309020205020404" pitchFamily="49" charset="0"/>
-              </a:rPr>
-              <a:t>Een </a:t>
-            </a:r>
-            <a:r>
-              <a:rPr lang="nl-NL" sz="2000" dirty="0">
-                <a:latin typeface="Courier New" panose="02070309020205020404" pitchFamily="49" charset="0"/>
-                <a:cs typeface="Courier New" panose="02070309020205020404" pitchFamily="49" charset="0"/>
-              </a:rPr>
-              <a:t>Handler</a:t>
-            </a:r>
-            <a:r>
-              <a:rPr lang="nl-NL" sz="2000" dirty="0"/>
-              <a:t> zorgt voor het wegschrijven van berichten.</a:t>
-            </a:r>
-          </a:p>
-          <a:p>
-            <a:pPr marL="0" indent="0">
-              <a:buNone/>
-            </a:pPr>
-            <a:endParaRPr lang="nl-NL" sz="2000" dirty="0"/>
-          </a:p>
-          <a:p>
-            <a:pPr marL="0" indent="0">
-              <a:buNone/>
-            </a:pPr>
-            <a:r>
               <a:rPr lang="nl-NL" sz="2000" dirty="0"/>
               <a:t>Een </a:t>
             </a:r>
@@ -19003,6 +18989,60 @@
               <a:rPr lang="nl-NL" sz="2000" dirty="0"/>
               <a:t> verzorgt de opmaak van de logberichten.</a:t>
             </a:r>
+          </a:p>
+          <a:p>
+            <a:pPr marL="0" indent="0">
+              <a:buNone/>
+            </a:pPr>
+            <a:endParaRPr lang="nl-NL" sz="2000" dirty="0"/>
+          </a:p>
+          <a:p>
+            <a:pPr marL="0" indent="0">
+              <a:buNone/>
+            </a:pPr>
+            <a:r>
+              <a:rPr lang="nl-NL" sz="2000" dirty="0"/>
+              <a:t>De </a:t>
+            </a:r>
+            <a:r>
+              <a:rPr lang="nl-NL" sz="2000" dirty="0" err="1">
+                <a:latin typeface="Courier New" panose="02070309020205020404" pitchFamily="49" charset="0"/>
+                <a:cs typeface="Courier New" panose="02070309020205020404" pitchFamily="49" charset="0"/>
+              </a:rPr>
+              <a:t>Formatter</a:t>
+            </a:r>
+            <a:r>
+              <a:rPr lang="nl-NL" sz="2000" dirty="0"/>
+              <a:t> koppel je aan de </a:t>
+            </a:r>
+            <a:r>
+              <a:rPr lang="nl-NL" sz="2000" dirty="0" err="1">
+                <a:latin typeface="Courier New" panose="02070309020205020404" pitchFamily="49" charset="0"/>
+                <a:cs typeface="Courier New" panose="02070309020205020404" pitchFamily="49" charset="0"/>
+              </a:rPr>
+              <a:t>Handler</a:t>
+            </a:r>
+            <a:r>
+              <a:rPr lang="nl-NL" sz="2000" dirty="0"/>
+              <a:t> van een </a:t>
+            </a:r>
+            <a:r>
+              <a:rPr lang="nl-NL" sz="2000" dirty="0">
+                <a:latin typeface="Courier New" panose="02070309020205020404" pitchFamily="49" charset="0"/>
+                <a:cs typeface="Courier New" panose="02070309020205020404" pitchFamily="49" charset="0"/>
+              </a:rPr>
+              <a:t>Logger</a:t>
+            </a:r>
+            <a:r>
+              <a:rPr lang="nl-NL" sz="2000" dirty="0"/>
+              <a:t>.</a:t>
+            </a:r>
+          </a:p>
+          <a:p>
+            <a:pPr marL="0" indent="0">
+              <a:buNone/>
+            </a:pPr>
+            <a:endParaRPr lang="nl-NL" sz="2000" dirty="0"/>
           </a:p>
         </p:txBody>
       </p:sp>
@@ -21758,11 +21798,11 @@
             </a:pPr>
             <a:r>
               <a:rPr lang="nl-NL" sz="1800" dirty="0"/>
-              <a:t>Meldingen leggen uit wat er mis</a:t>
+              <a:t>Vertellen wat en waar iets fout ging</a:t>
             </a:r>
             <a:r>
               <a:rPr lang="nl-NL" sz="1800" noProof="0" dirty="0"/>
-              <a:t> is gegaan.</a:t>
+              <a:t>.</a:t>
             </a:r>
           </a:p>
           <a:p>
@@ -21777,7 +21817,7 @@
             </a:pPr>
             <a:r>
               <a:rPr lang="nl-NL" sz="1800" noProof="0" dirty="0"/>
-              <a:t>Foutmeldingen soms lang / complex. </a:t>
+              <a:t>Meldingen kunnen lang en complex zijn. </a:t>
             </a:r>
           </a:p>
           <a:p>
@@ -21833,13 +21873,8 @@
             </a:pPr>
             <a:r>
               <a:rPr lang="nl-NL" sz="1600" dirty="0"/>
-              <a:t>Omschrijving:	    Optellen int </a:t>
-            </a:r>
-            <a:r>
-              <a:rPr lang="nl-NL" sz="1600"/>
-              <a:t>en None</a:t>
-            </a:r>
-            <a:endParaRPr lang="nl-NL" sz="1600" dirty="0"/>
+              <a:t>Omschrijving:	    Optellen int en None</a:t>
+            </a:r>
           </a:p>
           <a:p>
             <a:pPr marL="0" indent="0">
@@ -22820,11 +22855,30 @@
               <a:buNone/>
             </a:pPr>
             <a:r>
-              <a:rPr lang="en-US" sz="1400" b="1" noProof="0" dirty="0">
-                <a:latin typeface="Courier New" panose="02070309020205020404" pitchFamily="49" charset="0"/>
-                <a:cs typeface="Courier New" panose="02070309020205020404" pitchFamily="49" charset="0"/>
-              </a:rPr>
-              <a:t>if __name__ == "__main__":</a:t>
+              <a:rPr lang="en-US" sz="1400" noProof="0" dirty="0">
+                <a:latin typeface="Courier New" panose="02070309020205020404" pitchFamily="49" charset="0"/>
+                <a:cs typeface="Courier New" panose="02070309020205020404" pitchFamily="49" charset="0"/>
+              </a:rPr>
+              <a:t>if __name__ == </a:t>
+            </a:r>
+            <a:r>
+              <a:rPr lang="en-US" sz="1400" noProof="0" dirty="0">
+                <a:solidFill>
+                  <a:schemeClr val="accent2">
+                    <a:lumMod val="75000"/>
+                  </a:schemeClr>
+                </a:solidFill>
+                <a:latin typeface="Courier New" panose="02070309020205020404" pitchFamily="49" charset="0"/>
+                <a:cs typeface="Courier New" panose="02070309020205020404" pitchFamily="49" charset="0"/>
+              </a:rPr>
+              <a:t>"__main__"</a:t>
+            </a:r>
+            <a:r>
+              <a:rPr lang="en-US" sz="1400" noProof="0" dirty="0">
+                <a:latin typeface="Courier New" panose="02070309020205020404" pitchFamily="49" charset="0"/>
+                <a:cs typeface="Courier New" panose="02070309020205020404" pitchFamily="49" charset="0"/>
+              </a:rPr>
+              <a:t>:</a:t>
             </a:r>
           </a:p>
           <a:p>
@@ -24804,11 +24858,30 @@
               <a:buNone/>
             </a:pPr>
             <a:r>
-              <a:rPr lang="en-US" sz="1400" b="1" noProof="0" dirty="0">
-                <a:latin typeface="Courier New" panose="02070309020205020404" pitchFamily="49" charset="0"/>
-                <a:cs typeface="Courier New" panose="02070309020205020404" pitchFamily="49" charset="0"/>
-              </a:rPr>
-              <a:t>if __name__ == "__main__":</a:t>
+              <a:rPr lang="en-US" sz="1400" noProof="0" dirty="0">
+                <a:latin typeface="Courier New" panose="02070309020205020404" pitchFamily="49" charset="0"/>
+                <a:cs typeface="Courier New" panose="02070309020205020404" pitchFamily="49" charset="0"/>
+              </a:rPr>
+              <a:t>if __name__ == </a:t>
+            </a:r>
+            <a:r>
+              <a:rPr lang="en-US" sz="1400" noProof="0" dirty="0">
+                <a:solidFill>
+                  <a:schemeClr val="accent2">
+                    <a:lumMod val="75000"/>
+                  </a:schemeClr>
+                </a:solidFill>
+                <a:latin typeface="Courier New" panose="02070309020205020404" pitchFamily="49" charset="0"/>
+                <a:cs typeface="Courier New" panose="02070309020205020404" pitchFamily="49" charset="0"/>
+              </a:rPr>
+              <a:t>"__main__"</a:t>
+            </a:r>
+            <a:r>
+              <a:rPr lang="en-US" sz="1400" noProof="0" dirty="0">
+                <a:latin typeface="Courier New" panose="02070309020205020404" pitchFamily="49" charset="0"/>
+                <a:cs typeface="Courier New" panose="02070309020205020404" pitchFamily="49" charset="0"/>
+              </a:rPr>
+              <a:t>:</a:t>
             </a:r>
           </a:p>
           <a:p>
@@ -27022,7 +27095,7 @@
               <a:t>(</a:t>
             </a:r>
             <a:r>
-              <a:rPr lang="en-US" sz="1600" b="1" dirty="0" err="1">
+              <a:rPr lang="en-US" sz="1600" dirty="0" err="1">
                 <a:latin typeface="Courier New" panose="02070309020205020404" pitchFamily="49" charset="0"/>
                 <a:cs typeface="Courier New" panose="02070309020205020404" pitchFamily="49" charset="0"/>
               </a:rPr>
@@ -27036,7 +27109,7 @@
               <a:t>, </a:t>
             </a:r>
             <a:r>
-              <a:rPr lang="en-US" sz="1600" b="1" dirty="0" err="1">
+              <a:rPr lang="en-US" sz="1600" dirty="0" err="1">
                 <a:latin typeface="Courier New" panose="02070309020205020404" pitchFamily="49" charset="0"/>
                 <a:cs typeface="Courier New" panose="02070309020205020404" pitchFamily="49" charset="0"/>
               </a:rPr>
@@ -27634,7 +27707,7 @@
               <a:t>(</a:t>
             </a:r>
             <a:r>
-              <a:rPr lang="en-US" sz="1600" b="1" dirty="0" err="1">
+              <a:rPr lang="en-US" sz="1600" dirty="0" err="1">
                 <a:latin typeface="Courier New" panose="02070309020205020404" pitchFamily="49" charset="0"/>
                 <a:cs typeface="Courier New" panose="02070309020205020404" pitchFamily="49" charset="0"/>
               </a:rPr>
@@ -27648,7 +27721,7 @@
               <a:t>, </a:t>
             </a:r>
             <a:r>
-              <a:rPr lang="en-US" sz="1600" b="1" dirty="0" err="1">
+              <a:rPr lang="en-US" sz="1600" dirty="0" err="1">
                 <a:latin typeface="Courier New" panose="02070309020205020404" pitchFamily="49" charset="0"/>
                 <a:cs typeface="Courier New" panose="02070309020205020404" pitchFamily="49" charset="0"/>
               </a:rPr>
@@ -28362,21 +28435,21 @@
               <a:t>(</a:t>
             </a:r>
             <a:r>
-              <a:rPr lang="en-US" sz="1600" b="1" dirty="0" err="1">
+              <a:rPr lang="en-US" sz="1600" dirty="0" err="1">
                 <a:latin typeface="Courier New" panose="02070309020205020404" pitchFamily="49" charset="0"/>
                 <a:cs typeface="Courier New" panose="02070309020205020404" pitchFamily="49" charset="0"/>
               </a:rPr>
               <a:t>TypeError</a:t>
             </a:r>
             <a:r>
-              <a:rPr lang="en-US" sz="1600" b="1" dirty="0">
+              <a:rPr lang="en-US" sz="1600" dirty="0">
                 <a:latin typeface="Courier New" panose="02070309020205020404" pitchFamily="49" charset="0"/>
                 <a:cs typeface="Courier New" panose="02070309020205020404" pitchFamily="49" charset="0"/>
               </a:rPr>
               <a:t>, </a:t>
             </a:r>
             <a:r>
-              <a:rPr lang="en-US" sz="1600" b="1" dirty="0" err="1">
+              <a:rPr lang="en-US" sz="1600" dirty="0" err="1">
                 <a:latin typeface="Courier New" panose="02070309020205020404" pitchFamily="49" charset="0"/>
                 <a:cs typeface="Courier New" panose="02070309020205020404" pitchFamily="49" charset="0"/>
               </a:rPr>
@@ -29041,6 +29114,11 @@
             </a:r>
             <a:r>
               <a:rPr lang="nl-NL" sz="1600" dirty="0" err="1">
+                <a:solidFill>
+                  <a:schemeClr val="accent1">
+                    <a:lumMod val="75000"/>
+                  </a:schemeClr>
+                </a:solidFill>
                 <a:latin typeface="Courier New" panose="02070309020205020404" pitchFamily="49" charset="0"/>
                 <a:cs typeface="Courier New" panose="02070309020205020404" pitchFamily="49" charset="0"/>
               </a:rPr>
@@ -29072,6 +29150,11 @@
             </a:r>
             <a:r>
               <a:rPr lang="nl-NL" sz="1600" dirty="0">
+                <a:solidFill>
+                  <a:schemeClr val="accent1">
+                    <a:lumMod val="75000"/>
+                  </a:schemeClr>
+                </a:solidFill>
                 <a:latin typeface="Courier New" panose="02070309020205020404" pitchFamily="49" charset="0"/>
                 <a:cs typeface="Courier New" panose="02070309020205020404" pitchFamily="49" charset="0"/>
               </a:rPr>
@@ -29079,6 +29162,11 @@
             </a:r>
             <a:r>
               <a:rPr lang="nl-NL" sz="1600" dirty="0" err="1">
+                <a:solidFill>
+                  <a:schemeClr val="accent1">
+                    <a:lumMod val="75000"/>
+                  </a:schemeClr>
+                </a:solidFill>
                 <a:latin typeface="Courier New" panose="02070309020205020404" pitchFamily="49" charset="0"/>
                 <a:cs typeface="Courier New" panose="02070309020205020404" pitchFamily="49" charset="0"/>
               </a:rPr>
@@ -29086,6 +29174,11 @@
             </a:r>
             <a:r>
               <a:rPr lang="nl-NL" sz="1600" dirty="0">
+                <a:solidFill>
+                  <a:schemeClr val="accent1">
+                    <a:lumMod val="75000"/>
+                  </a:schemeClr>
+                </a:solidFill>
                 <a:latin typeface="Courier New" panose="02070309020205020404" pitchFamily="49" charset="0"/>
                 <a:cs typeface="Courier New" panose="02070309020205020404" pitchFamily="49" charset="0"/>
               </a:rPr>
@@ -30588,7 +30681,7 @@
           <a:p>
             <a:r>
               <a:rPr lang="nl-NL" sz="3600" noProof="0" dirty="0"/>
-              <a:t>Leesbaar: PEP8 richtlijnen</a:t>
+              <a:t>PEP8 richtlijnen</a:t>
             </a:r>
           </a:p>
         </p:txBody>
@@ -31648,6 +31741,58 @@
       </p:grpSpPr>
       <p:sp>
         <p:nvSpPr>
+          <p:cNvPr id="7" name="Rectangle 6">
+            <a:extLst>
+              <a:ext uri="{FF2B5EF4-FFF2-40B4-BE49-F238E27FC236}">
+                <a16:creationId xmlns:a16="http://schemas.microsoft.com/office/drawing/2014/main" id="{77CA4475-4F6B-2A89-887C-A079290E533C}"/>
+              </a:ext>
+            </a:extLst>
+          </p:cNvPr>
+          <p:cNvSpPr/>
+          <p:nvPr/>
+        </p:nvSpPr>
+        <p:spPr>
+          <a:xfrm>
+            <a:off x="7600950" y="2174966"/>
+            <a:ext cx="4292599" cy="4001997"/>
+          </a:xfrm>
+          <a:prstGeom prst="rect">
+            <a:avLst/>
+          </a:prstGeom>
+          <a:solidFill>
+            <a:schemeClr val="bg1">
+              <a:lumMod val="95000"/>
+            </a:schemeClr>
+          </a:solidFill>
+          <a:ln w="3175"/>
+        </p:spPr>
+        <p:style>
+          <a:lnRef idx="2">
+            <a:schemeClr val="accent3">
+              <a:shade val="15000"/>
+            </a:schemeClr>
+          </a:lnRef>
+          <a:fillRef idx="1">
+            <a:schemeClr val="accent3"/>
+          </a:fillRef>
+          <a:effectRef idx="0">
+            <a:schemeClr val="accent3"/>
+          </a:effectRef>
+          <a:fontRef idx="minor">
+            <a:schemeClr val="lt1"/>
+          </a:fontRef>
+        </p:style>
+        <p:txBody>
+          <a:bodyPr rtlCol="0" anchor="ctr"/>
+          <a:lstStyle/>
+          <a:p>
+            <a:pPr algn="ctr"/>
+            <a:endParaRPr lang="en-NL"/>
+          </a:p>
+        </p:txBody>
+      </p:sp>
+      <p:sp>
+        <p:nvSpPr>
           <p:cNvPr id="2" name="Title 1">
             <a:extLst>
               <a:ext uri="{FF2B5EF4-FFF2-40B4-BE49-F238E27FC236}">
@@ -31810,8 +31955,8 @@
         </p:nvSpPr>
         <p:spPr>
           <a:xfrm>
-            <a:off x="7600950" y="2616200"/>
-            <a:ext cx="4292600" cy="3560764"/>
+            <a:off x="7600950" y="2174966"/>
+            <a:ext cx="4292600" cy="4001998"/>
           </a:xfrm>
           <a:prstGeom prst="rect">
             <a:avLst/>
@@ -31840,7 +31985,21 @@
           <a:lstStyle/>
           <a:p>
             <a:r>
-              <a:rPr lang="en-US" sz="1200" b="1" dirty="0">
+              <a:rPr lang="en-US" sz="1200" dirty="0">
+                <a:solidFill>
+                  <a:schemeClr val="accent2">
+                    <a:lumMod val="75000"/>
+                  </a:schemeClr>
+                </a:solidFill>
+                <a:latin typeface="Courier New" panose="02070309020205020404" pitchFamily="49" charset="0"/>
+                <a:cs typeface="Courier New" panose="02070309020205020404" pitchFamily="49" charset="0"/>
+              </a:rPr>
+              <a:t>"""Unit tests for helper functions."""</a:t>
+            </a:r>
+          </a:p>
+          <a:p>
+            <a:r>
+              <a:rPr lang="en-US" sz="1200" dirty="0">
                 <a:latin typeface="Courier New" panose="02070309020205020404" pitchFamily="49" charset="0"/>
                 <a:cs typeface="Courier New" panose="02070309020205020404" pitchFamily="49" charset="0"/>
               </a:rPr>
@@ -31861,7 +32020,10 @@
           </a:p>
           <a:p>
             <a:r>
-              <a:rPr lang="en-US" sz="1200" b="1" dirty="0">
+              <a:rPr lang="en-US" sz="1200" dirty="0">
+                <a:solidFill>
+                  <a:schemeClr val="tx1"/>
+                </a:solidFill>
                 <a:latin typeface="Courier New" panose="02070309020205020404" pitchFamily="49" charset="0"/>
                 <a:cs typeface="Courier New" panose="02070309020205020404" pitchFamily="49" charset="0"/>
               </a:rPr>
@@ -31870,9 +32032,7 @@
             <a:r>
               <a:rPr lang="en-US" sz="1200" b="1" dirty="0" err="1">
                 <a:solidFill>
-                  <a:schemeClr val="accent5">
-                    <a:lumMod val="75000"/>
-                  </a:schemeClr>
+                  <a:schemeClr val="tx1"/>
                 </a:solidFill>
                 <a:latin typeface="Courier New" panose="02070309020205020404" pitchFamily="49" charset="0"/>
                 <a:cs typeface="Courier New" panose="02070309020205020404" pitchFamily="49" charset="0"/>
@@ -31880,7 +32040,10 @@
               <a:t>test_mean_positive_numbers</a:t>
             </a:r>
             <a:r>
-              <a:rPr lang="en-US" sz="1200" b="1" dirty="0">
+              <a:rPr lang="en-US" sz="1200" dirty="0">
+                <a:solidFill>
+                  <a:schemeClr val="tx1"/>
+                </a:solidFill>
                 <a:latin typeface="Courier New" panose="02070309020205020404" pitchFamily="49" charset="0"/>
                 <a:cs typeface="Courier New" panose="02070309020205020404" pitchFamily="49" charset="0"/>
               </a:rPr>
@@ -31905,7 +32068,7 @@
                 <a:latin typeface="Courier New" panose="02070309020205020404" pitchFamily="49" charset="0"/>
                 <a:cs typeface="Courier New" panose="02070309020205020404" pitchFamily="49" charset="0"/>
               </a:rPr>
-              <a:t>"""Test mean for positive numbers."""</a:t>
+              <a:t>"""Test mean using positive numbers."""</a:t>
             </a:r>
           </a:p>
           <a:p>
@@ -31919,9 +32082,7 @@
             <a:r>
               <a:rPr lang="en-US" sz="1200" b="1" dirty="0">
                 <a:solidFill>
-                  <a:schemeClr val="accent1">
-                    <a:lumMod val="75000"/>
-                  </a:schemeClr>
+                  <a:schemeClr val="tx1"/>
                 </a:solidFill>
                 <a:latin typeface="Courier New" panose="02070309020205020404" pitchFamily="49" charset="0"/>
                 <a:cs typeface="Courier New" panose="02070309020205020404" pitchFamily="49" charset="0"/>
@@ -31950,7 +32111,10 @@
           </a:p>
           <a:p>
             <a:r>
-              <a:rPr lang="en-US" sz="1200" b="1" dirty="0">
+              <a:rPr lang="en-US" sz="1200" dirty="0">
+                <a:solidFill>
+                  <a:schemeClr val="tx1"/>
+                </a:solidFill>
                 <a:latin typeface="Courier New" panose="02070309020205020404" pitchFamily="49" charset="0"/>
                 <a:cs typeface="Courier New" panose="02070309020205020404" pitchFamily="49" charset="0"/>
               </a:rPr>
@@ -31959,9 +32123,7 @@
             <a:r>
               <a:rPr lang="en-US" sz="1200" b="1" dirty="0" err="1">
                 <a:solidFill>
-                  <a:schemeClr val="accent5">
-                    <a:lumMod val="75000"/>
-                  </a:schemeClr>
+                  <a:schemeClr val="tx1"/>
                 </a:solidFill>
                 <a:latin typeface="Courier New" panose="02070309020205020404" pitchFamily="49" charset="0"/>
                 <a:cs typeface="Courier New" panose="02070309020205020404" pitchFamily="49" charset="0"/>
@@ -31969,7 +32131,10 @@
               <a:t>test_mean_negative_numbers</a:t>
             </a:r>
             <a:r>
-              <a:rPr lang="en-US" sz="1200" b="1" dirty="0">
+              <a:rPr lang="en-US" sz="1200" dirty="0">
+                <a:solidFill>
+                  <a:schemeClr val="tx1"/>
+                </a:solidFill>
                 <a:latin typeface="Courier New" panose="02070309020205020404" pitchFamily="49" charset="0"/>
                 <a:cs typeface="Courier New" panose="02070309020205020404" pitchFamily="49" charset="0"/>
               </a:rPr>
@@ -31994,7 +32159,7 @@
                 <a:latin typeface="Courier New" panose="02070309020205020404" pitchFamily="49" charset="0"/>
                 <a:cs typeface="Courier New" panose="02070309020205020404" pitchFamily="49" charset="0"/>
               </a:rPr>
-              <a:t>"""Test mean for negative numbers."""</a:t>
+              <a:t>"""Test mean using negative numbers."""</a:t>
             </a:r>
             <a:endParaRPr lang="en-US" sz="1200" dirty="0">
               <a:latin typeface="Courier New" panose="02070309020205020404" pitchFamily="49" charset="0"/>
@@ -32012,9 +32177,7 @@
             <a:r>
               <a:rPr lang="en-US" sz="1200" b="1" dirty="0">
                 <a:solidFill>
-                  <a:schemeClr val="accent1">
-                    <a:lumMod val="75000"/>
-                  </a:schemeClr>
+                  <a:schemeClr val="tx1"/>
                 </a:solidFill>
                 <a:latin typeface="Courier New" panose="02070309020205020404" pitchFamily="49" charset="0"/>
                 <a:cs typeface="Courier New" panose="02070309020205020404" pitchFamily="49" charset="0"/>
@@ -32046,7 +32209,7 @@
         <p:spPr>
           <a:xfrm>
             <a:off x="7600950" y="1825625"/>
-            <a:ext cx="4292600" cy="369332"/>
+            <a:ext cx="4292600" cy="307777"/>
           </a:xfrm>
           <a:prstGeom prst="rect">
             <a:avLst/>
@@ -32060,23 +32223,13 @@
           <a:lstStyle/>
           <a:p>
             <a:r>
-              <a:rPr lang="en-US" dirty="0">
-                <a:solidFill>
-                  <a:schemeClr val="accent5">
-                    <a:lumMod val="75000"/>
-                  </a:schemeClr>
-                </a:solidFill>
+              <a:rPr lang="en-US" sz="1400" b="1" dirty="0">
                 <a:latin typeface="Courier New" panose="02070309020205020404" pitchFamily="49" charset="0"/>
                 <a:cs typeface="Courier New" panose="02070309020205020404" pitchFamily="49" charset="0"/>
               </a:rPr>
               <a:t>test_helpers.py</a:t>
             </a:r>
-            <a:endParaRPr lang="en-NL" dirty="0">
-              <a:solidFill>
-                <a:schemeClr val="accent5">
-                  <a:lumMod val="75000"/>
-                </a:schemeClr>
-              </a:solidFill>
+            <a:endParaRPr lang="en-NL" sz="1400" b="1" dirty="0">
               <a:latin typeface="Courier New" panose="02070309020205020404" pitchFamily="49" charset="0"/>
               <a:cs typeface="Courier New" panose="02070309020205020404" pitchFamily="49" charset="0"/>
             </a:endParaRPr>
@@ -32151,6 +32304,58 @@
       </p:grpSpPr>
       <p:sp>
         <p:nvSpPr>
+          <p:cNvPr id="8" name="Rectangle 7">
+            <a:extLst>
+              <a:ext uri="{FF2B5EF4-FFF2-40B4-BE49-F238E27FC236}">
+                <a16:creationId xmlns:a16="http://schemas.microsoft.com/office/drawing/2014/main" id="{811AAD40-A2DF-532C-72E8-5E61CD671156}"/>
+              </a:ext>
+            </a:extLst>
+          </p:cNvPr>
+          <p:cNvSpPr/>
+          <p:nvPr/>
+        </p:nvSpPr>
+        <p:spPr>
+          <a:xfrm>
+            <a:off x="7600950" y="1825626"/>
+            <a:ext cx="4292599" cy="4351338"/>
+          </a:xfrm>
+          <a:prstGeom prst="rect">
+            <a:avLst/>
+          </a:prstGeom>
+          <a:solidFill>
+            <a:schemeClr val="bg1">
+              <a:lumMod val="95000"/>
+            </a:schemeClr>
+          </a:solidFill>
+          <a:ln w="3175"/>
+        </p:spPr>
+        <p:style>
+          <a:lnRef idx="2">
+            <a:schemeClr val="accent3">
+              <a:shade val="15000"/>
+            </a:schemeClr>
+          </a:lnRef>
+          <a:fillRef idx="1">
+            <a:schemeClr val="accent3"/>
+          </a:fillRef>
+          <a:effectRef idx="0">
+            <a:schemeClr val="accent3"/>
+          </a:effectRef>
+          <a:fontRef idx="minor">
+            <a:schemeClr val="lt1"/>
+          </a:fontRef>
+        </p:style>
+        <p:txBody>
+          <a:bodyPr rtlCol="0" anchor="ctr"/>
+          <a:lstStyle/>
+          <a:p>
+            <a:pPr algn="ctr"/>
+            <a:endParaRPr lang="en-NL"/>
+          </a:p>
+        </p:txBody>
+      </p:sp>
+      <p:sp>
+        <p:nvSpPr>
           <p:cNvPr id="2" name="Title 1">
             <a:extLst>
               <a:ext uri="{FF2B5EF4-FFF2-40B4-BE49-F238E27FC236}">
@@ -32387,107 +32592,97 @@
             </a:r>
           </a:p>
           <a:p>
-            <a:endParaRPr lang="en-US" sz="1200" dirty="0">
+            <a:r>
+              <a:rPr lang="en-US" sz="1200" b="1" dirty="0">
+                <a:latin typeface="Courier New" panose="02070309020205020404" pitchFamily="49" charset="0"/>
+                <a:cs typeface="Courier New" panose="02070309020205020404" pitchFamily="49" charset="0"/>
+              </a:rPr>
+              <a:t>    </a:t>
+            </a:r>
+            <a:r>
+              <a:rPr lang="en-US" sz="1200" b="1" dirty="0">
+                <a:solidFill>
+                  <a:schemeClr val="tx1"/>
+                </a:solidFill>
+                <a:latin typeface="Courier New" panose="02070309020205020404" pitchFamily="49" charset="0"/>
+                <a:cs typeface="Courier New" panose="02070309020205020404" pitchFamily="49" charset="0"/>
+              </a:rPr>
+              <a:t>with </a:t>
+            </a:r>
+            <a:r>
+              <a:rPr lang="en-US" sz="1200" b="1" dirty="0" err="1">
+                <a:solidFill>
+                  <a:schemeClr val="tx1"/>
+                </a:solidFill>
+                <a:latin typeface="Courier New" panose="02070309020205020404" pitchFamily="49" charset="0"/>
+                <a:cs typeface="Courier New" panose="02070309020205020404" pitchFamily="49" charset="0"/>
+              </a:rPr>
+              <a:t>pytest.raises</a:t>
+            </a:r>
+            <a:r>
+              <a:rPr lang="en-US" sz="1200" b="1" dirty="0">
+                <a:solidFill>
+                  <a:schemeClr val="tx1"/>
+                </a:solidFill>
+                <a:latin typeface="Courier New" panose="02070309020205020404" pitchFamily="49" charset="0"/>
+                <a:cs typeface="Courier New" panose="02070309020205020404" pitchFamily="49" charset="0"/>
+              </a:rPr>
+              <a:t>(</a:t>
+            </a:r>
+            <a:r>
+              <a:rPr lang="en-US" sz="1200" b="1" dirty="0" err="1">
+                <a:solidFill>
+                  <a:schemeClr val="tx1"/>
+                </a:solidFill>
+                <a:latin typeface="Courier New" panose="02070309020205020404" pitchFamily="49" charset="0"/>
+                <a:cs typeface="Courier New" panose="02070309020205020404" pitchFamily="49" charset="0"/>
+              </a:rPr>
+              <a:t>ValueError</a:t>
+            </a:r>
+            <a:r>
+              <a:rPr lang="en-US" sz="1200" b="1" dirty="0">
+                <a:solidFill>
+                  <a:schemeClr val="tx1"/>
+                </a:solidFill>
+                <a:latin typeface="Courier New" panose="02070309020205020404" pitchFamily="49" charset="0"/>
+                <a:cs typeface="Courier New" panose="02070309020205020404" pitchFamily="49" charset="0"/>
+              </a:rPr>
+              <a:t>):</a:t>
+            </a:r>
+          </a:p>
+          <a:p>
+            <a:r>
+              <a:rPr lang="en-US" sz="1200" dirty="0">
+                <a:latin typeface="Courier New" panose="02070309020205020404" pitchFamily="49" charset="0"/>
+                <a:cs typeface="Courier New" panose="02070309020205020404" pitchFamily="49" charset="0"/>
+              </a:rPr>
+              <a:t>      mean([</a:t>
+            </a:r>
+            <a:r>
+              <a:rPr lang="en-US" sz="1200" dirty="0">
+                <a:solidFill>
+                  <a:schemeClr val="accent2">
+                    <a:lumMod val="75000"/>
+                  </a:schemeClr>
+                </a:solidFill>
+                <a:latin typeface="Courier New" panose="02070309020205020404" pitchFamily="49" charset="0"/>
+                <a:cs typeface="Courier New" panose="02070309020205020404" pitchFamily="49" charset="0"/>
+              </a:rPr>
+              <a:t>"A"</a:t>
+            </a:r>
+            <a:r>
+              <a:rPr lang="en-US" sz="1200" dirty="0">
+                <a:latin typeface="Courier New" panose="02070309020205020404" pitchFamily="49" charset="0"/>
+                <a:cs typeface="Courier New" panose="02070309020205020404" pitchFamily="49" charset="0"/>
+              </a:rPr>
+              <a:t>])  </a:t>
+            </a:r>
+            <a:endParaRPr lang="en-US" sz="1200" b="1" dirty="0">
               <a:latin typeface="Courier New" panose="02070309020205020404" pitchFamily="49" charset="0"/>
               <a:cs typeface="Courier New" panose="02070309020205020404" pitchFamily="49" charset="0"/>
             </a:endParaRPr>
           </a:p>
           <a:p>
-            <a:r>
-              <a:rPr lang="en-US" sz="1200" b="1" dirty="0">
-                <a:latin typeface="Courier New" panose="02070309020205020404" pitchFamily="49" charset="0"/>
-                <a:cs typeface="Courier New" panose="02070309020205020404" pitchFamily="49" charset="0"/>
-              </a:rPr>
-              <a:t>    </a:t>
-            </a:r>
-            <a:r>
-              <a:rPr lang="en-US" sz="1200" b="1" dirty="0">
-                <a:solidFill>
-                  <a:schemeClr val="accent1">
-                    <a:lumMod val="75000"/>
-                  </a:schemeClr>
-                </a:solidFill>
-                <a:latin typeface="Courier New" panose="02070309020205020404" pitchFamily="49" charset="0"/>
-                <a:cs typeface="Courier New" panose="02070309020205020404" pitchFamily="49" charset="0"/>
-              </a:rPr>
-              <a:t>with </a:t>
-            </a:r>
-            <a:r>
-              <a:rPr lang="en-US" sz="1200" b="1" dirty="0" err="1">
-                <a:solidFill>
-                  <a:schemeClr val="accent1">
-                    <a:lumMod val="75000"/>
-                  </a:schemeClr>
-                </a:solidFill>
-                <a:latin typeface="Courier New" panose="02070309020205020404" pitchFamily="49" charset="0"/>
-                <a:cs typeface="Courier New" panose="02070309020205020404" pitchFamily="49" charset="0"/>
-              </a:rPr>
-              <a:t>pytest.raises</a:t>
-            </a:r>
-            <a:r>
-              <a:rPr lang="en-US" sz="1200" b="1" dirty="0">
-                <a:solidFill>
-                  <a:schemeClr val="accent1">
-                    <a:lumMod val="75000"/>
-                  </a:schemeClr>
-                </a:solidFill>
-                <a:latin typeface="Courier New" panose="02070309020205020404" pitchFamily="49" charset="0"/>
-                <a:cs typeface="Courier New" panose="02070309020205020404" pitchFamily="49" charset="0"/>
-              </a:rPr>
-              <a:t>(</a:t>
-            </a:r>
-            <a:r>
-              <a:rPr lang="en-US" sz="1200" b="1" dirty="0" err="1">
-                <a:solidFill>
-                  <a:schemeClr val="accent1">
-                    <a:lumMod val="75000"/>
-                  </a:schemeClr>
-                </a:solidFill>
-                <a:latin typeface="Courier New" panose="02070309020205020404" pitchFamily="49" charset="0"/>
-                <a:cs typeface="Courier New" panose="02070309020205020404" pitchFamily="49" charset="0"/>
-              </a:rPr>
-              <a:t>ValueError</a:t>
-            </a:r>
-            <a:r>
-              <a:rPr lang="en-US" sz="1200" b="1" dirty="0">
-                <a:solidFill>
-                  <a:schemeClr val="accent1">
-                    <a:lumMod val="75000"/>
-                  </a:schemeClr>
-                </a:solidFill>
-                <a:latin typeface="Courier New" panose="02070309020205020404" pitchFamily="49" charset="0"/>
-                <a:cs typeface="Courier New" panose="02070309020205020404" pitchFamily="49" charset="0"/>
-              </a:rPr>
-              <a:t>):</a:t>
-            </a:r>
-          </a:p>
-          <a:p>
-            <a:r>
-              <a:rPr lang="en-US" sz="1200" dirty="0">
-                <a:latin typeface="Courier New" panose="02070309020205020404" pitchFamily="49" charset="0"/>
-                <a:cs typeface="Courier New" panose="02070309020205020404" pitchFamily="49" charset="0"/>
-              </a:rPr>
-              <a:t>      mean([</a:t>
-            </a:r>
-            <a:r>
-              <a:rPr lang="en-US" sz="1200" dirty="0">
-                <a:solidFill>
-                  <a:schemeClr val="accent2">
-                    <a:lumMod val="75000"/>
-                  </a:schemeClr>
-                </a:solidFill>
-                <a:latin typeface="Courier New" panose="02070309020205020404" pitchFamily="49" charset="0"/>
-                <a:cs typeface="Courier New" panose="02070309020205020404" pitchFamily="49" charset="0"/>
-              </a:rPr>
-              <a:t>"A"</a:t>
-            </a:r>
-            <a:r>
-              <a:rPr lang="en-US" sz="1200" dirty="0">
-                <a:latin typeface="Courier New" panose="02070309020205020404" pitchFamily="49" charset="0"/>
-                <a:cs typeface="Courier New" panose="02070309020205020404" pitchFamily="49" charset="0"/>
-              </a:rPr>
-              <a:t>])  </a:t>
-            </a:r>
             <a:endParaRPr lang="en-US" sz="1200" b="1" dirty="0">
               <a:latin typeface="Courier New" panose="02070309020205020404" pitchFamily="49" charset="0"/>
               <a:cs typeface="Courier New" panose="02070309020205020404" pitchFamily="49" charset="0"/>
@@ -33073,9 +33268,7 @@
             <a:r>
               <a:rPr lang="en-US" sz="1200" dirty="0" err="1">
                 <a:solidFill>
-                  <a:schemeClr val="accent1">
-                    <a:lumMod val="75000"/>
-                  </a:schemeClr>
+                  <a:schemeClr val="tx1"/>
                 </a:solidFill>
                 <a:latin typeface="Courier New" panose="02070309020205020404" pitchFamily="49" charset="0"/>
                 <a:cs typeface="Courier New" panose="02070309020205020404" pitchFamily="49" charset="0"/>
@@ -33089,6 +33282,8 @@
               </a:rPr>
               <a:t>=[</a:t>
             </a:r>
+          </a:p>
+          <a:p>
             <a:r>
               <a:rPr lang="en-US" sz="1200" dirty="0">
                 <a:solidFill>
@@ -33099,7 +33294,7 @@
                 <a:latin typeface="Courier New" panose="02070309020205020404" pitchFamily="49" charset="0"/>
                 <a:cs typeface="Courier New" panose="02070309020205020404" pitchFamily="49" charset="0"/>
               </a:rPr>
-              <a:t>"numbers"</a:t>
+              <a:t>      "numbers"</a:t>
             </a:r>
             <a:r>
               <a:rPr lang="en-US" sz="1200" dirty="0">
@@ -33119,6 +33314,20 @@
                 <a:cs typeface="Courier New" panose="02070309020205020404" pitchFamily="49" charset="0"/>
               </a:rPr>
               <a:t>"expected"</a:t>
+            </a:r>
+          </a:p>
+          <a:p>
+            <a:r>
+              <a:rPr lang="en-US" sz="1200" dirty="0">
+                <a:solidFill>
+                  <a:schemeClr val="accent2">
+                    <a:lumMod val="75000"/>
+                  </a:schemeClr>
+                </a:solidFill>
+                <a:latin typeface="Courier New" panose="02070309020205020404" pitchFamily="49" charset="0"/>
+                <a:cs typeface="Courier New" panose="02070309020205020404" pitchFamily="49" charset="0"/>
+              </a:rPr>
+              <a:t>    </a:t>
             </a:r>
             <a:r>
               <a:rPr lang="en-US" sz="1200" dirty="0">
@@ -33145,9 +33354,7 @@
             <a:r>
               <a:rPr lang="en-US" sz="1200" dirty="0" err="1">
                 <a:solidFill>
-                  <a:schemeClr val="accent1">
-                    <a:lumMod val="75000"/>
-                  </a:schemeClr>
+                  <a:schemeClr val="tx1"/>
                 </a:solidFill>
                 <a:latin typeface="Courier New" panose="02070309020205020404" pitchFamily="49" charset="0"/>
                 <a:cs typeface="Courier New" panose="02070309020205020404" pitchFamily="49" charset="0"/>
@@ -33206,9 +33413,7 @@
             <a:r>
               <a:rPr lang="en-US" sz="1200" dirty="0">
                 <a:solidFill>
-                  <a:schemeClr val="accent1">
-                    <a:lumMod val="75000"/>
-                  </a:schemeClr>
+                  <a:schemeClr val="tx1"/>
                 </a:solidFill>
                 <a:latin typeface="Courier New" panose="02070309020205020404" pitchFamily="49" charset="0"/>
                 <a:cs typeface="Courier New" panose="02070309020205020404" pitchFamily="49" charset="0"/>
@@ -33507,7 +33712,7 @@
             </a:pPr>
             <a:r>
               <a:rPr lang="nl-NL" sz="2000" dirty="0"/>
-              <a:t>Hergebruik van objecten door tests kan problemen opleveren.</a:t>
+              <a:t>Hergebruik van objecten kan problemen opleveren.</a:t>
             </a:r>
           </a:p>
           <a:p>
@@ -33541,7 +33746,7 @@
             </a:pPr>
             <a:r>
               <a:rPr lang="nl-NL" sz="2000" dirty="0"/>
-              <a:t>Je zou iedere test met een nieuw object willen draaien…</a:t>
+              <a:t>Iedere test zou nieuw object moeten krijgen…</a:t>
             </a:r>
           </a:p>
         </p:txBody>
@@ -34257,7 +34462,7 @@
             </a:pPr>
             <a:r>
               <a:rPr lang="nl-NL" sz="2000" dirty="0"/>
-              <a:t>Aanmaken met </a:t>
+              <a:t>Gebruik </a:t>
             </a:r>
             <a:r>
               <a:rPr lang="nl-NL" sz="2000" dirty="0">
@@ -34285,7 +34490,7 @@
             </a:pPr>
             <a:r>
               <a:rPr lang="nl-NL" sz="2000" dirty="0"/>
-              <a:t>Fixture functie geeft waarde of object terug.</a:t>
+              <a:t>Fixture functie geeft nieuw object terug.</a:t>
             </a:r>
           </a:p>
           <a:p>
@@ -34302,7 +34507,15 @@
             </a:pPr>
             <a:r>
               <a:rPr lang="nl-NL" sz="2000" dirty="0"/>
-              <a:t>Geef fixture als argument mee aan tests.</a:t>
+              <a:t>Geef </a:t>
+            </a:r>
+            <a:r>
+              <a:rPr lang="nl-NL" sz="2000" dirty="0" err="1"/>
+              <a:t>fixture</a:t>
+            </a:r>
+            <a:r>
+              <a:rPr lang="nl-NL" sz="2000" dirty="0"/>
+              <a:t> mee als argument aan de tests.</a:t>
             </a:r>
           </a:p>
           <a:p>
@@ -34318,8 +34531,12 @@
               <a:buChar char="-"/>
             </a:pPr>
             <a:r>
+              <a:rPr lang="nl-NL" sz="2000" dirty="0" err="1"/>
+              <a:t>Fixture</a:t>
+            </a:r>
+            <a:r>
               <a:rPr lang="nl-NL" sz="2000" dirty="0"/>
-              <a:t>Fixture wordt voor elke test opnieuw aangemaakt!</a:t>
+              <a:t> wordt voor elke test opnieuw aangemaakt!</a:t>
             </a:r>
           </a:p>
         </p:txBody>
@@ -36033,7 +36250,7 @@
           <a:p>
             <a:r>
               <a:rPr lang="nl-NL" sz="3600" noProof="0" dirty="0"/>
-              <a:t>Leesbaar: Auto-</a:t>
+              <a:t>Auto-</a:t>
             </a:r>
             <a:r>
               <a:rPr lang="nl-NL" sz="3600" noProof="0" dirty="0" err="1"/>
@@ -38759,7 +38976,7 @@
           <a:p>
             <a:r>
               <a:rPr lang="nl-NL" sz="3600" noProof="0" dirty="0"/>
-              <a:t>Leesbaar: Documentatie</a:t>
+              <a:t>Documentatie in code</a:t>
             </a:r>
           </a:p>
         </p:txBody>
@@ -39067,7 +39284,7 @@
           <a:p>
             <a:r>
               <a:rPr lang="nl-NL" sz="3600" noProof="0" dirty="0"/>
-              <a:t>Leesbaar: Project documenteren</a:t>
+              <a:t>Documentatie voor project</a:t>
             </a:r>
           </a:p>
         </p:txBody>
@@ -39287,7 +39504,7 @@
           <a:p>
             <a:r>
               <a:rPr lang="nl-NL" sz="3600" noProof="0" dirty="0"/>
-              <a:t>Leesbaar: Plug-ins voor VS Code</a:t>
+              <a:t>Notebooks documenteren</a:t>
             </a:r>
           </a:p>
         </p:txBody>
@@ -39320,195 +39537,142 @@
           </a:bodyPr>
           <a:lstStyle/>
           <a:p>
-            <a:pPr marL="0" indent="0">
-              <a:buNone/>
-            </a:pPr>
-            <a:r>
-              <a:rPr lang="nl-NL" sz="1800" b="1" noProof="0" dirty="0" err="1"/>
-              <a:t>PyLance</a:t>
-            </a:r>
-            <a:endParaRPr lang="nl-NL" sz="1800" b="1" noProof="0" dirty="0"/>
-          </a:p>
-          <a:p>
-            <a:pPr marL="0" indent="0">
-              <a:buNone/>
-            </a:pPr>
-            <a:r>
-              <a:rPr lang="nl-NL" sz="1800" noProof="0" dirty="0">
-                <a:hlinkClick r:id="rId3"/>
-              </a:rPr>
-              <a:t>https://marketplace.visualstudio.com/items?itemName=ms-python.vscode-pylance</a:t>
-            </a:r>
-            <a:endParaRPr lang="nl-NL" sz="1800" dirty="0"/>
-          </a:p>
-          <a:p>
-            <a:pPr marL="0" indent="0">
-              <a:buNone/>
-            </a:pPr>
-            <a:r>
-              <a:rPr lang="nl-NL" sz="1800" noProof="0" dirty="0"/>
-              <a:t>Checkt code, geeft suggesties, vult aan met tab, toont </a:t>
-            </a:r>
-            <a:r>
-              <a:rPr lang="nl-NL" sz="1800" noProof="0" dirty="0" err="1"/>
-              <a:t>docstrings</a:t>
-            </a:r>
-            <a:r>
-              <a:rPr lang="nl-NL" sz="1800" noProof="0" dirty="0"/>
-              <a:t>.</a:t>
-            </a:r>
-          </a:p>
-          <a:p>
-            <a:pPr marL="0" indent="0">
-              <a:buNone/>
-            </a:pPr>
-            <a:endParaRPr lang="nl-NL" sz="1800" b="1" noProof="0" dirty="0"/>
-          </a:p>
-          <a:p>
-            <a:pPr marL="0" indent="0">
-              <a:buNone/>
-            </a:pPr>
-            <a:r>
-              <a:rPr lang="nl-NL" sz="1800" b="1" noProof="0" dirty="0" err="1"/>
-              <a:t>AutoDocstring</a:t>
-            </a:r>
-            <a:endParaRPr lang="nl-NL" sz="1800" dirty="0">
+            <a:pPr>
+              <a:buFontTx/>
+              <a:buChar char="-"/>
+            </a:pPr>
+            <a:r>
+              <a:rPr lang="nl-NL" sz="2000" noProof="0" dirty="0">
+                <a:cs typeface="Courier New" panose="02070309020205020404" pitchFamily="49" charset="0"/>
+              </a:rPr>
+              <a:t>Geef het Notebook een descriptieve naam!</a:t>
+            </a:r>
+          </a:p>
+          <a:p>
+            <a:pPr>
+              <a:buFontTx/>
+              <a:buChar char="-"/>
+            </a:pPr>
+            <a:endParaRPr lang="nl-NL" sz="2000" noProof="0" dirty="0">
               <a:cs typeface="Courier New" panose="02070309020205020404" pitchFamily="49" charset="0"/>
             </a:endParaRPr>
           </a:p>
           <a:p>
-            <a:pPr marL="0" indent="0">
-              <a:buNone/>
-            </a:pPr>
-            <a:r>
-              <a:rPr lang="nl-NL" sz="1800" noProof="0" dirty="0">
-                <a:cs typeface="Courier New" panose="02070309020205020404" pitchFamily="49" charset="0"/>
-                <a:hlinkClick r:id="rId4"/>
-              </a:rPr>
-              <a:t>https://marketplace.visualstudio.com/items?itemName=njpwerner.autodocstring</a:t>
-            </a:r>
-            <a:endParaRPr lang="nl-NL" sz="1800" noProof="0" dirty="0">
+            <a:pPr>
+              <a:buFontTx/>
+              <a:buChar char="-"/>
+            </a:pPr>
+            <a:r>
+              <a:rPr lang="nl-NL" sz="2000" dirty="0">
+                <a:cs typeface="Courier New" panose="02070309020205020404" pitchFamily="49" charset="0"/>
+              </a:rPr>
+              <a:t>Omschrijf doel van het Notebook in eerste cel.</a:t>
+            </a:r>
+          </a:p>
+          <a:p>
+            <a:pPr>
+              <a:buFontTx/>
+              <a:buChar char="-"/>
+            </a:pPr>
+            <a:endParaRPr lang="nl-NL" sz="2000" noProof="0" dirty="0">
               <a:cs typeface="Courier New" panose="02070309020205020404" pitchFamily="49" charset="0"/>
             </a:endParaRPr>
           </a:p>
           <a:p>
-            <a:pPr marL="0" indent="0">
-              <a:buNone/>
-            </a:pPr>
-            <a:r>
-              <a:rPr lang="nl-NL" sz="1800" dirty="0">
-                <a:cs typeface="Courier New" panose="02070309020205020404" pitchFamily="49" charset="0"/>
-              </a:rPr>
-              <a:t>Genereert automatisch </a:t>
-            </a:r>
-            <a:r>
-              <a:rPr lang="nl-NL" sz="1800" dirty="0" err="1">
-                <a:cs typeface="Courier New" panose="02070309020205020404" pitchFamily="49" charset="0"/>
-              </a:rPr>
-              <a:t>docstrings</a:t>
-            </a:r>
-            <a:r>
-              <a:rPr lang="nl-NL" sz="1800" dirty="0">
-                <a:cs typeface="Courier New" panose="02070309020205020404" pitchFamily="49" charset="0"/>
-              </a:rPr>
-              <a:t> aan de hand van de functie definitie.</a:t>
-            </a:r>
-          </a:p>
-          <a:p>
-            <a:pPr marL="0" indent="0">
-              <a:buNone/>
-            </a:pPr>
-            <a:endParaRPr lang="nl-NL" sz="1800" b="1" dirty="0">
+            <a:pPr>
+              <a:buFontTx/>
+              <a:buChar char="-"/>
+            </a:pPr>
+            <a:r>
+              <a:rPr lang="nl-NL" sz="2000" dirty="0">
+                <a:cs typeface="Courier New" panose="02070309020205020404" pitchFamily="49" charset="0"/>
+              </a:rPr>
+              <a:t>Gebruik kopjes voor secties in het Notebook.</a:t>
+            </a:r>
+          </a:p>
+          <a:p>
+            <a:pPr>
+              <a:buFontTx/>
+              <a:buChar char="-"/>
+            </a:pPr>
+            <a:endParaRPr lang="nl-NL" sz="2000" dirty="0">
               <a:cs typeface="Courier New" panose="02070309020205020404" pitchFamily="49" charset="0"/>
             </a:endParaRPr>
           </a:p>
           <a:p>
-            <a:pPr marL="0" indent="0">
-              <a:buNone/>
-            </a:pPr>
-            <a:r>
-              <a:rPr lang="nl-NL" sz="1800" b="1" noProof="0" dirty="0" err="1">
-                <a:cs typeface="Courier New" panose="02070309020205020404" pitchFamily="49" charset="0"/>
-              </a:rPr>
-              <a:t>Markdown</a:t>
-            </a:r>
-            <a:r>
-              <a:rPr lang="nl-NL" sz="1800" b="1" noProof="0" dirty="0">
-                <a:cs typeface="Courier New" panose="02070309020205020404" pitchFamily="49" charset="0"/>
-              </a:rPr>
-              <a:t> All-in-One</a:t>
-            </a:r>
-            <a:endParaRPr lang="nl-NL" sz="1800" noProof="0" dirty="0">
+            <a:pPr>
+              <a:buFontTx/>
+              <a:buChar char="-"/>
+            </a:pPr>
+            <a:r>
+              <a:rPr lang="nl-NL" sz="2000" dirty="0">
+                <a:cs typeface="Courier New" panose="02070309020205020404" pitchFamily="49" charset="0"/>
+              </a:rPr>
+              <a:t>Documenteer code zoals gebruikelijk.</a:t>
+            </a:r>
+          </a:p>
+          <a:p>
+            <a:pPr>
+              <a:buFontTx/>
+              <a:buChar char="-"/>
+            </a:pPr>
+            <a:endParaRPr lang="nl-NL" sz="2000" dirty="0">
               <a:cs typeface="Courier New" panose="02070309020205020404" pitchFamily="49" charset="0"/>
             </a:endParaRPr>
           </a:p>
           <a:p>
-            <a:pPr marL="0" indent="0">
-              <a:buNone/>
-            </a:pPr>
-            <a:r>
-              <a:rPr lang="nl-NL" sz="1800" dirty="0">
-                <a:cs typeface="Courier New" panose="02070309020205020404" pitchFamily="49" charset="0"/>
-                <a:hlinkClick r:id="rId5"/>
-              </a:rPr>
-              <a:t>https://marketplace.visualstudio.com/items?itemName=yzhang.markdown-all-in-one</a:t>
-            </a:r>
-            <a:endParaRPr lang="nl-NL" sz="1800" dirty="0">
-              <a:cs typeface="Courier New" panose="02070309020205020404" pitchFamily="49" charset="0"/>
-            </a:endParaRPr>
-          </a:p>
-          <a:p>
-            <a:pPr marL="0" indent="0">
-              <a:buNone/>
-            </a:pPr>
-            <a:r>
-              <a:rPr lang="nl-NL" sz="1800" noProof="0" dirty="0">
-                <a:cs typeface="Courier New" panose="02070309020205020404" pitchFamily="49" charset="0"/>
-              </a:rPr>
-              <a:t>Uitbreiding voor </a:t>
-            </a:r>
-            <a:r>
-              <a:rPr lang="nl-NL" sz="1800" noProof="0" dirty="0" err="1">
-                <a:cs typeface="Courier New" panose="02070309020205020404" pitchFamily="49" charset="0"/>
-              </a:rPr>
-              <a:t>Markdown</a:t>
-            </a:r>
-            <a:r>
-              <a:rPr lang="nl-NL" sz="1800" noProof="0" dirty="0">
-                <a:cs typeface="Courier New" panose="02070309020205020404" pitchFamily="49" charset="0"/>
-              </a:rPr>
-              <a:t> ondersteuning; hot </a:t>
-            </a:r>
-            <a:r>
-              <a:rPr lang="nl-NL" sz="1800" noProof="0" dirty="0" err="1">
-                <a:cs typeface="Courier New" panose="02070309020205020404" pitchFamily="49" charset="0"/>
-              </a:rPr>
-              <a:t>keys</a:t>
-            </a:r>
-            <a:r>
-              <a:rPr lang="nl-NL" sz="1800" dirty="0">
-                <a:cs typeface="Courier New" panose="02070309020205020404" pitchFamily="49" charset="0"/>
-              </a:rPr>
-              <a:t>, inhoudsopgave, etc.</a:t>
-            </a:r>
-            <a:endParaRPr lang="nl-NL" sz="1800" noProof="0" dirty="0">
-              <a:cs typeface="Courier New" panose="02070309020205020404" pitchFamily="49" charset="0"/>
-            </a:endParaRPr>
-          </a:p>
-          <a:p>
-            <a:pPr marL="0" indent="0">
-              <a:buNone/>
-            </a:pPr>
-            <a:endParaRPr lang="nl-NL" sz="1800" noProof="0" dirty="0">
-              <a:cs typeface="Courier New" panose="02070309020205020404" pitchFamily="49" charset="0"/>
-            </a:endParaRPr>
+            <a:pPr>
+              <a:buFontTx/>
+              <a:buChar char="-"/>
+            </a:pPr>
+            <a:r>
+              <a:rPr lang="nl-NL" sz="2000" dirty="0">
+                <a:cs typeface="Courier New" panose="02070309020205020404" pitchFamily="49" charset="0"/>
+              </a:rPr>
+              <a:t>Ruim Notebooks regelmatig op!</a:t>
+            </a:r>
           </a:p>
         </p:txBody>
       </p:sp>
+      <p:pic>
+        <p:nvPicPr>
+          <p:cNvPr id="8" name="Picture 7">
+            <a:extLst>
+              <a:ext uri="{FF2B5EF4-FFF2-40B4-BE49-F238E27FC236}">
+                <a16:creationId xmlns:a16="http://schemas.microsoft.com/office/drawing/2014/main" id="{5A5B03C0-3C43-2436-4168-E252ED7D55DE}"/>
+              </a:ext>
+            </a:extLst>
+          </p:cNvPr>
+          <p:cNvPicPr>
+            <a:picLocks noChangeAspect="1"/>
+          </p:cNvPicPr>
+          <p:nvPr/>
+        </p:nvPicPr>
+        <p:blipFill>
+          <a:blip r:embed="rId2"/>
+          <a:stretch>
+            <a:fillRect/>
+          </a:stretch>
+        </p:blipFill>
+        <p:spPr>
+          <a:xfrm>
+            <a:off x="7485360" y="1456267"/>
+            <a:ext cx="3868440" cy="4720696"/>
+          </a:xfrm>
+          <a:prstGeom prst="rect">
+            <a:avLst/>
+          </a:prstGeom>
+          <a:ln>
+            <a:solidFill>
+              <a:schemeClr val="tx1"/>
+            </a:solidFill>
+          </a:ln>
+        </p:spPr>
+      </p:pic>
     </p:spTree>
     <p:extLst>
       <p:ext uri="{BB962C8B-B14F-4D97-AF65-F5344CB8AC3E}">
-        <p14:creationId xmlns:p14="http://schemas.microsoft.com/office/powerpoint/2010/main" val="3018676715"/>
+        <p14:creationId xmlns:p14="http://schemas.microsoft.com/office/powerpoint/2010/main" val="2412723340"/>
       </p:ext>
     </p:extLst>
   </p:cSld>

</xml_diff>

<commit_message>
Finalize Python part 2
</commit_message>
<xml_diff>
--- a/python_course/2_production_code/python_cursus_2.pptx
+++ b/python_course/2_production_code/python_cursus_2.pptx
@@ -10,8 +10,8 @@
   <p:sldIdLst>
     <p:sldId id="322" r:id="rId2"/>
     <p:sldId id="257" r:id="rId3"/>
-    <p:sldId id="300" r:id="rId4"/>
-    <p:sldId id="309" r:id="rId5"/>
+    <p:sldId id="309" r:id="rId4"/>
+    <p:sldId id="300" r:id="rId5"/>
     <p:sldId id="288" r:id="rId6"/>
     <p:sldId id="329" r:id="rId7"/>
     <p:sldId id="327" r:id="rId8"/>
@@ -271,7 +271,7 @@
           <a:p>
             <a:fld id="{7D183437-14DE-4969-B062-63D9C4A2E219}" type="datetimeFigureOut">
               <a:rPr lang="nl-NL" smtClean="0"/>
-              <a:t>13-9-2024</a:t>
+              <a:t>30-9-2024</a:t>
             </a:fld>
             <a:endParaRPr lang="nl-NL"/>
           </a:p>
@@ -584,26 +584,14 @@
           <a:lstStyle/>
           <a:p>
             <a:r>
+              <a:rPr lang="en-US" dirty="0"/>
+              <a:t>demo: black + </a:t>
+            </a:r>
+            <a:r>
               <a:rPr lang="en-US" dirty="0" err="1"/>
-              <a:t>Naar</a:t>
-            </a:r>
-            <a:r>
-              <a:rPr lang="en-US" dirty="0"/>
-              <a:t> </a:t>
-            </a:r>
-            <a:r>
-              <a:rPr lang="en-US" dirty="0" err="1"/>
-              <a:t>mkdocs</a:t>
-            </a:r>
-            <a:r>
-              <a:rPr lang="en-US" dirty="0"/>
-              <a:t> </a:t>
-            </a:r>
-            <a:r>
-              <a:rPr lang="en-US" dirty="0" err="1"/>
-              <a:t>voorbeeld</a:t>
-            </a:r>
-            <a:endParaRPr lang="nl-NL" dirty="0"/>
+              <a:t>pylint</a:t>
+            </a:r>
+            <a:endParaRPr lang="en-NL" dirty="0"/>
           </a:p>
         </p:txBody>
       </p:sp>
@@ -624,7 +612,7 @@
           <a:p>
             <a:fld id="{9583DEA5-E342-4DB2-B087-D0B9C490B19E}" type="slidenum">
               <a:rPr lang="nl-NL" smtClean="0"/>
-              <a:t>10</a:t>
+              <a:t>6</a:t>
             </a:fld>
             <a:endParaRPr lang="nl-NL"/>
           </a:p>
@@ -633,7 +621,103 @@
     </p:spTree>
     <p:extLst>
       <p:ext uri="{BB962C8B-B14F-4D97-AF65-F5344CB8AC3E}">
-        <p14:creationId xmlns:p14="http://schemas.microsoft.com/office/powerpoint/2010/main" val="3002235451"/>
+        <p14:creationId xmlns:p14="http://schemas.microsoft.com/office/powerpoint/2010/main" val="3141469858"/>
+      </p:ext>
+    </p:extLst>
+  </p:cSld>
+  <p:clrMapOvr>
+    <a:masterClrMapping/>
+  </p:clrMapOvr>
+</p:notes>
+</file>
+
+<file path=ppt/notesSlides/notesSlide10.xml><?xml version="1.0" encoding="utf-8"?>
+<p:notes xmlns:a="http://schemas.openxmlformats.org/drawingml/2006/main" xmlns:r="http://schemas.openxmlformats.org/officeDocument/2006/relationships" xmlns:p="http://schemas.openxmlformats.org/presentationml/2006/main">
+  <p:cSld>
+    <p:spTree>
+      <p:nvGrpSpPr>
+        <p:cNvPr id="1" name=""/>
+        <p:cNvGrpSpPr/>
+        <p:nvPr/>
+      </p:nvGrpSpPr>
+      <p:grpSpPr>
+        <a:xfrm>
+          <a:off x="0" y="0"/>
+          <a:ext cx="0" cy="0"/>
+          <a:chOff x="0" y="0"/>
+          <a:chExt cx="0" cy="0"/>
+        </a:xfrm>
+      </p:grpSpPr>
+      <p:sp>
+        <p:nvSpPr>
+          <p:cNvPr id="2" name="Slide Image Placeholder 1"/>
+          <p:cNvSpPr>
+            <a:spLocks noGrp="1" noRot="1" noChangeAspect="1"/>
+          </p:cNvSpPr>
+          <p:nvPr>
+            <p:ph type="sldImg"/>
+          </p:nvPr>
+        </p:nvSpPr>
+        <p:spPr/>
+      </p:sp>
+      <p:sp>
+        <p:nvSpPr>
+          <p:cNvPr id="3" name="Notes Placeholder 2"/>
+          <p:cNvSpPr>
+            <a:spLocks noGrp="1"/>
+          </p:cNvSpPr>
+          <p:nvPr>
+            <p:ph type="body" idx="1"/>
+          </p:nvPr>
+        </p:nvSpPr>
+        <p:spPr/>
+        <p:txBody>
+          <a:bodyPr/>
+          <a:lstStyle/>
+          <a:p>
+            <a:r>
+              <a:rPr lang="en-US" dirty="0"/>
+              <a:t>Demo: </a:t>
+            </a:r>
+            <a:r>
+              <a:rPr lang="en-US" dirty="0" err="1"/>
+              <a:t>unit_testing</a:t>
+            </a:r>
+            <a:r>
+              <a:rPr lang="en-US" dirty="0"/>
+              <a:t>/3_fixtures</a:t>
+            </a:r>
+            <a:endParaRPr lang="en-NL" dirty="0"/>
+          </a:p>
+        </p:txBody>
+      </p:sp>
+      <p:sp>
+        <p:nvSpPr>
+          <p:cNvPr id="4" name="Slide Number Placeholder 3"/>
+          <p:cNvSpPr>
+            <a:spLocks noGrp="1"/>
+          </p:cNvSpPr>
+          <p:nvPr>
+            <p:ph type="sldNum" sz="quarter" idx="5"/>
+          </p:nvPr>
+        </p:nvSpPr>
+        <p:spPr/>
+        <p:txBody>
+          <a:bodyPr/>
+          <a:lstStyle/>
+          <a:p>
+            <a:fld id="{9583DEA5-E342-4DB2-B087-D0B9C490B19E}" type="slidenum">
+              <a:rPr lang="nl-NL" smtClean="0"/>
+              <a:t>56</a:t>
+            </a:fld>
+            <a:endParaRPr lang="nl-NL"/>
+          </a:p>
+        </p:txBody>
+      </p:sp>
+    </p:spTree>
+    <p:extLst>
+      <p:ext uri="{BB962C8B-B14F-4D97-AF65-F5344CB8AC3E}">
+        <p14:creationId xmlns:p14="http://schemas.microsoft.com/office/powerpoint/2010/main" val="3403914423"/>
       </p:ext>
     </p:extLst>
   </p:cSld>
@@ -689,13 +773,13 @@
           <a:p>
             <a:r>
               <a:rPr lang="en-US" dirty="0" err="1"/>
-              <a:t>Naar</a:t>
+              <a:t>mkdocs</a:t>
             </a:r>
             <a:r>
               <a:rPr lang="en-US" dirty="0"/>
-              <a:t> logging Notebook</a:t>
-            </a:r>
-            <a:endParaRPr lang="nl-NL" dirty="0"/>
+              <a:t> demo</a:t>
+            </a:r>
+            <a:endParaRPr lang="en-NL" dirty="0"/>
           </a:p>
         </p:txBody>
       </p:sp>
@@ -716,7 +800,7 @@
           <a:p>
             <a:fld id="{9583DEA5-E342-4DB2-B087-D0B9C490B19E}" type="slidenum">
               <a:rPr lang="nl-NL" smtClean="0"/>
-              <a:t>35</a:t>
+              <a:t>8</a:t>
             </a:fld>
             <a:endParaRPr lang="nl-NL"/>
           </a:p>
@@ -725,7 +809,7 @@
     </p:spTree>
     <p:extLst>
       <p:ext uri="{BB962C8B-B14F-4D97-AF65-F5344CB8AC3E}">
-        <p14:creationId xmlns:p14="http://schemas.microsoft.com/office/powerpoint/2010/main" val="1164881300"/>
+        <p14:creationId xmlns:p14="http://schemas.microsoft.com/office/powerpoint/2010/main" val="449138883"/>
       </p:ext>
     </p:extLst>
   </p:cSld>
@@ -785,7 +869,19 @@
             </a:r>
             <a:r>
               <a:rPr lang="en-US" dirty="0"/>
-              <a:t> exception.py / VS Code debugger</a:t>
+              <a:t> </a:t>
+            </a:r>
+            <a:r>
+              <a:rPr lang="en-US" dirty="0" err="1"/>
+              <a:t>mkdocs</a:t>
+            </a:r>
+            <a:r>
+              <a:rPr lang="en-US" dirty="0"/>
+              <a:t> </a:t>
+            </a:r>
+            <a:r>
+              <a:rPr lang="en-US" dirty="0" err="1"/>
+              <a:t>voorbeeld</a:t>
             </a:r>
             <a:endParaRPr lang="nl-NL" dirty="0"/>
           </a:p>
@@ -808,7 +904,7 @@
           <a:p>
             <a:fld id="{9583DEA5-E342-4DB2-B087-D0B9C490B19E}" type="slidenum">
               <a:rPr lang="nl-NL" smtClean="0"/>
-              <a:t>39</a:t>
+              <a:t>10</a:t>
             </a:fld>
             <a:endParaRPr lang="nl-NL"/>
           </a:p>
@@ -817,7 +913,7 @@
     </p:spTree>
     <p:extLst>
       <p:ext uri="{BB962C8B-B14F-4D97-AF65-F5344CB8AC3E}">
-        <p14:creationId xmlns:p14="http://schemas.microsoft.com/office/powerpoint/2010/main" val="2010717564"/>
+        <p14:creationId xmlns:p14="http://schemas.microsoft.com/office/powerpoint/2010/main" val="3002235451"/>
       </p:ext>
     </p:extLst>
   </p:cSld>
@@ -872,14 +968,10 @@
           <a:lstStyle/>
           <a:p>
             <a:r>
-              <a:rPr lang="en-US" dirty="0" err="1"/>
-              <a:t>Naar</a:t>
-            </a:r>
-            <a:r>
               <a:rPr lang="en-US" dirty="0"/>
-              <a:t> exception.py / VS Code debugger</a:t>
-            </a:r>
-            <a:endParaRPr lang="nl-NL" dirty="0"/>
+              <a:t>Notebook: 1_logging</a:t>
+            </a:r>
+            <a:endParaRPr lang="en-NL" dirty="0"/>
           </a:p>
         </p:txBody>
       </p:sp>
@@ -900,7 +992,7 @@
           <a:p>
             <a:fld id="{9583DEA5-E342-4DB2-B087-D0B9C490B19E}" type="slidenum">
               <a:rPr lang="nl-NL" smtClean="0"/>
-              <a:t>40</a:t>
+              <a:t>30</a:t>
             </a:fld>
             <a:endParaRPr lang="nl-NL"/>
           </a:p>
@@ -909,7 +1001,7 @@
     </p:spTree>
     <p:extLst>
       <p:ext uri="{BB962C8B-B14F-4D97-AF65-F5344CB8AC3E}">
-        <p14:creationId xmlns:p14="http://schemas.microsoft.com/office/powerpoint/2010/main" val="1753188619"/>
+        <p14:creationId xmlns:p14="http://schemas.microsoft.com/office/powerpoint/2010/main" val="1515210310"/>
       </p:ext>
     </p:extLst>
   </p:cSld>
@@ -964,12 +1056,8 @@
           <a:lstStyle/>
           <a:p>
             <a:r>
-              <a:rPr lang="en-US" dirty="0" err="1"/>
-              <a:t>Naar</a:t>
-            </a:r>
-            <a:r>
-              <a:rPr lang="en-US" dirty="0"/>
-              <a:t> basic unit tests.</a:t>
+              <a:rPr lang="en-US"/>
+              <a:t>Notebook: 1_logging</a:t>
             </a:r>
             <a:endParaRPr lang="nl-NL" dirty="0"/>
           </a:p>
@@ -992,7 +1080,7 @@
           <a:p>
             <a:fld id="{9583DEA5-E342-4DB2-B087-D0B9C490B19E}" type="slidenum">
               <a:rPr lang="nl-NL" smtClean="0"/>
-              <a:t>51</a:t>
+              <a:t>35</a:t>
             </a:fld>
             <a:endParaRPr lang="nl-NL"/>
           </a:p>
@@ -1001,7 +1089,7 @@
     </p:spTree>
     <p:extLst>
       <p:ext uri="{BB962C8B-B14F-4D97-AF65-F5344CB8AC3E}">
-        <p14:creationId xmlns:p14="http://schemas.microsoft.com/office/powerpoint/2010/main" val="3485926939"/>
+        <p14:creationId xmlns:p14="http://schemas.microsoft.com/office/powerpoint/2010/main" val="1164881300"/>
       </p:ext>
     </p:extLst>
   </p:cSld>
@@ -1061,15 +1149,287 @@
             </a:r>
             <a:r>
               <a:rPr lang="en-US" dirty="0"/>
-              <a:t> </a:t>
+              <a:t> exception.py / VS Code debugger</a:t>
+            </a:r>
+            <a:endParaRPr lang="nl-NL" dirty="0"/>
+          </a:p>
+        </p:txBody>
+      </p:sp>
+      <p:sp>
+        <p:nvSpPr>
+          <p:cNvPr id="4" name="Slide Number Placeholder 3"/>
+          <p:cNvSpPr>
+            <a:spLocks noGrp="1"/>
+          </p:cNvSpPr>
+          <p:nvPr>
+            <p:ph type="sldNum" sz="quarter" idx="5"/>
+          </p:nvPr>
+        </p:nvSpPr>
+        <p:spPr/>
+        <p:txBody>
+          <a:bodyPr/>
+          <a:lstStyle/>
+          <a:p>
+            <a:fld id="{9583DEA5-E342-4DB2-B087-D0B9C490B19E}" type="slidenum">
+              <a:rPr lang="nl-NL" smtClean="0"/>
+              <a:t>39</a:t>
+            </a:fld>
+            <a:endParaRPr lang="nl-NL"/>
+          </a:p>
+        </p:txBody>
+      </p:sp>
+    </p:spTree>
+    <p:extLst>
+      <p:ext uri="{BB962C8B-B14F-4D97-AF65-F5344CB8AC3E}">
+        <p14:creationId xmlns:p14="http://schemas.microsoft.com/office/powerpoint/2010/main" val="2010717564"/>
+      </p:ext>
+    </p:extLst>
+  </p:cSld>
+  <p:clrMapOvr>
+    <a:masterClrMapping/>
+  </p:clrMapOvr>
+</p:notes>
+</file>
+
+<file path=ppt/notesSlides/notesSlide7.xml><?xml version="1.0" encoding="utf-8"?>
+<p:notes xmlns:a="http://schemas.openxmlformats.org/drawingml/2006/main" xmlns:r="http://schemas.openxmlformats.org/officeDocument/2006/relationships" xmlns:p="http://schemas.openxmlformats.org/presentationml/2006/main">
+  <p:cSld>
+    <p:spTree>
+      <p:nvGrpSpPr>
+        <p:cNvPr id="1" name=""/>
+        <p:cNvGrpSpPr/>
+        <p:nvPr/>
+      </p:nvGrpSpPr>
+      <p:grpSpPr>
+        <a:xfrm>
+          <a:off x="0" y="0"/>
+          <a:ext cx="0" cy="0"/>
+          <a:chOff x="0" y="0"/>
+          <a:chExt cx="0" cy="0"/>
+        </a:xfrm>
+      </p:grpSpPr>
+      <p:sp>
+        <p:nvSpPr>
+          <p:cNvPr id="2" name="Slide Image Placeholder 1"/>
+          <p:cNvSpPr>
+            <a:spLocks noGrp="1" noRot="1" noChangeAspect="1"/>
+          </p:cNvSpPr>
+          <p:nvPr>
+            <p:ph type="sldImg"/>
+          </p:nvPr>
+        </p:nvSpPr>
+        <p:spPr/>
+      </p:sp>
+      <p:sp>
+        <p:nvSpPr>
+          <p:cNvPr id="3" name="Notes Placeholder 2"/>
+          <p:cNvSpPr>
+            <a:spLocks noGrp="1"/>
+          </p:cNvSpPr>
+          <p:nvPr>
+            <p:ph type="body" idx="1"/>
+          </p:nvPr>
+        </p:nvSpPr>
+        <p:spPr/>
+        <p:txBody>
+          <a:bodyPr/>
+          <a:lstStyle/>
+          <a:p>
+            <a:r>
+              <a:rPr lang="en-US" dirty="0"/>
+              <a:t>Demo: exception.py / VS Code debugger</a:t>
+            </a:r>
+            <a:endParaRPr lang="nl-NL" dirty="0"/>
+          </a:p>
+        </p:txBody>
+      </p:sp>
+      <p:sp>
+        <p:nvSpPr>
+          <p:cNvPr id="4" name="Slide Number Placeholder 3"/>
+          <p:cNvSpPr>
+            <a:spLocks noGrp="1"/>
+          </p:cNvSpPr>
+          <p:nvPr>
+            <p:ph type="sldNum" sz="quarter" idx="5"/>
+          </p:nvPr>
+        </p:nvSpPr>
+        <p:spPr/>
+        <p:txBody>
+          <a:bodyPr/>
+          <a:lstStyle/>
+          <a:p>
+            <a:fld id="{9583DEA5-E342-4DB2-B087-D0B9C490B19E}" type="slidenum">
+              <a:rPr lang="nl-NL" smtClean="0"/>
+              <a:t>40</a:t>
+            </a:fld>
+            <a:endParaRPr lang="nl-NL"/>
+          </a:p>
+        </p:txBody>
+      </p:sp>
+    </p:spTree>
+    <p:extLst>
+      <p:ext uri="{BB962C8B-B14F-4D97-AF65-F5344CB8AC3E}">
+        <p14:creationId xmlns:p14="http://schemas.microsoft.com/office/powerpoint/2010/main" val="1753188619"/>
+      </p:ext>
+    </p:extLst>
+  </p:cSld>
+  <p:clrMapOvr>
+    <a:masterClrMapping/>
+  </p:clrMapOvr>
+</p:notes>
+</file>
+
+<file path=ppt/notesSlides/notesSlide8.xml><?xml version="1.0" encoding="utf-8"?>
+<p:notes xmlns:a="http://schemas.openxmlformats.org/drawingml/2006/main" xmlns:r="http://schemas.openxmlformats.org/officeDocument/2006/relationships" xmlns:p="http://schemas.openxmlformats.org/presentationml/2006/main">
+  <p:cSld>
+    <p:spTree>
+      <p:nvGrpSpPr>
+        <p:cNvPr id="1" name=""/>
+        <p:cNvGrpSpPr/>
+        <p:nvPr/>
+      </p:nvGrpSpPr>
+      <p:grpSpPr>
+        <a:xfrm>
+          <a:off x="0" y="0"/>
+          <a:ext cx="0" cy="0"/>
+          <a:chOff x="0" y="0"/>
+          <a:chExt cx="0" cy="0"/>
+        </a:xfrm>
+      </p:grpSpPr>
+      <p:sp>
+        <p:nvSpPr>
+          <p:cNvPr id="2" name="Slide Image Placeholder 1"/>
+          <p:cNvSpPr>
+            <a:spLocks noGrp="1" noRot="1" noChangeAspect="1"/>
+          </p:cNvSpPr>
+          <p:nvPr>
+            <p:ph type="sldImg"/>
+          </p:nvPr>
+        </p:nvSpPr>
+        <p:spPr/>
+      </p:sp>
+      <p:sp>
+        <p:nvSpPr>
+          <p:cNvPr id="3" name="Notes Placeholder 2"/>
+          <p:cNvSpPr>
+            <a:spLocks noGrp="1"/>
+          </p:cNvSpPr>
+          <p:nvPr>
+            <p:ph type="body" idx="1"/>
+          </p:nvPr>
+        </p:nvSpPr>
+        <p:spPr/>
+        <p:txBody>
+          <a:bodyPr/>
+          <a:lstStyle/>
+          <a:p>
+            <a:r>
+              <a:rPr lang="en-US" dirty="0"/>
+              <a:t>Demo: </a:t>
             </a:r>
             <a:r>
               <a:rPr lang="en-US" dirty="0" err="1"/>
-              <a:t>pytest</a:t>
+              <a:t>unit_testing</a:t>
             </a:r>
             <a:r>
               <a:rPr lang="en-US" dirty="0"/>
-              <a:t> parameters</a:t>
+              <a:t>/1_basics</a:t>
+            </a:r>
+            <a:endParaRPr lang="nl-NL" dirty="0"/>
+          </a:p>
+        </p:txBody>
+      </p:sp>
+      <p:sp>
+        <p:nvSpPr>
+          <p:cNvPr id="4" name="Slide Number Placeholder 3"/>
+          <p:cNvSpPr>
+            <a:spLocks noGrp="1"/>
+          </p:cNvSpPr>
+          <p:nvPr>
+            <p:ph type="sldNum" sz="quarter" idx="5"/>
+          </p:nvPr>
+        </p:nvSpPr>
+        <p:spPr/>
+        <p:txBody>
+          <a:bodyPr/>
+          <a:lstStyle/>
+          <a:p>
+            <a:fld id="{9583DEA5-E342-4DB2-B087-D0B9C490B19E}" type="slidenum">
+              <a:rPr lang="nl-NL" smtClean="0"/>
+              <a:t>51</a:t>
+            </a:fld>
+            <a:endParaRPr lang="nl-NL"/>
+          </a:p>
+        </p:txBody>
+      </p:sp>
+    </p:spTree>
+    <p:extLst>
+      <p:ext uri="{BB962C8B-B14F-4D97-AF65-F5344CB8AC3E}">
+        <p14:creationId xmlns:p14="http://schemas.microsoft.com/office/powerpoint/2010/main" val="3485926939"/>
+      </p:ext>
+    </p:extLst>
+  </p:cSld>
+  <p:clrMapOvr>
+    <a:masterClrMapping/>
+  </p:clrMapOvr>
+</p:notes>
+</file>
+
+<file path=ppt/notesSlides/notesSlide9.xml><?xml version="1.0" encoding="utf-8"?>
+<p:notes xmlns:a="http://schemas.openxmlformats.org/drawingml/2006/main" xmlns:r="http://schemas.openxmlformats.org/officeDocument/2006/relationships" xmlns:p="http://schemas.openxmlformats.org/presentationml/2006/main">
+  <p:cSld>
+    <p:spTree>
+      <p:nvGrpSpPr>
+        <p:cNvPr id="1" name=""/>
+        <p:cNvGrpSpPr/>
+        <p:nvPr/>
+      </p:nvGrpSpPr>
+      <p:grpSpPr>
+        <a:xfrm>
+          <a:off x="0" y="0"/>
+          <a:ext cx="0" cy="0"/>
+          <a:chOff x="0" y="0"/>
+          <a:chExt cx="0" cy="0"/>
+        </a:xfrm>
+      </p:grpSpPr>
+      <p:sp>
+        <p:nvSpPr>
+          <p:cNvPr id="2" name="Slide Image Placeholder 1"/>
+          <p:cNvSpPr>
+            <a:spLocks noGrp="1" noRot="1" noChangeAspect="1"/>
+          </p:cNvSpPr>
+          <p:nvPr>
+            <p:ph type="sldImg"/>
+          </p:nvPr>
+        </p:nvSpPr>
+        <p:spPr/>
+      </p:sp>
+      <p:sp>
+        <p:nvSpPr>
+          <p:cNvPr id="3" name="Notes Placeholder 2"/>
+          <p:cNvSpPr>
+            <a:spLocks noGrp="1"/>
+          </p:cNvSpPr>
+          <p:nvPr>
+            <p:ph type="body" idx="1"/>
+          </p:nvPr>
+        </p:nvSpPr>
+        <p:spPr/>
+        <p:txBody>
+          <a:bodyPr/>
+          <a:lstStyle/>
+          <a:p>
+            <a:r>
+              <a:rPr lang="en-US" dirty="0"/>
+              <a:t>Demo: </a:t>
+            </a:r>
+            <a:r>
+              <a:rPr lang="en-US" dirty="0" err="1"/>
+              <a:t>unit_testing</a:t>
+            </a:r>
+            <a:r>
+              <a:rPr lang="en-US" dirty="0"/>
+              <a:t>/2_pytest_parameters</a:t>
             </a:r>
             <a:endParaRPr lang="nl-NL" dirty="0"/>
           </a:p>
@@ -1260,7 +1620,7 @@
           <a:p>
             <a:fld id="{0EBB069A-003F-4FC0-8534-236B0C5C7B5F}" type="datetimeFigureOut">
               <a:rPr lang="en-NL" smtClean="0"/>
-              <a:t>13/09/2024</a:t>
+              <a:t>30/09/2024</a:t>
             </a:fld>
             <a:endParaRPr lang="en-NL"/>
           </a:p>
@@ -1460,7 +1820,7 @@
           <a:p>
             <a:fld id="{0EBB069A-003F-4FC0-8534-236B0C5C7B5F}" type="datetimeFigureOut">
               <a:rPr lang="en-NL" smtClean="0"/>
-              <a:t>13/09/2024</a:t>
+              <a:t>30/09/2024</a:t>
             </a:fld>
             <a:endParaRPr lang="en-NL"/>
           </a:p>
@@ -1670,7 +2030,7 @@
           <a:p>
             <a:fld id="{0EBB069A-003F-4FC0-8534-236B0C5C7B5F}" type="datetimeFigureOut">
               <a:rPr lang="en-NL" smtClean="0"/>
-              <a:t>13/09/2024</a:t>
+              <a:t>30/09/2024</a:t>
             </a:fld>
             <a:endParaRPr lang="en-NL"/>
           </a:p>
@@ -1870,7 +2230,7 @@
           <a:p>
             <a:fld id="{0EBB069A-003F-4FC0-8534-236B0C5C7B5F}" type="datetimeFigureOut">
               <a:rPr lang="en-NL" smtClean="0"/>
-              <a:t>13/09/2024</a:t>
+              <a:t>30/09/2024</a:t>
             </a:fld>
             <a:endParaRPr lang="en-NL"/>
           </a:p>
@@ -2146,7 +2506,7 @@
           <a:p>
             <a:fld id="{0EBB069A-003F-4FC0-8534-236B0C5C7B5F}" type="datetimeFigureOut">
               <a:rPr lang="en-NL" smtClean="0"/>
-              <a:t>13/09/2024</a:t>
+              <a:t>30/09/2024</a:t>
             </a:fld>
             <a:endParaRPr lang="en-NL"/>
           </a:p>
@@ -2414,7 +2774,7 @@
           <a:p>
             <a:fld id="{0EBB069A-003F-4FC0-8534-236B0C5C7B5F}" type="datetimeFigureOut">
               <a:rPr lang="en-NL" smtClean="0"/>
-              <a:t>13/09/2024</a:t>
+              <a:t>30/09/2024</a:t>
             </a:fld>
             <a:endParaRPr lang="en-NL"/>
           </a:p>
@@ -2829,7 +3189,7 @@
           <a:p>
             <a:fld id="{0EBB069A-003F-4FC0-8534-236B0C5C7B5F}" type="datetimeFigureOut">
               <a:rPr lang="en-NL" smtClean="0"/>
-              <a:t>13/09/2024</a:t>
+              <a:t>30/09/2024</a:t>
             </a:fld>
             <a:endParaRPr lang="en-NL"/>
           </a:p>
@@ -2971,7 +3331,7 @@
           <a:p>
             <a:fld id="{0EBB069A-003F-4FC0-8534-236B0C5C7B5F}" type="datetimeFigureOut">
               <a:rPr lang="en-NL" smtClean="0"/>
-              <a:t>13/09/2024</a:t>
+              <a:t>30/09/2024</a:t>
             </a:fld>
             <a:endParaRPr lang="en-NL"/>
           </a:p>
@@ -3084,7 +3444,7 @@
           <a:p>
             <a:fld id="{0EBB069A-003F-4FC0-8534-236B0C5C7B5F}" type="datetimeFigureOut">
               <a:rPr lang="en-NL" smtClean="0"/>
-              <a:t>13/09/2024</a:t>
+              <a:t>30/09/2024</a:t>
             </a:fld>
             <a:endParaRPr lang="en-NL"/>
           </a:p>
@@ -3397,7 +3757,7 @@
           <a:p>
             <a:fld id="{0EBB069A-003F-4FC0-8534-236B0C5C7B5F}" type="datetimeFigureOut">
               <a:rPr lang="en-NL" smtClean="0"/>
-              <a:t>13/09/2024</a:t>
+              <a:t>30/09/2024</a:t>
             </a:fld>
             <a:endParaRPr lang="en-NL"/>
           </a:p>
@@ -3686,7 +4046,7 @@
           <a:p>
             <a:fld id="{0EBB069A-003F-4FC0-8534-236B0C5C7B5F}" type="datetimeFigureOut">
               <a:rPr lang="en-NL" smtClean="0"/>
-              <a:t>13/09/2024</a:t>
+              <a:t>30/09/2024</a:t>
             </a:fld>
             <a:endParaRPr lang="en-NL"/>
           </a:p>
@@ -3929,7 +4289,7 @@
           <a:p>
             <a:fld id="{0EBB069A-003F-4FC0-8534-236B0C5C7B5F}" type="datetimeFigureOut">
               <a:rPr lang="en-NL" smtClean="0"/>
-              <a:t>13/09/2024</a:t>
+              <a:t>30/09/2024</a:t>
             </a:fld>
             <a:endParaRPr lang="en-NL"/>
           </a:p>
@@ -4866,6 +5226,69 @@
               <a:buNone/>
             </a:pPr>
             <a:r>
+              <a:rPr lang="en-US" sz="2000" dirty="0"/>
+              <a:t>Separation of concerns</a:t>
+            </a:r>
+            <a:r>
+              <a:rPr lang="nl-NL" sz="2000" dirty="0"/>
+              <a:t>:</a:t>
+            </a:r>
+          </a:p>
+          <a:p>
+            <a:pPr>
+              <a:lnSpc>
+                <a:spcPct val="150000"/>
+              </a:lnSpc>
+              <a:spcBef>
+                <a:spcPts val="0"/>
+              </a:spcBef>
+              <a:buFontTx/>
+              <a:buChar char="-"/>
+            </a:pPr>
+            <a:r>
+              <a:rPr lang="nl-NL" sz="2000" dirty="0"/>
+              <a:t>Elk onderdeel heeft één duidelijke taak.</a:t>
+            </a:r>
+          </a:p>
+          <a:p>
+            <a:pPr>
+              <a:lnSpc>
+                <a:spcPct val="150000"/>
+              </a:lnSpc>
+              <a:spcBef>
+                <a:spcPts val="0"/>
+              </a:spcBef>
+              <a:buFontTx/>
+              <a:buChar char="-"/>
+            </a:pPr>
+            <a:r>
+              <a:rPr lang="nl-NL" sz="2000" dirty="0"/>
+              <a:t>Lokaliseren van problemen makkelijker.</a:t>
+            </a:r>
+          </a:p>
+          <a:p>
+            <a:pPr marL="0" indent="0">
+              <a:lnSpc>
+                <a:spcPct val="150000"/>
+              </a:lnSpc>
+              <a:spcBef>
+                <a:spcPts val="0"/>
+              </a:spcBef>
+              <a:buNone/>
+            </a:pPr>
+            <a:endParaRPr lang="nl-NL" sz="2000" dirty="0"/>
+          </a:p>
+          <a:p>
+            <a:pPr marL="0" indent="0">
+              <a:lnSpc>
+                <a:spcPct val="150000"/>
+              </a:lnSpc>
+              <a:spcBef>
+                <a:spcPts val="0"/>
+              </a:spcBef>
+              <a:buNone/>
+            </a:pPr>
+            <a:r>
               <a:rPr lang="nl-NL" sz="2000" dirty="0"/>
               <a:t>Deel je code op in:</a:t>
             </a:r>
@@ -4883,7 +5306,7 @@
             </a:pPr>
             <a:r>
               <a:rPr lang="nl-NL" sz="2000" dirty="0"/>
-              <a:t>Folders</a:t>
+              <a:t>Project folder</a:t>
             </a:r>
           </a:p>
           <a:p>
@@ -4899,11 +5322,11 @@
             </a:pPr>
             <a:r>
               <a:rPr lang="nl-NL" sz="2000" dirty="0"/>
-              <a:t>Notebooks en scripts</a:t>
-            </a:r>
-          </a:p>
-          <a:p>
-            <a:pPr lvl="2">
+              <a:t>Notebooks</a:t>
+            </a:r>
+          </a:p>
+          <a:p>
+            <a:pPr lvl="1">
               <a:lnSpc>
                 <a:spcPct val="150000"/>
               </a:lnSpc>
@@ -4914,55 +5337,12 @@
               <a:buChar char="-"/>
             </a:pPr>
             <a:r>
-              <a:rPr lang="nl-NL" dirty="0"/>
-              <a:t>Classes en functies</a:t>
-            </a:r>
-          </a:p>
-          <a:p>
-            <a:pPr marL="0" indent="0">
-              <a:lnSpc>
-                <a:spcPct val="150000"/>
-              </a:lnSpc>
-              <a:spcBef>
-                <a:spcPts val="0"/>
-              </a:spcBef>
-              <a:buNone/>
-            </a:pPr>
-            <a:endParaRPr lang="nl-NL" sz="2000" dirty="0"/>
-          </a:p>
-          <a:p>
-            <a:pPr marL="0" indent="0">
-              <a:lnSpc>
-                <a:spcPct val="150000"/>
-              </a:lnSpc>
-              <a:spcBef>
-                <a:spcPts val="0"/>
-              </a:spcBef>
-              <a:buNone/>
-            </a:pPr>
-            <a:endParaRPr lang="nl-NL" sz="2000" dirty="0"/>
-          </a:p>
-          <a:p>
-            <a:pPr marL="0" indent="0">
-              <a:lnSpc>
-                <a:spcPct val="150000"/>
-              </a:lnSpc>
-              <a:spcBef>
-                <a:spcPts val="0"/>
-              </a:spcBef>
-              <a:buNone/>
-            </a:pPr>
-            <a:r>
-              <a:rPr lang="en-US" sz="2000" dirty="0"/>
-              <a:t>Separation of concerns</a:t>
-            </a:r>
-            <a:r>
               <a:rPr lang="nl-NL" sz="2000" dirty="0"/>
-              <a:t>:</a:t>
-            </a:r>
-          </a:p>
-          <a:p>
-            <a:pPr>
+              <a:t>Folder voor modules</a:t>
+            </a:r>
+          </a:p>
+          <a:p>
+            <a:pPr lvl="2">
               <a:lnSpc>
                 <a:spcPct val="150000"/>
               </a:lnSpc>
@@ -4973,24 +5353,8 @@
               <a:buChar char="-"/>
             </a:pPr>
             <a:r>
-              <a:rPr lang="nl-NL" sz="2000" dirty="0"/>
-              <a:t>Elk onderdeel heeft één duidelijke taak.</a:t>
-            </a:r>
-          </a:p>
-          <a:p>
-            <a:pPr>
-              <a:lnSpc>
-                <a:spcPct val="150000"/>
-              </a:lnSpc>
-              <a:spcBef>
-                <a:spcPts val="0"/>
-              </a:spcBef>
-              <a:buFontTx/>
-              <a:buChar char="-"/>
-            </a:pPr>
-            <a:r>
-              <a:rPr lang="nl-NL" sz="2000" dirty="0"/>
-              <a:t>Lokaliseren van problemen makkelijker.</a:t>
+              <a:rPr lang="nl-NL" dirty="0"/>
+              <a:t>Classes / functies</a:t>
             </a:r>
           </a:p>
         </p:txBody>
@@ -5531,6 +5895,69 @@
               <a:buNone/>
             </a:pPr>
             <a:r>
+              <a:rPr lang="en-US" sz="2000" dirty="0"/>
+              <a:t>Separation of concerns</a:t>
+            </a:r>
+            <a:r>
+              <a:rPr lang="nl-NL" sz="2000" dirty="0"/>
+              <a:t>:</a:t>
+            </a:r>
+          </a:p>
+          <a:p>
+            <a:pPr>
+              <a:lnSpc>
+                <a:spcPct val="150000"/>
+              </a:lnSpc>
+              <a:spcBef>
+                <a:spcPts val="0"/>
+              </a:spcBef>
+              <a:buFontTx/>
+              <a:buChar char="-"/>
+            </a:pPr>
+            <a:r>
+              <a:rPr lang="nl-NL" sz="2000" dirty="0"/>
+              <a:t>Elk onderdeel heeft één duidelijke taak.</a:t>
+            </a:r>
+          </a:p>
+          <a:p>
+            <a:pPr>
+              <a:lnSpc>
+                <a:spcPct val="150000"/>
+              </a:lnSpc>
+              <a:spcBef>
+                <a:spcPts val="0"/>
+              </a:spcBef>
+              <a:buFontTx/>
+              <a:buChar char="-"/>
+            </a:pPr>
+            <a:r>
+              <a:rPr lang="nl-NL" sz="2000" dirty="0"/>
+              <a:t>Lokaliseren van problemen makkelijker.</a:t>
+            </a:r>
+          </a:p>
+          <a:p>
+            <a:pPr marL="0" indent="0">
+              <a:lnSpc>
+                <a:spcPct val="150000"/>
+              </a:lnSpc>
+              <a:spcBef>
+                <a:spcPts val="0"/>
+              </a:spcBef>
+              <a:buNone/>
+            </a:pPr>
+            <a:endParaRPr lang="nl-NL" sz="2000" dirty="0"/>
+          </a:p>
+          <a:p>
+            <a:pPr marL="0" indent="0">
+              <a:lnSpc>
+                <a:spcPct val="150000"/>
+              </a:lnSpc>
+              <a:spcBef>
+                <a:spcPts val="0"/>
+              </a:spcBef>
+              <a:buNone/>
+            </a:pPr>
+            <a:r>
               <a:rPr lang="nl-NL" sz="2000" dirty="0"/>
               <a:t>Deel je code op in:</a:t>
             </a:r>
@@ -5548,11 +5975,25 @@
             </a:pPr>
             <a:r>
               <a:rPr lang="nl-NL" sz="2000" dirty="0"/>
-              <a:t>Aparte scripts / Notebooks.</a:t>
-            </a:r>
-          </a:p>
-          <a:p>
-            <a:pPr>
+              <a:t>Project folder		   </a:t>
+            </a:r>
+            <a:r>
+              <a:rPr lang="nl-NL" sz="2000" dirty="0" err="1">
+                <a:latin typeface="Courier New" panose="02070309020205020404" pitchFamily="49" charset="0"/>
+                <a:cs typeface="Courier New" panose="02070309020205020404" pitchFamily="49" charset="0"/>
+              </a:rPr>
+              <a:t>azure</a:t>
+            </a:r>
+            <a:r>
+              <a:rPr lang="nl-NL" sz="2000" dirty="0">
+                <a:latin typeface="Courier New" panose="02070309020205020404" pitchFamily="49" charset="0"/>
+                <a:cs typeface="Courier New" panose="02070309020205020404" pitchFamily="49" charset="0"/>
+              </a:rPr>
+              <a:t>-database</a:t>
+            </a:r>
+          </a:p>
+          <a:p>
+            <a:pPr lvl="1">
               <a:lnSpc>
                 <a:spcPct val="150000"/>
               </a:lnSpc>
@@ -5564,50 +6005,22 @@
             </a:pPr>
             <a:r>
               <a:rPr lang="nl-NL" sz="2000" dirty="0"/>
-              <a:t>Verschillende classes / functies.</a:t>
-            </a:r>
-          </a:p>
-          <a:p>
-            <a:pPr marL="0" indent="0">
-              <a:lnSpc>
-                <a:spcPct val="150000"/>
-              </a:lnSpc>
-              <a:spcBef>
-                <a:spcPts val="0"/>
-              </a:spcBef>
-              <a:buNone/>
-            </a:pPr>
-            <a:endParaRPr lang="nl-NL" sz="2000" dirty="0"/>
-          </a:p>
-          <a:p>
-            <a:pPr marL="0" indent="0">
-              <a:lnSpc>
-                <a:spcPct val="150000"/>
-              </a:lnSpc>
-              <a:spcBef>
-                <a:spcPts val="0"/>
-              </a:spcBef>
-              <a:buNone/>
-            </a:pPr>
-            <a:endParaRPr lang="nl-NL" sz="2000" dirty="0"/>
-          </a:p>
-          <a:p>
-            <a:pPr marL="0" indent="0">
-              <a:lnSpc>
-                <a:spcPct val="150000"/>
-              </a:lnSpc>
-              <a:spcBef>
-                <a:spcPts val="0"/>
-              </a:spcBef>
-              <a:buNone/>
-            </a:pPr>
-            <a:r>
-              <a:rPr lang="nl-NL" sz="2000" dirty="0"/>
-              <a:t>Elk onderdeel heeft één duidelijk doel:</a:t>
-            </a:r>
-          </a:p>
-          <a:p>
-            <a:pPr>
+              <a:t>Code folder	   </a:t>
+            </a:r>
+            <a:r>
+              <a:rPr lang="nl-NL" sz="2000" dirty="0" err="1">
+                <a:latin typeface="Courier New" panose="02070309020205020404" pitchFamily="49" charset="0"/>
+                <a:cs typeface="Courier New" panose="02070309020205020404" pitchFamily="49" charset="0"/>
+              </a:rPr>
+              <a:t>src</a:t>
+            </a:r>
+            <a:endParaRPr lang="nl-NL" sz="2000" dirty="0">
+              <a:latin typeface="Courier New" panose="02070309020205020404" pitchFamily="49" charset="0"/>
+              <a:cs typeface="Courier New" panose="02070309020205020404" pitchFamily="49" charset="0"/>
+            </a:endParaRPr>
+          </a:p>
+          <a:p>
+            <a:pPr lvl="2">
               <a:lnSpc>
                 <a:spcPct val="150000"/>
               </a:lnSpc>
@@ -5618,13 +6031,20 @@
               <a:buChar char="-"/>
             </a:pPr>
             <a:r>
-              <a:rPr lang="en-US" sz="2000" dirty="0"/>
-              <a:t>Separation of concerns</a:t>
-            </a:r>
-            <a:r>
-              <a:rPr lang="nl-NL" sz="2000" dirty="0"/>
-              <a:t>.</a:t>
-            </a:r>
+              <a:rPr lang="nl-NL" dirty="0"/>
+              <a:t>Package folder	   </a:t>
+            </a:r>
+            <a:r>
+              <a:rPr lang="nl-NL" dirty="0" err="1">
+                <a:latin typeface="Courier New" panose="02070309020205020404" pitchFamily="49" charset="0"/>
+                <a:cs typeface="Courier New" panose="02070309020205020404" pitchFamily="49" charset="0"/>
+              </a:rPr>
+              <a:t>azure_database</a:t>
+            </a:r>
+            <a:endParaRPr lang="nl-NL" dirty="0">
+              <a:latin typeface="Courier New" panose="02070309020205020404" pitchFamily="49" charset="0"/>
+              <a:cs typeface="Courier New" panose="02070309020205020404" pitchFamily="49" charset="0"/>
+            </a:endParaRPr>
           </a:p>
           <a:p>
             <a:pPr>
@@ -5639,8 +6059,19 @@
             </a:pPr>
             <a:r>
               <a:rPr lang="nl-NL" sz="2000" dirty="0"/>
-              <a:t>Makkelijker om problemen te lokaliseren.</a:t>
-            </a:r>
+              <a:t>Setup bestand		   </a:t>
+            </a:r>
+            <a:r>
+              <a:rPr lang="nl-NL" sz="2000" dirty="0" err="1">
+                <a:latin typeface="Courier New" panose="02070309020205020404" pitchFamily="49" charset="0"/>
+                <a:cs typeface="Courier New" panose="02070309020205020404" pitchFamily="49" charset="0"/>
+              </a:rPr>
+              <a:t>pyproject.toml</a:t>
+            </a:r>
+            <a:endParaRPr lang="nl-NL" sz="2000" dirty="0">
+              <a:latin typeface="Courier New" panose="02070309020205020404" pitchFamily="49" charset="0"/>
+              <a:cs typeface="Courier New" panose="02070309020205020404" pitchFamily="49" charset="0"/>
+            </a:endParaRPr>
           </a:p>
         </p:txBody>
       </p:sp>
@@ -7843,7 +8274,7 @@
                 <a:latin typeface="Courier New" panose="02070309020205020404" pitchFamily="49" charset="0"/>
                 <a:cs typeface="Courier New" panose="02070309020205020404" pitchFamily="49" charset="0"/>
               </a:rPr>
-              <a:t>"""Prepare dataset A."""</a:t>
+              <a:t>"""Prepares dataset A."""</a:t>
             </a:r>
           </a:p>
           <a:p>
@@ -7860,11 +8291,18 @@
               <a:buNone/>
             </a:pPr>
             <a:r>
+              <a:rPr lang="en-US" sz="1600" dirty="0">
+                <a:latin typeface="Courier New" panose="02070309020205020404" pitchFamily="49" charset="0"/>
+                <a:cs typeface="Courier New" panose="02070309020205020404" pitchFamily="49" charset="0"/>
+              </a:rPr>
+              <a:t>  def </a:t>
+            </a:r>
+            <a:r>
               <a:rPr lang="en-US" sz="1600" b="1" dirty="0">
                 <a:latin typeface="Courier New" panose="02070309020205020404" pitchFamily="49" charset="0"/>
                 <a:cs typeface="Courier New" panose="02070309020205020404" pitchFamily="49" charset="0"/>
               </a:rPr>
-              <a:t>  def __</a:t>
+              <a:t>__</a:t>
             </a:r>
             <a:r>
               <a:rPr lang="en-US" sz="1600" b="1" dirty="0" err="1">
@@ -7878,7 +8316,14 @@
                 <a:latin typeface="Courier New" panose="02070309020205020404" pitchFamily="49" charset="0"/>
                 <a:cs typeface="Courier New" panose="02070309020205020404" pitchFamily="49" charset="0"/>
               </a:rPr>
-              <a:t>__(self, path):</a:t>
+              <a:t>__</a:t>
+            </a:r>
+            <a:r>
+              <a:rPr lang="en-US" sz="1600" dirty="0">
+                <a:latin typeface="Courier New" panose="02070309020205020404" pitchFamily="49" charset="0"/>
+                <a:cs typeface="Courier New" panose="02070309020205020404" pitchFamily="49" charset="0"/>
+              </a:rPr>
+              <a:t>(self, path):</a:t>
             </a:r>
           </a:p>
           <a:p>
@@ -7907,11 +8352,25 @@
               <a:buNone/>
             </a:pPr>
             <a:r>
+              <a:rPr lang="en-US" sz="1600" dirty="0">
+                <a:latin typeface="Courier New" panose="02070309020205020404" pitchFamily="49" charset="0"/>
+                <a:cs typeface="Courier New" panose="02070309020205020404" pitchFamily="49" charset="0"/>
+              </a:rPr>
+              <a:t>  def </a:t>
+            </a:r>
+            <a:r>
               <a:rPr lang="en-US" sz="1600" b="1" dirty="0">
                 <a:latin typeface="Courier New" panose="02070309020205020404" pitchFamily="49" charset="0"/>
                 <a:cs typeface="Courier New" panose="02070309020205020404" pitchFamily="49" charset="0"/>
               </a:rPr>
-              <a:t>  def _load(self, path):</a:t>
+              <a:t>_load</a:t>
+            </a:r>
+            <a:r>
+              <a:rPr lang="en-US" sz="1600" dirty="0">
+                <a:latin typeface="Courier New" panose="02070309020205020404" pitchFamily="49" charset="0"/>
+                <a:cs typeface="Courier New" panose="02070309020205020404" pitchFamily="49" charset="0"/>
+              </a:rPr>
+              <a:t>(self, path):</a:t>
             </a:r>
           </a:p>
           <a:p>
@@ -7945,11 +8404,18 @@
               <a:buNone/>
             </a:pPr>
             <a:r>
+              <a:rPr lang="en-US" sz="1600" dirty="0">
+                <a:latin typeface="Courier New" panose="02070309020205020404" pitchFamily="49" charset="0"/>
+                <a:cs typeface="Courier New" panose="02070309020205020404" pitchFamily="49" charset="0"/>
+              </a:rPr>
+              <a:t>  def </a:t>
+            </a:r>
+            <a:r>
               <a:rPr lang="en-US" sz="1600" b="1" dirty="0">
                 <a:latin typeface="Courier New" panose="02070309020205020404" pitchFamily="49" charset="0"/>
                 <a:cs typeface="Courier New" panose="02070309020205020404" pitchFamily="49" charset="0"/>
               </a:rPr>
-              <a:t>  def _</a:t>
+              <a:t>_</a:t>
             </a:r>
             <a:r>
               <a:rPr lang="en-US" sz="1600" b="1" dirty="0" err="1">
@@ -7959,7 +8425,7 @@
               <a:t>fill_missing</a:t>
             </a:r>
             <a:r>
-              <a:rPr lang="en-US" sz="1600" b="1" dirty="0">
+              <a:rPr lang="en-US" sz="1600" dirty="0">
                 <a:latin typeface="Courier New" panose="02070309020205020404" pitchFamily="49" charset="0"/>
                 <a:cs typeface="Courier New" panose="02070309020205020404" pitchFamily="49" charset="0"/>
               </a:rPr>
@@ -9041,7 +9507,15 @@
             </a:pPr>
             <a:r>
               <a:rPr lang="nl-NL" sz="2000" dirty="0"/>
-              <a:t>Vermijd over-engineering; implementeer alleen wat op korte termijn nodig is.</a:t>
+              <a:t>Vermijd premature </a:t>
+            </a:r>
+            <a:r>
+              <a:rPr lang="nl-NL" sz="2000" dirty="0" err="1"/>
+              <a:t>optimization</a:t>
+            </a:r>
+            <a:r>
+              <a:rPr lang="nl-NL" sz="2000" dirty="0"/>
+              <a:t>; implementeer alleen wat nu nodig is.</a:t>
             </a:r>
           </a:p>
           <a:p>
@@ -9058,7 +9532,7 @@
             </a:pPr>
             <a:r>
               <a:rPr lang="nl-NL" sz="2000" dirty="0"/>
-              <a:t>Configuratie waar noodzakelijk; kies verstandige standaard instellingen.</a:t>
+              <a:t>Alleen noodzakelijke configuratie; kies verstandige standaard instellingen.</a:t>
             </a:r>
           </a:p>
           <a:p>
@@ -9077,27 +9551,6 @@
               <a:rPr lang="nl-NL" sz="2000" dirty="0"/>
               <a:t>Meer code is complexer; meer documentatie, meer onderhoud, et cetera.</a:t>
             </a:r>
-          </a:p>
-          <a:p>
-            <a:pPr marL="0" indent="0">
-              <a:buNone/>
-            </a:pPr>
-            <a:endParaRPr lang="nl-NL" sz="2000" dirty="0"/>
-          </a:p>
-          <a:p>
-            <a:pPr>
-              <a:buFontTx/>
-              <a:buChar char="-"/>
-            </a:pPr>
-            <a:r>
-              <a:rPr lang="nl-NL" sz="2000" dirty="0"/>
-              <a:t>Maak je </a:t>
-            </a:r>
-            <a:r>
-              <a:rPr lang="nl-NL" sz="2000"/>
-              <a:t>code uitbreidbaar.</a:t>
-            </a:r>
-            <a:endParaRPr lang="nl-NL" sz="2000" dirty="0"/>
           </a:p>
           <a:p>
             <a:pPr marL="0" indent="0">
@@ -9354,39 +9807,173 @@
               <a:buNone/>
             </a:pPr>
             <a:r>
+              <a:rPr lang="en-US" sz="1400" dirty="0">
+                <a:latin typeface="Courier New" panose="02070309020205020404" pitchFamily="49" charset="0"/>
+                <a:cs typeface="Courier New" panose="02070309020205020404" pitchFamily="49" charset="0"/>
+              </a:rPr>
+              <a:t>def mean(values, </a:t>
+            </a:r>
+            <a:r>
+              <a:rPr lang="en-US" sz="1400" b="1" dirty="0" err="1">
+                <a:latin typeface="Courier New" panose="02070309020205020404" pitchFamily="49" charset="0"/>
+                <a:cs typeface="Courier New" panose="02070309020205020404" pitchFamily="49" charset="0"/>
+              </a:rPr>
+              <a:t>dropna</a:t>
+            </a:r>
+            <a:r>
+              <a:rPr lang="en-US" sz="1400" dirty="0">
+                <a:latin typeface="Courier New" panose="02070309020205020404" pitchFamily="49" charset="0"/>
+                <a:cs typeface="Courier New" panose="02070309020205020404" pitchFamily="49" charset="0"/>
+              </a:rPr>
+              <a:t>=True):</a:t>
+            </a:r>
+          </a:p>
+          <a:p>
+            <a:pPr marL="0" indent="0">
+              <a:lnSpc>
+                <a:spcPct val="100000"/>
+              </a:lnSpc>
+              <a:spcBef>
+                <a:spcPts val="0"/>
+              </a:spcBef>
+              <a:buNone/>
+            </a:pPr>
+            <a:endParaRPr lang="en-US" sz="1400" dirty="0">
+              <a:latin typeface="Courier New" panose="02070309020205020404" pitchFamily="49" charset="0"/>
+              <a:cs typeface="Courier New" panose="02070309020205020404" pitchFamily="49" charset="0"/>
+            </a:endParaRPr>
+          </a:p>
+          <a:p>
+            <a:pPr marL="0" indent="0">
+              <a:lnSpc>
+                <a:spcPct val="100000"/>
+              </a:lnSpc>
+              <a:spcBef>
+                <a:spcPts val="0"/>
+              </a:spcBef>
+              <a:buNone/>
+            </a:pPr>
+            <a:r>
+              <a:rPr lang="en-US" sz="1400" dirty="0">
+                <a:latin typeface="Courier New" panose="02070309020205020404" pitchFamily="49" charset="0"/>
+                <a:cs typeface="Courier New" panose="02070309020205020404" pitchFamily="49" charset="0"/>
+              </a:rPr>
+              <a:t>  </a:t>
+            </a:r>
+            <a:r>
               <a:rPr lang="en-US" sz="1400" b="1" dirty="0">
                 <a:latin typeface="Courier New" panose="02070309020205020404" pitchFamily="49" charset="0"/>
                 <a:cs typeface="Courier New" panose="02070309020205020404" pitchFamily="49" charset="0"/>
               </a:rPr>
-              <a:t>def mean(</a:t>
-            </a:r>
+              <a:t>filtered = [</a:t>
+            </a:r>
+          </a:p>
+          <a:p>
+            <a:pPr marL="0" indent="0">
+              <a:lnSpc>
+                <a:spcPct val="100000"/>
+              </a:lnSpc>
+              <a:spcBef>
+                <a:spcPts val="0"/>
+              </a:spcBef>
+              <a:buNone/>
+            </a:pPr>
+            <a:r>
+              <a:rPr lang="en-US" sz="1400" b="1" dirty="0">
+                <a:latin typeface="Courier New" panose="02070309020205020404" pitchFamily="49" charset="0"/>
+                <a:cs typeface="Courier New" panose="02070309020205020404" pitchFamily="49" charset="0"/>
+              </a:rPr>
+              <a:t>    v for v in values if v is not None</a:t>
+            </a:r>
+          </a:p>
+          <a:p>
+            <a:pPr marL="0" indent="0">
+              <a:lnSpc>
+                <a:spcPct val="100000"/>
+              </a:lnSpc>
+              <a:spcBef>
+                <a:spcPts val="0"/>
+              </a:spcBef>
+              <a:buNone/>
+            </a:pPr>
+            <a:r>
+              <a:rPr lang="en-US" sz="1400" b="1" dirty="0">
+                <a:latin typeface="Courier New" panose="02070309020205020404" pitchFamily="49" charset="0"/>
+                <a:cs typeface="Courier New" panose="02070309020205020404" pitchFamily="49" charset="0"/>
+              </a:rPr>
+              <a:t>  ]</a:t>
+            </a:r>
+            <a:endParaRPr lang="en-US" sz="1400" dirty="0">
+              <a:latin typeface="Courier New" panose="02070309020205020404" pitchFamily="49" charset="0"/>
+              <a:cs typeface="Courier New" panose="02070309020205020404" pitchFamily="49" charset="0"/>
+            </a:endParaRPr>
+          </a:p>
+          <a:p>
+            <a:pPr marL="0" indent="0">
+              <a:lnSpc>
+                <a:spcPct val="100000"/>
+              </a:lnSpc>
+              <a:spcBef>
+                <a:spcPts val="0"/>
+              </a:spcBef>
+              <a:buNone/>
+            </a:pPr>
             <a:r>
               <a:rPr lang="en-US" sz="1400" dirty="0">
                 <a:latin typeface="Courier New" panose="02070309020205020404" pitchFamily="49" charset="0"/>
                 <a:cs typeface="Courier New" panose="02070309020205020404" pitchFamily="49" charset="0"/>
               </a:rPr>
-              <a:t>values, </a:t>
-            </a:r>
-            <a:r>
-              <a:rPr lang="en-US" sz="1400" dirty="0" err="1">
+              <a:t>  total = sum(filtered)</a:t>
+            </a:r>
+          </a:p>
+          <a:p>
+            <a:pPr marL="0" indent="0">
+              <a:lnSpc>
+                <a:spcPct val="100000"/>
+              </a:lnSpc>
+              <a:spcBef>
+                <a:spcPts val="0"/>
+              </a:spcBef>
+              <a:buNone/>
+            </a:pPr>
+            <a:r>
+              <a:rPr lang="en-US" sz="1400" dirty="0">
+                <a:latin typeface="Courier New" panose="02070309020205020404" pitchFamily="49" charset="0"/>
+                <a:cs typeface="Courier New" panose="02070309020205020404" pitchFamily="49" charset="0"/>
+              </a:rPr>
+              <a:t>  </a:t>
+            </a:r>
+          </a:p>
+          <a:p>
+            <a:pPr marL="0" indent="0">
+              <a:lnSpc>
+                <a:spcPct val="100000"/>
+              </a:lnSpc>
+              <a:spcBef>
+                <a:spcPts val="0"/>
+              </a:spcBef>
+              <a:buNone/>
+            </a:pPr>
+            <a:r>
+              <a:rPr lang="en-US" sz="1400" b="1" dirty="0">
+                <a:latin typeface="Courier New" panose="02070309020205020404" pitchFamily="49" charset="0"/>
+                <a:cs typeface="Courier New" panose="02070309020205020404" pitchFamily="49" charset="0"/>
+              </a:rPr>
+              <a:t>  if </a:t>
+            </a:r>
+            <a:r>
+              <a:rPr lang="en-US" sz="1400" b="1" dirty="0" err="1">
                 <a:latin typeface="Courier New" panose="02070309020205020404" pitchFamily="49" charset="0"/>
                 <a:cs typeface="Courier New" panose="02070309020205020404" pitchFamily="49" charset="0"/>
               </a:rPr>
               <a:t>dropna</a:t>
             </a:r>
             <a:r>
-              <a:rPr lang="en-US" sz="1400" dirty="0">
-                <a:latin typeface="Courier New" panose="02070309020205020404" pitchFamily="49" charset="0"/>
-                <a:cs typeface="Courier New" panose="02070309020205020404" pitchFamily="49" charset="0"/>
-              </a:rPr>
-              <a:t>=True</a:t>
-            </a:r>
-            <a:r>
               <a:rPr lang="en-US" sz="1400" b="1" dirty="0">
                 <a:latin typeface="Courier New" panose="02070309020205020404" pitchFamily="49" charset="0"/>
                 <a:cs typeface="Courier New" panose="02070309020205020404" pitchFamily="49" charset="0"/>
               </a:rPr>
-              <a:t>):</a:t>
+              <a:t>:</a:t>
             </a:r>
           </a:p>
           <a:p>
@@ -9400,161 +9987,21 @@
               <a:buNone/>
             </a:pPr>
             <a:r>
-              <a:rPr lang="en-US" sz="1400" dirty="0">
-                <a:latin typeface="Courier New" panose="02070309020205020404" pitchFamily="49" charset="0"/>
-                <a:cs typeface="Courier New" panose="02070309020205020404" pitchFamily="49" charset="0"/>
-              </a:rPr>
-              <a:t>  filtered = [</a:t>
-            </a:r>
-          </a:p>
-          <a:p>
-            <a:pPr marL="0" indent="0">
-              <a:lnSpc>
-                <a:spcPct val="100000"/>
-              </a:lnSpc>
-              <a:spcBef>
-                <a:spcPts val="0"/>
-              </a:spcBef>
-              <a:buNone/>
-            </a:pPr>
-            <a:r>
-              <a:rPr lang="en-US" sz="1400" dirty="0">
-                <a:latin typeface="Courier New" panose="02070309020205020404" pitchFamily="49" charset="0"/>
-                <a:cs typeface="Courier New" panose="02070309020205020404" pitchFamily="49" charset="0"/>
-              </a:rPr>
-              <a:t>    v for v in values if v is not None</a:t>
-            </a:r>
-          </a:p>
-          <a:p>
-            <a:pPr marL="0" indent="0">
-              <a:lnSpc>
-                <a:spcPct val="100000"/>
-              </a:lnSpc>
-              <a:spcBef>
-                <a:spcPts val="0"/>
-              </a:spcBef>
-              <a:buNone/>
-            </a:pPr>
-            <a:r>
-              <a:rPr lang="en-US" sz="1400" dirty="0">
-                <a:latin typeface="Courier New" panose="02070309020205020404" pitchFamily="49" charset="0"/>
-                <a:cs typeface="Courier New" panose="02070309020205020404" pitchFamily="49" charset="0"/>
-              </a:rPr>
-              <a:t>  ]</a:t>
-            </a:r>
-          </a:p>
-          <a:p>
-            <a:pPr marL="0" indent="0">
-              <a:lnSpc>
-                <a:spcPct val="100000"/>
-              </a:lnSpc>
-              <a:spcBef>
-                <a:spcPts val="0"/>
-              </a:spcBef>
-              <a:buNone/>
-            </a:pPr>
-            <a:r>
-              <a:rPr lang="en-US" sz="1400" dirty="0">
-                <a:latin typeface="Courier New" panose="02070309020205020404" pitchFamily="49" charset="0"/>
-                <a:cs typeface="Courier New" panose="02070309020205020404" pitchFamily="49" charset="0"/>
-              </a:rPr>
-              <a:t>  </a:t>
-            </a:r>
-          </a:p>
-          <a:p>
-            <a:pPr marL="0" indent="0">
-              <a:lnSpc>
-                <a:spcPct val="100000"/>
-              </a:lnSpc>
-              <a:spcBef>
-                <a:spcPts val="0"/>
-              </a:spcBef>
-              <a:buNone/>
-            </a:pPr>
-            <a:r>
-              <a:rPr lang="en-US" sz="1400" dirty="0">
-                <a:latin typeface="Courier New" panose="02070309020205020404" pitchFamily="49" charset="0"/>
-                <a:cs typeface="Courier New" panose="02070309020205020404" pitchFamily="49" charset="0"/>
-              </a:rPr>
-              <a:t>  total = sum(filtered)</a:t>
-            </a:r>
-          </a:p>
-          <a:p>
-            <a:pPr marL="0" indent="0">
-              <a:lnSpc>
-                <a:spcPct val="100000"/>
-              </a:lnSpc>
-              <a:spcBef>
-                <a:spcPts val="0"/>
-              </a:spcBef>
-              <a:buNone/>
-            </a:pPr>
-            <a:r>
-              <a:rPr lang="en-US" sz="1400" dirty="0">
-                <a:latin typeface="Courier New" panose="02070309020205020404" pitchFamily="49" charset="0"/>
-                <a:cs typeface="Courier New" panose="02070309020205020404" pitchFamily="49" charset="0"/>
-              </a:rPr>
-              <a:t>  </a:t>
-            </a:r>
-          </a:p>
-          <a:p>
-            <a:pPr marL="0" indent="0">
-              <a:lnSpc>
-                <a:spcPct val="100000"/>
-              </a:lnSpc>
-              <a:spcBef>
-                <a:spcPts val="0"/>
-              </a:spcBef>
-              <a:buNone/>
-            </a:pPr>
-            <a:r>
-              <a:rPr lang="en-US" sz="1400" dirty="0">
-                <a:latin typeface="Courier New" panose="02070309020205020404" pitchFamily="49" charset="0"/>
-                <a:cs typeface="Courier New" panose="02070309020205020404" pitchFamily="49" charset="0"/>
-              </a:rPr>
-              <a:t>  if </a:t>
-            </a:r>
-            <a:r>
-              <a:rPr lang="en-US" sz="1400" dirty="0" err="1">
-                <a:latin typeface="Courier New" panose="02070309020205020404" pitchFamily="49" charset="0"/>
-                <a:cs typeface="Courier New" panose="02070309020205020404" pitchFamily="49" charset="0"/>
-              </a:rPr>
-              <a:t>dropna</a:t>
-            </a:r>
-            <a:r>
-              <a:rPr lang="en-US" sz="1400" dirty="0">
-                <a:latin typeface="Courier New" panose="02070309020205020404" pitchFamily="49" charset="0"/>
-                <a:cs typeface="Courier New" panose="02070309020205020404" pitchFamily="49" charset="0"/>
-              </a:rPr>
-              <a:t>:</a:t>
-            </a:r>
-          </a:p>
-          <a:p>
-            <a:pPr marL="0" indent="0">
-              <a:lnSpc>
-                <a:spcPct val="100000"/>
-              </a:lnSpc>
-              <a:spcBef>
-                <a:spcPts val="0"/>
-              </a:spcBef>
-              <a:buNone/>
-            </a:pPr>
-            <a:r>
-              <a:rPr lang="en-US" sz="1400" dirty="0">
+              <a:rPr lang="en-US" sz="1400" b="1" dirty="0">
                 <a:latin typeface="Courier New" panose="02070309020205020404" pitchFamily="49" charset="0"/>
                 <a:cs typeface="Courier New" panose="02070309020205020404" pitchFamily="49" charset="0"/>
               </a:rPr>
               <a:t>    return total / </a:t>
             </a:r>
             <a:r>
-              <a:rPr lang="en-US" sz="1400" dirty="0" err="1">
+              <a:rPr lang="en-US" sz="1400" b="1" dirty="0" err="1">
                 <a:latin typeface="Courier New" panose="02070309020205020404" pitchFamily="49" charset="0"/>
                 <a:cs typeface="Courier New" panose="02070309020205020404" pitchFamily="49" charset="0"/>
               </a:rPr>
               <a:t>len</a:t>
             </a:r>
             <a:r>
-              <a:rPr lang="en-US" sz="1400" dirty="0">
+              <a:rPr lang="en-US" sz="1400" b="1" dirty="0">
                 <a:latin typeface="Courier New" panose="02070309020205020404" pitchFamily="49" charset="0"/>
                 <a:cs typeface="Courier New" panose="02070309020205020404" pitchFamily="49" charset="0"/>
               </a:rPr>
@@ -15674,10 +16121,10 @@
       </p:grpSpPr>
       <p:sp>
         <p:nvSpPr>
-          <p:cNvPr id="4" name="Title 3">
+          <p:cNvPr id="2" name="Title 1">
             <a:extLst>
               <a:ext uri="{FF2B5EF4-FFF2-40B4-BE49-F238E27FC236}">
-                <a16:creationId xmlns:a16="http://schemas.microsoft.com/office/drawing/2014/main" id="{72C925CA-BCA3-3701-E08E-95652380B32E}"/>
+                <a16:creationId xmlns:a16="http://schemas.microsoft.com/office/drawing/2014/main" id="{39A1D606-8DD1-369C-5C09-471CDD551AD5}"/>
               </a:ext>
             </a:extLst>
           </p:cNvPr>
@@ -15688,24 +16135,31 @@
             <p:ph type="title"/>
           </p:nvPr>
         </p:nvSpPr>
-        <p:spPr/>
+        <p:spPr>
+          <a:xfrm>
+            <a:off x="838200" y="365126"/>
+            <a:ext cx="10515600" cy="718608"/>
+          </a:xfrm>
+        </p:spPr>
         <p:txBody>
-          <a:bodyPr/>
+          <a:bodyPr>
+            <a:normAutofit/>
+          </a:bodyPr>
           <a:lstStyle/>
           <a:p>
             <a:r>
-              <a:rPr lang="nl-NL" dirty="0"/>
-              <a:t>Leesbaarheid</a:t>
+              <a:rPr lang="nl-NL" sz="3600" noProof="0" dirty="0"/>
+              <a:t>The Zen of Python</a:t>
             </a:r>
           </a:p>
         </p:txBody>
       </p:sp>
       <p:sp>
         <p:nvSpPr>
-          <p:cNvPr id="5" name="Text Placeholder 4">
+          <p:cNvPr id="3" name="Content Placeholder 2">
             <a:extLst>
               <a:ext uri="{FF2B5EF4-FFF2-40B4-BE49-F238E27FC236}">
-                <a16:creationId xmlns:a16="http://schemas.microsoft.com/office/drawing/2014/main" id="{1AB31C95-91AF-DF13-FB58-0DA5F2D9F6F7}"/>
+                <a16:creationId xmlns:a16="http://schemas.microsoft.com/office/drawing/2014/main" id="{F4C2D286-E049-0AAB-1360-B7157E11AD7E}"/>
               </a:ext>
             </a:extLst>
           </p:cNvPr>
@@ -15713,22 +16167,864 @@
             <a:spLocks noGrp="1"/>
           </p:cNvSpPr>
           <p:nvPr>
-            <p:ph type="body" idx="1"/>
+            <p:ph idx="1"/>
           </p:nvPr>
         </p:nvSpPr>
-        <p:spPr/>
+        <p:spPr>
+          <a:xfrm>
+            <a:off x="838200" y="1456267"/>
+            <a:ext cx="4571999" cy="4720696"/>
+          </a:xfrm>
+        </p:spPr>
         <p:txBody>
-          <a:bodyPr/>
+          <a:bodyPr>
+            <a:noAutofit/>
+          </a:bodyPr>
           <a:lstStyle/>
           <a:p>
-            <a:endParaRPr lang="en-NL"/>
+            <a:pPr marL="0" indent="0">
+              <a:buNone/>
+            </a:pPr>
+            <a:r>
+              <a:rPr lang="nl-NL" sz="1600" dirty="0"/>
+              <a:t>Programmeren is een creatief proces!</a:t>
+            </a:r>
+          </a:p>
+          <a:p>
+            <a:pPr marL="0" indent="0">
+              <a:buNone/>
+            </a:pPr>
+            <a:endParaRPr lang="nl-NL" sz="1600" dirty="0"/>
+          </a:p>
+          <a:p>
+            <a:pPr marL="0" indent="0">
+              <a:buNone/>
+            </a:pPr>
+            <a:r>
+              <a:rPr lang="nl-NL" sz="1600" dirty="0"/>
+              <a:t>Niet altijd één goede oplossing:</a:t>
+            </a:r>
+          </a:p>
+          <a:p>
+            <a:pPr>
+              <a:buFontTx/>
+              <a:buChar char="-"/>
+            </a:pPr>
+            <a:r>
+              <a:rPr lang="nl-NL" sz="1600" dirty="0"/>
+              <a:t>Werkt het?</a:t>
+            </a:r>
+          </a:p>
+          <a:p>
+            <a:pPr>
+              <a:buFontTx/>
+              <a:buChar char="-"/>
+            </a:pPr>
+            <a:r>
+              <a:rPr lang="nl-NL" sz="1600" dirty="0"/>
+              <a:t>Werkt het efficiënt?</a:t>
+            </a:r>
+          </a:p>
+          <a:p>
+            <a:pPr>
+              <a:buFontTx/>
+              <a:buChar char="-"/>
+            </a:pPr>
+            <a:r>
+              <a:rPr lang="nl-NL" sz="1600" dirty="0"/>
+              <a:t>Werkt het zo eenvoudig mogelijk?</a:t>
+            </a:r>
+          </a:p>
+          <a:p>
+            <a:pPr marL="0" indent="0">
+              <a:buNone/>
+            </a:pPr>
+            <a:endParaRPr lang="nl-NL" sz="1600" dirty="0"/>
+          </a:p>
+          <a:p>
+            <a:pPr marL="0" indent="0">
+              <a:buNone/>
+            </a:pPr>
+            <a:r>
+              <a:rPr lang="nl-NL" sz="1600" dirty="0"/>
+              <a:t>Principes om betere code te schrijven:</a:t>
+            </a:r>
+          </a:p>
+          <a:p>
+            <a:pPr>
+              <a:buFontTx/>
+              <a:buChar char="-"/>
+            </a:pPr>
+            <a:r>
+              <a:rPr lang="nl-NL" sz="1600" dirty="0"/>
+              <a:t>Leesbaar.</a:t>
+            </a:r>
+          </a:p>
+          <a:p>
+            <a:pPr>
+              <a:buFontTx/>
+              <a:buChar char="-"/>
+            </a:pPr>
+            <a:r>
+              <a:rPr lang="nl-NL" sz="1600" dirty="0"/>
+              <a:t>Overzichtelijk gestructureerd.</a:t>
+            </a:r>
+          </a:p>
+          <a:p>
+            <a:pPr>
+              <a:buFontTx/>
+              <a:buChar char="-"/>
+            </a:pPr>
+            <a:r>
+              <a:rPr lang="nl-NL" sz="1600" dirty="0"/>
+              <a:t>Zo eenvoudig mogelijk.</a:t>
+            </a:r>
+          </a:p>
+          <a:p>
+            <a:pPr>
+              <a:buFontTx/>
+              <a:buChar char="-"/>
+            </a:pPr>
+            <a:r>
+              <a:rPr lang="nl-NL" sz="1600" dirty="0"/>
+              <a:t>Expliciet in wat het doet.</a:t>
+            </a:r>
+          </a:p>
+        </p:txBody>
+      </p:sp>
+      <p:sp>
+        <p:nvSpPr>
+          <p:cNvPr id="4" name="Content Placeholder 2">
+            <a:extLst>
+              <a:ext uri="{FF2B5EF4-FFF2-40B4-BE49-F238E27FC236}">
+                <a16:creationId xmlns:a16="http://schemas.microsoft.com/office/drawing/2014/main" id="{98EFE1E9-4D56-5081-678F-F94DE9C3DCC6}"/>
+              </a:ext>
+            </a:extLst>
+          </p:cNvPr>
+          <p:cNvSpPr txBox="1">
+            <a:spLocks/>
+          </p:cNvSpPr>
+          <p:nvPr/>
+        </p:nvSpPr>
+        <p:spPr>
+          <a:xfrm>
+            <a:off x="5985936" y="1462617"/>
+            <a:ext cx="5552013" cy="4802716"/>
+          </a:xfrm>
+          <a:prstGeom prst="rect">
+            <a:avLst/>
+          </a:prstGeom>
+          <a:solidFill>
+            <a:schemeClr val="tx1"/>
+          </a:solidFill>
+        </p:spPr>
+        <p:txBody>
+          <a:bodyPr vert="horz" lIns="91440" tIns="45720" rIns="91440" bIns="45720" rtlCol="0">
+            <a:noAutofit/>
+          </a:bodyPr>
+          <a:lstStyle>
+            <a:lvl1pPr marL="228600" indent="-228600" algn="l" defTabSz="914400" rtl="0" eaLnBrk="1" latinLnBrk="0" hangingPunct="1">
+              <a:lnSpc>
+                <a:spcPct val="90000"/>
+              </a:lnSpc>
+              <a:spcBef>
+                <a:spcPts val="1000"/>
+              </a:spcBef>
+              <a:buFont typeface="Arial" panose="020B0604020202020204" pitchFamily="34" charset="0"/>
+              <a:buChar char="•"/>
+              <a:defRPr sz="2800" kern="1200">
+                <a:solidFill>
+                  <a:schemeClr val="tx1"/>
+                </a:solidFill>
+                <a:latin typeface="+mn-lt"/>
+                <a:ea typeface="+mn-ea"/>
+                <a:cs typeface="+mn-cs"/>
+              </a:defRPr>
+            </a:lvl1pPr>
+            <a:lvl2pPr marL="685800" indent="-228600" algn="l" defTabSz="914400" rtl="0" eaLnBrk="1" latinLnBrk="0" hangingPunct="1">
+              <a:lnSpc>
+                <a:spcPct val="90000"/>
+              </a:lnSpc>
+              <a:spcBef>
+                <a:spcPts val="500"/>
+              </a:spcBef>
+              <a:buFont typeface="Arial" panose="020B0604020202020204" pitchFamily="34" charset="0"/>
+              <a:buChar char="•"/>
+              <a:defRPr sz="2400" kern="1200">
+                <a:solidFill>
+                  <a:schemeClr val="tx1"/>
+                </a:solidFill>
+                <a:latin typeface="+mn-lt"/>
+                <a:ea typeface="+mn-ea"/>
+                <a:cs typeface="+mn-cs"/>
+              </a:defRPr>
+            </a:lvl2pPr>
+            <a:lvl3pPr marL="1143000" indent="-228600" algn="l" defTabSz="914400" rtl="0" eaLnBrk="1" latinLnBrk="0" hangingPunct="1">
+              <a:lnSpc>
+                <a:spcPct val="90000"/>
+              </a:lnSpc>
+              <a:spcBef>
+                <a:spcPts val="500"/>
+              </a:spcBef>
+              <a:buFont typeface="Arial" panose="020B0604020202020204" pitchFamily="34" charset="0"/>
+              <a:buChar char="•"/>
+              <a:defRPr sz="2000" kern="1200">
+                <a:solidFill>
+                  <a:schemeClr val="tx1"/>
+                </a:solidFill>
+                <a:latin typeface="+mn-lt"/>
+                <a:ea typeface="+mn-ea"/>
+                <a:cs typeface="+mn-cs"/>
+              </a:defRPr>
+            </a:lvl3pPr>
+            <a:lvl4pPr marL="1600200" indent="-228600" algn="l" defTabSz="914400" rtl="0" eaLnBrk="1" latinLnBrk="0" hangingPunct="1">
+              <a:lnSpc>
+                <a:spcPct val="90000"/>
+              </a:lnSpc>
+              <a:spcBef>
+                <a:spcPts val="500"/>
+              </a:spcBef>
+              <a:buFont typeface="Arial" panose="020B0604020202020204" pitchFamily="34" charset="0"/>
+              <a:buChar char="•"/>
+              <a:defRPr sz="1800" kern="1200">
+                <a:solidFill>
+                  <a:schemeClr val="tx1"/>
+                </a:solidFill>
+                <a:latin typeface="+mn-lt"/>
+                <a:ea typeface="+mn-ea"/>
+                <a:cs typeface="+mn-cs"/>
+              </a:defRPr>
+            </a:lvl4pPr>
+            <a:lvl5pPr marL="2057400" indent="-228600" algn="l" defTabSz="914400" rtl="0" eaLnBrk="1" latinLnBrk="0" hangingPunct="1">
+              <a:lnSpc>
+                <a:spcPct val="90000"/>
+              </a:lnSpc>
+              <a:spcBef>
+                <a:spcPts val="500"/>
+              </a:spcBef>
+              <a:buFont typeface="Arial" panose="020B0604020202020204" pitchFamily="34" charset="0"/>
+              <a:buChar char="•"/>
+              <a:defRPr sz="1800" kern="1200">
+                <a:solidFill>
+                  <a:schemeClr val="tx1"/>
+                </a:solidFill>
+                <a:latin typeface="+mn-lt"/>
+                <a:ea typeface="+mn-ea"/>
+                <a:cs typeface="+mn-cs"/>
+              </a:defRPr>
+            </a:lvl5pPr>
+            <a:lvl6pPr marL="2514600" indent="-228600" algn="l" defTabSz="914400" rtl="0" eaLnBrk="1" latinLnBrk="0" hangingPunct="1">
+              <a:lnSpc>
+                <a:spcPct val="90000"/>
+              </a:lnSpc>
+              <a:spcBef>
+                <a:spcPts val="500"/>
+              </a:spcBef>
+              <a:buFont typeface="Arial" panose="020B0604020202020204" pitchFamily="34" charset="0"/>
+              <a:buChar char="•"/>
+              <a:defRPr sz="1800" kern="1200">
+                <a:solidFill>
+                  <a:schemeClr val="tx1"/>
+                </a:solidFill>
+                <a:latin typeface="+mn-lt"/>
+                <a:ea typeface="+mn-ea"/>
+                <a:cs typeface="+mn-cs"/>
+              </a:defRPr>
+            </a:lvl6pPr>
+            <a:lvl7pPr marL="2971800" indent="-228600" algn="l" defTabSz="914400" rtl="0" eaLnBrk="1" latinLnBrk="0" hangingPunct="1">
+              <a:lnSpc>
+                <a:spcPct val="90000"/>
+              </a:lnSpc>
+              <a:spcBef>
+                <a:spcPts val="500"/>
+              </a:spcBef>
+              <a:buFont typeface="Arial" panose="020B0604020202020204" pitchFamily="34" charset="0"/>
+              <a:buChar char="•"/>
+              <a:defRPr sz="1800" kern="1200">
+                <a:solidFill>
+                  <a:schemeClr val="tx1"/>
+                </a:solidFill>
+                <a:latin typeface="+mn-lt"/>
+                <a:ea typeface="+mn-ea"/>
+                <a:cs typeface="+mn-cs"/>
+              </a:defRPr>
+            </a:lvl7pPr>
+            <a:lvl8pPr marL="3429000" indent="-228600" algn="l" defTabSz="914400" rtl="0" eaLnBrk="1" latinLnBrk="0" hangingPunct="1">
+              <a:lnSpc>
+                <a:spcPct val="90000"/>
+              </a:lnSpc>
+              <a:spcBef>
+                <a:spcPts val="500"/>
+              </a:spcBef>
+              <a:buFont typeface="Arial" panose="020B0604020202020204" pitchFamily="34" charset="0"/>
+              <a:buChar char="•"/>
+              <a:defRPr sz="1800" kern="1200">
+                <a:solidFill>
+                  <a:schemeClr val="tx1"/>
+                </a:solidFill>
+                <a:latin typeface="+mn-lt"/>
+                <a:ea typeface="+mn-ea"/>
+                <a:cs typeface="+mn-cs"/>
+              </a:defRPr>
+            </a:lvl8pPr>
+            <a:lvl9pPr marL="3886200" indent="-228600" algn="l" defTabSz="914400" rtl="0" eaLnBrk="1" latinLnBrk="0" hangingPunct="1">
+              <a:lnSpc>
+                <a:spcPct val="90000"/>
+              </a:lnSpc>
+              <a:spcBef>
+                <a:spcPts val="500"/>
+              </a:spcBef>
+              <a:buFont typeface="Arial" panose="020B0604020202020204" pitchFamily="34" charset="0"/>
+              <a:buChar char="•"/>
+              <a:defRPr sz="1800" kern="1200">
+                <a:solidFill>
+                  <a:schemeClr val="tx1"/>
+                </a:solidFill>
+                <a:latin typeface="+mn-lt"/>
+                <a:ea typeface="+mn-ea"/>
+                <a:cs typeface="+mn-cs"/>
+              </a:defRPr>
+            </a:lvl9pPr>
+          </a:lstStyle>
+          <a:p>
+            <a:pPr marL="0" indent="0">
+              <a:lnSpc>
+                <a:spcPct val="100000"/>
+              </a:lnSpc>
+              <a:spcBef>
+                <a:spcPts val="600"/>
+              </a:spcBef>
+              <a:buNone/>
+            </a:pPr>
+            <a:endParaRPr lang="en-GB" sz="1000" dirty="0">
+              <a:solidFill>
+                <a:schemeClr val="bg1"/>
+              </a:solidFill>
+              <a:latin typeface="Courier New" panose="02070309020205020404" pitchFamily="49" charset="0"/>
+              <a:cs typeface="Courier New" panose="02070309020205020404" pitchFamily="49" charset="0"/>
+            </a:endParaRPr>
+          </a:p>
+          <a:p>
+            <a:pPr marL="0" indent="0">
+              <a:lnSpc>
+                <a:spcPct val="100000"/>
+              </a:lnSpc>
+              <a:spcBef>
+                <a:spcPts val="600"/>
+              </a:spcBef>
+              <a:buNone/>
+            </a:pPr>
+            <a:r>
+              <a:rPr lang="en-GB" sz="1000" dirty="0">
+                <a:solidFill>
+                  <a:schemeClr val="bg1"/>
+                </a:solidFill>
+                <a:latin typeface="Courier New" panose="02070309020205020404" pitchFamily="49" charset="0"/>
+                <a:cs typeface="Courier New" panose="02070309020205020404" pitchFamily="49" charset="0"/>
+              </a:rPr>
+              <a:t>Beautiful is better than ugly.</a:t>
+            </a:r>
+          </a:p>
+          <a:p>
+            <a:pPr marL="0" indent="0">
+              <a:lnSpc>
+                <a:spcPct val="100000"/>
+              </a:lnSpc>
+              <a:spcBef>
+                <a:spcPts val="600"/>
+              </a:spcBef>
+              <a:buNone/>
+            </a:pPr>
+            <a:r>
+              <a:rPr lang="en-GB" sz="1000" dirty="0">
+                <a:solidFill>
+                  <a:schemeClr val="bg1"/>
+                </a:solidFill>
+                <a:latin typeface="Courier New" panose="02070309020205020404" pitchFamily="49" charset="0"/>
+                <a:cs typeface="Courier New" panose="02070309020205020404" pitchFamily="49" charset="0"/>
+              </a:rPr>
+              <a:t>Explicit is better than implicit.</a:t>
+            </a:r>
+          </a:p>
+          <a:p>
+            <a:pPr marL="0" indent="0">
+              <a:lnSpc>
+                <a:spcPct val="100000"/>
+              </a:lnSpc>
+              <a:spcBef>
+                <a:spcPts val="600"/>
+              </a:spcBef>
+              <a:buNone/>
+            </a:pPr>
+            <a:r>
+              <a:rPr lang="en-GB" sz="1000" dirty="0">
+                <a:solidFill>
+                  <a:schemeClr val="bg1"/>
+                </a:solidFill>
+                <a:latin typeface="Courier New" panose="02070309020205020404" pitchFamily="49" charset="0"/>
+                <a:cs typeface="Courier New" panose="02070309020205020404" pitchFamily="49" charset="0"/>
+              </a:rPr>
+              <a:t>Simple is better than complex.</a:t>
+            </a:r>
+          </a:p>
+          <a:p>
+            <a:pPr marL="0" indent="0">
+              <a:lnSpc>
+                <a:spcPct val="100000"/>
+              </a:lnSpc>
+              <a:spcBef>
+                <a:spcPts val="600"/>
+              </a:spcBef>
+              <a:buNone/>
+            </a:pPr>
+            <a:r>
+              <a:rPr lang="en-GB" sz="1000" dirty="0">
+                <a:solidFill>
+                  <a:schemeClr val="bg1"/>
+                </a:solidFill>
+                <a:latin typeface="Courier New" panose="02070309020205020404" pitchFamily="49" charset="0"/>
+                <a:cs typeface="Courier New" panose="02070309020205020404" pitchFamily="49" charset="0"/>
+              </a:rPr>
+              <a:t>Complex is better than complicated.</a:t>
+            </a:r>
+          </a:p>
+          <a:p>
+            <a:pPr marL="0" indent="0">
+              <a:lnSpc>
+                <a:spcPct val="100000"/>
+              </a:lnSpc>
+              <a:spcBef>
+                <a:spcPts val="600"/>
+              </a:spcBef>
+              <a:buNone/>
+            </a:pPr>
+            <a:r>
+              <a:rPr lang="en-GB" sz="1000" dirty="0">
+                <a:solidFill>
+                  <a:schemeClr val="bg1"/>
+                </a:solidFill>
+                <a:latin typeface="Courier New" panose="02070309020205020404" pitchFamily="49" charset="0"/>
+                <a:cs typeface="Courier New" panose="02070309020205020404" pitchFamily="49" charset="0"/>
+              </a:rPr>
+              <a:t>Flat is better than nested.</a:t>
+            </a:r>
+          </a:p>
+          <a:p>
+            <a:pPr marL="0" indent="0">
+              <a:lnSpc>
+                <a:spcPct val="100000"/>
+              </a:lnSpc>
+              <a:spcBef>
+                <a:spcPts val="600"/>
+              </a:spcBef>
+              <a:buNone/>
+            </a:pPr>
+            <a:r>
+              <a:rPr lang="en-GB" sz="1000" dirty="0">
+                <a:solidFill>
+                  <a:schemeClr val="bg1"/>
+                </a:solidFill>
+                <a:latin typeface="Courier New" panose="02070309020205020404" pitchFamily="49" charset="0"/>
+                <a:cs typeface="Courier New" panose="02070309020205020404" pitchFamily="49" charset="0"/>
+              </a:rPr>
+              <a:t>Sparse is better than dense.</a:t>
+            </a:r>
+          </a:p>
+          <a:p>
+            <a:pPr marL="0" indent="0">
+              <a:lnSpc>
+                <a:spcPct val="100000"/>
+              </a:lnSpc>
+              <a:spcBef>
+                <a:spcPts val="600"/>
+              </a:spcBef>
+              <a:buNone/>
+            </a:pPr>
+            <a:r>
+              <a:rPr lang="en-GB" sz="1000" dirty="0">
+                <a:solidFill>
+                  <a:schemeClr val="bg1"/>
+                </a:solidFill>
+                <a:latin typeface="Courier New" panose="02070309020205020404" pitchFamily="49" charset="0"/>
+                <a:cs typeface="Courier New" panose="02070309020205020404" pitchFamily="49" charset="0"/>
+              </a:rPr>
+              <a:t>Readability counts.</a:t>
+            </a:r>
+          </a:p>
+          <a:p>
+            <a:pPr marL="0" indent="0">
+              <a:lnSpc>
+                <a:spcPct val="100000"/>
+              </a:lnSpc>
+              <a:spcBef>
+                <a:spcPts val="600"/>
+              </a:spcBef>
+              <a:buNone/>
+            </a:pPr>
+            <a:r>
+              <a:rPr lang="en-GB" sz="1000" dirty="0">
+                <a:solidFill>
+                  <a:schemeClr val="bg1"/>
+                </a:solidFill>
+                <a:latin typeface="Courier New" panose="02070309020205020404" pitchFamily="49" charset="0"/>
+                <a:cs typeface="Courier New" panose="02070309020205020404" pitchFamily="49" charset="0"/>
+              </a:rPr>
+              <a:t>Special cases aren't special enough to break the rules.</a:t>
+            </a:r>
+          </a:p>
+          <a:p>
+            <a:pPr marL="0" indent="0">
+              <a:lnSpc>
+                <a:spcPct val="100000"/>
+              </a:lnSpc>
+              <a:spcBef>
+                <a:spcPts val="600"/>
+              </a:spcBef>
+              <a:buNone/>
+            </a:pPr>
+            <a:r>
+              <a:rPr lang="en-GB" sz="1000" dirty="0">
+                <a:solidFill>
+                  <a:schemeClr val="bg1"/>
+                </a:solidFill>
+                <a:latin typeface="Courier New" panose="02070309020205020404" pitchFamily="49" charset="0"/>
+                <a:cs typeface="Courier New" panose="02070309020205020404" pitchFamily="49" charset="0"/>
+              </a:rPr>
+              <a:t>Although practicality beats purity.</a:t>
+            </a:r>
+          </a:p>
+          <a:p>
+            <a:pPr marL="0" indent="0">
+              <a:lnSpc>
+                <a:spcPct val="100000"/>
+              </a:lnSpc>
+              <a:spcBef>
+                <a:spcPts val="600"/>
+              </a:spcBef>
+              <a:buNone/>
+            </a:pPr>
+            <a:r>
+              <a:rPr lang="en-GB" sz="1000" dirty="0">
+                <a:solidFill>
+                  <a:schemeClr val="bg1"/>
+                </a:solidFill>
+                <a:latin typeface="Courier New" panose="02070309020205020404" pitchFamily="49" charset="0"/>
+                <a:cs typeface="Courier New" panose="02070309020205020404" pitchFamily="49" charset="0"/>
+              </a:rPr>
+              <a:t>Errors should never pass silently.</a:t>
+            </a:r>
+          </a:p>
+          <a:p>
+            <a:pPr marL="0" indent="0">
+              <a:lnSpc>
+                <a:spcPct val="100000"/>
+              </a:lnSpc>
+              <a:spcBef>
+                <a:spcPts val="600"/>
+              </a:spcBef>
+              <a:buNone/>
+            </a:pPr>
+            <a:r>
+              <a:rPr lang="en-GB" sz="1000" dirty="0">
+                <a:solidFill>
+                  <a:schemeClr val="bg1"/>
+                </a:solidFill>
+                <a:latin typeface="Courier New" panose="02070309020205020404" pitchFamily="49" charset="0"/>
+                <a:cs typeface="Courier New" panose="02070309020205020404" pitchFamily="49" charset="0"/>
+              </a:rPr>
+              <a:t>Unless explicitly silenced.</a:t>
+            </a:r>
+          </a:p>
+          <a:p>
+            <a:pPr marL="0" indent="0">
+              <a:lnSpc>
+                <a:spcPct val="100000"/>
+              </a:lnSpc>
+              <a:spcBef>
+                <a:spcPts val="600"/>
+              </a:spcBef>
+              <a:buNone/>
+            </a:pPr>
+            <a:r>
+              <a:rPr lang="en-GB" sz="1000" dirty="0">
+                <a:solidFill>
+                  <a:schemeClr val="bg1"/>
+                </a:solidFill>
+                <a:latin typeface="Courier New" panose="02070309020205020404" pitchFamily="49" charset="0"/>
+                <a:cs typeface="Courier New" panose="02070309020205020404" pitchFamily="49" charset="0"/>
+              </a:rPr>
+              <a:t>In the face of ambiguity, refuse the temptation to guess.</a:t>
+            </a:r>
+          </a:p>
+          <a:p>
+            <a:pPr marL="0" indent="0">
+              <a:lnSpc>
+                <a:spcPct val="100000"/>
+              </a:lnSpc>
+              <a:spcBef>
+                <a:spcPts val="600"/>
+              </a:spcBef>
+              <a:buNone/>
+            </a:pPr>
+            <a:r>
+              <a:rPr lang="en-GB" sz="1000" dirty="0">
+                <a:solidFill>
+                  <a:schemeClr val="bg1"/>
+                </a:solidFill>
+                <a:latin typeface="Courier New" panose="02070309020205020404" pitchFamily="49" charset="0"/>
+                <a:cs typeface="Courier New" panose="02070309020205020404" pitchFamily="49" charset="0"/>
+              </a:rPr>
+              <a:t>There should be one-- and preferably only one --obvious way to do it.</a:t>
+            </a:r>
+          </a:p>
+          <a:p>
+            <a:pPr marL="0" indent="0">
+              <a:lnSpc>
+                <a:spcPct val="100000"/>
+              </a:lnSpc>
+              <a:spcBef>
+                <a:spcPts val="600"/>
+              </a:spcBef>
+              <a:buNone/>
+            </a:pPr>
+            <a:r>
+              <a:rPr lang="en-GB" sz="1000" dirty="0">
+                <a:solidFill>
+                  <a:schemeClr val="bg1"/>
+                </a:solidFill>
+                <a:latin typeface="Courier New" panose="02070309020205020404" pitchFamily="49" charset="0"/>
+                <a:cs typeface="Courier New" panose="02070309020205020404" pitchFamily="49" charset="0"/>
+              </a:rPr>
+              <a:t>Although that way may not be obvious at first unless you're Dutch.</a:t>
+            </a:r>
+          </a:p>
+          <a:p>
+            <a:pPr marL="0" indent="0">
+              <a:lnSpc>
+                <a:spcPct val="100000"/>
+              </a:lnSpc>
+              <a:spcBef>
+                <a:spcPts val="600"/>
+              </a:spcBef>
+              <a:buNone/>
+            </a:pPr>
+            <a:r>
+              <a:rPr lang="en-GB" sz="1000" dirty="0">
+                <a:solidFill>
+                  <a:schemeClr val="bg1"/>
+                </a:solidFill>
+                <a:latin typeface="Courier New" panose="02070309020205020404" pitchFamily="49" charset="0"/>
+                <a:cs typeface="Courier New" panose="02070309020205020404" pitchFamily="49" charset="0"/>
+              </a:rPr>
+              <a:t>Now is better than never.</a:t>
+            </a:r>
+          </a:p>
+          <a:p>
+            <a:pPr marL="0" indent="0">
+              <a:lnSpc>
+                <a:spcPct val="100000"/>
+              </a:lnSpc>
+              <a:spcBef>
+                <a:spcPts val="600"/>
+              </a:spcBef>
+              <a:buNone/>
+            </a:pPr>
+            <a:r>
+              <a:rPr lang="en-GB" sz="1000" dirty="0">
+                <a:solidFill>
+                  <a:schemeClr val="bg1"/>
+                </a:solidFill>
+                <a:latin typeface="Courier New" panose="02070309020205020404" pitchFamily="49" charset="0"/>
+                <a:cs typeface="Courier New" panose="02070309020205020404" pitchFamily="49" charset="0"/>
+              </a:rPr>
+              <a:t>Although never is often better than *right* now.</a:t>
+            </a:r>
+          </a:p>
+          <a:p>
+            <a:pPr marL="0" indent="0">
+              <a:lnSpc>
+                <a:spcPct val="100000"/>
+              </a:lnSpc>
+              <a:spcBef>
+                <a:spcPts val="600"/>
+              </a:spcBef>
+              <a:buNone/>
+            </a:pPr>
+            <a:r>
+              <a:rPr lang="en-GB" sz="1000" dirty="0">
+                <a:solidFill>
+                  <a:schemeClr val="bg1"/>
+                </a:solidFill>
+                <a:latin typeface="Courier New" panose="02070309020205020404" pitchFamily="49" charset="0"/>
+                <a:cs typeface="Courier New" panose="02070309020205020404" pitchFamily="49" charset="0"/>
+              </a:rPr>
+              <a:t>If the implementation is hard to explain, it's a bad idea.</a:t>
+            </a:r>
+          </a:p>
+          <a:p>
+            <a:pPr marL="0" indent="0">
+              <a:lnSpc>
+                <a:spcPct val="100000"/>
+              </a:lnSpc>
+              <a:spcBef>
+                <a:spcPts val="600"/>
+              </a:spcBef>
+              <a:buNone/>
+            </a:pPr>
+            <a:r>
+              <a:rPr lang="en-GB" sz="1000" dirty="0">
+                <a:solidFill>
+                  <a:schemeClr val="bg1"/>
+                </a:solidFill>
+                <a:latin typeface="Courier New" panose="02070309020205020404" pitchFamily="49" charset="0"/>
+                <a:cs typeface="Courier New" panose="02070309020205020404" pitchFamily="49" charset="0"/>
+              </a:rPr>
+              <a:t>If the implementation is easy to explain, it may be a good idea.</a:t>
+            </a:r>
+          </a:p>
+          <a:p>
+            <a:pPr marL="0" indent="0">
+              <a:lnSpc>
+                <a:spcPct val="100000"/>
+              </a:lnSpc>
+              <a:spcBef>
+                <a:spcPts val="600"/>
+              </a:spcBef>
+              <a:buNone/>
+            </a:pPr>
+            <a:r>
+              <a:rPr lang="en-GB" sz="1000" dirty="0">
+                <a:solidFill>
+                  <a:schemeClr val="bg1"/>
+                </a:solidFill>
+                <a:latin typeface="Courier New" panose="02070309020205020404" pitchFamily="49" charset="0"/>
+                <a:cs typeface="Courier New" panose="02070309020205020404" pitchFamily="49" charset="0"/>
+              </a:rPr>
+              <a:t>Namespaces are one honking great idea -- let's do more of those!</a:t>
+            </a:r>
+            <a:endParaRPr lang="nl-NL" sz="1000" dirty="0">
+              <a:solidFill>
+                <a:schemeClr val="bg1"/>
+              </a:solidFill>
+              <a:latin typeface="Courier New" panose="02070309020205020404" pitchFamily="49" charset="0"/>
+              <a:cs typeface="Courier New" panose="02070309020205020404" pitchFamily="49" charset="0"/>
+            </a:endParaRPr>
+          </a:p>
+          <a:p>
+            <a:pPr marL="0" indent="0">
+              <a:lnSpc>
+                <a:spcPct val="100000"/>
+              </a:lnSpc>
+              <a:spcBef>
+                <a:spcPts val="600"/>
+              </a:spcBef>
+              <a:buNone/>
+            </a:pPr>
+            <a:endParaRPr lang="en-GB" sz="1000" noProof="0" dirty="0">
+              <a:solidFill>
+                <a:schemeClr val="bg1"/>
+              </a:solidFill>
+              <a:latin typeface="Courier New" panose="02070309020205020404" pitchFamily="49" charset="0"/>
+              <a:cs typeface="Courier New" panose="02070309020205020404" pitchFamily="49" charset="0"/>
+            </a:endParaRPr>
+          </a:p>
+        </p:txBody>
+      </p:sp>
+      <p:cxnSp>
+        <p:nvCxnSpPr>
+          <p:cNvPr id="6" name="Straight Connector 5">
+            <a:extLst>
+              <a:ext uri="{FF2B5EF4-FFF2-40B4-BE49-F238E27FC236}">
+                <a16:creationId xmlns:a16="http://schemas.microsoft.com/office/drawing/2014/main" id="{7F162173-AD9E-1ED9-F92B-186066229DD6}"/>
+              </a:ext>
+            </a:extLst>
+          </p:cNvPr>
+          <p:cNvCxnSpPr>
+            <a:cxnSpLocks/>
+          </p:cNvCxnSpPr>
+          <p:nvPr/>
+        </p:nvCxnSpPr>
+        <p:spPr>
+          <a:xfrm>
+            <a:off x="5655733" y="1456267"/>
+            <a:ext cx="0" cy="4809066"/>
+          </a:xfrm>
+          <a:prstGeom prst="line">
+            <a:avLst/>
+          </a:prstGeom>
+        </p:spPr>
+        <p:style>
+          <a:lnRef idx="3">
+            <a:schemeClr val="dk1"/>
+          </a:lnRef>
+          <a:fillRef idx="0">
+            <a:schemeClr val="dk1"/>
+          </a:fillRef>
+          <a:effectRef idx="2">
+            <a:schemeClr val="dk1"/>
+          </a:effectRef>
+          <a:fontRef idx="minor">
+            <a:schemeClr val="tx1"/>
+          </a:fontRef>
+        </p:style>
+      </p:cxnSp>
+      <p:sp>
+        <p:nvSpPr>
+          <p:cNvPr id="5" name="TextBox 4">
+            <a:extLst>
+              <a:ext uri="{FF2B5EF4-FFF2-40B4-BE49-F238E27FC236}">
+                <a16:creationId xmlns:a16="http://schemas.microsoft.com/office/drawing/2014/main" id="{AAAAABA8-783C-B32D-3397-2C7F8BEB01FD}"/>
+              </a:ext>
+            </a:extLst>
+          </p:cNvPr>
+          <p:cNvSpPr txBox="1"/>
+          <p:nvPr/>
+        </p:nvSpPr>
+        <p:spPr>
+          <a:xfrm>
+            <a:off x="9569450" y="1532467"/>
+            <a:ext cx="1907118" cy="307777"/>
+          </a:xfrm>
+          <a:prstGeom prst="rect">
+            <a:avLst/>
+          </a:prstGeom>
+        </p:spPr>
+        <p:style>
+          <a:lnRef idx="2">
+            <a:schemeClr val="dk1">
+              <a:shade val="50000"/>
+            </a:schemeClr>
+          </a:lnRef>
+          <a:fillRef idx="1">
+            <a:schemeClr val="dk1"/>
+          </a:fillRef>
+          <a:effectRef idx="0">
+            <a:schemeClr val="dk1"/>
+          </a:effectRef>
+          <a:fontRef idx="minor">
+            <a:schemeClr val="lt1"/>
+          </a:fontRef>
+        </p:style>
+        <p:txBody>
+          <a:bodyPr wrap="square" rtlCol="0">
+            <a:spAutoFit/>
+          </a:bodyPr>
+          <a:lstStyle/>
+          <a:p>
+            <a:r>
+              <a:rPr lang="en-US" sz="1400" dirty="0">
+                <a:latin typeface="Courier New" panose="02070309020205020404" pitchFamily="49" charset="0"/>
+                <a:cs typeface="Courier New" panose="02070309020205020404" pitchFamily="49" charset="0"/>
+              </a:rPr>
+              <a:t>&gt;&gt;&gt; import this</a:t>
+            </a:r>
           </a:p>
         </p:txBody>
       </p:sp>
     </p:spTree>
     <p:extLst>
       <p:ext uri="{BB962C8B-B14F-4D97-AF65-F5344CB8AC3E}">
-        <p14:creationId xmlns:p14="http://schemas.microsoft.com/office/powerpoint/2010/main" val="530448944"/>
+        <p14:creationId xmlns:p14="http://schemas.microsoft.com/office/powerpoint/2010/main" val="1662243917"/>
       </p:ext>
     </p:extLst>
   </p:cSld>
@@ -21798,7 +23094,19 @@
             </a:pPr>
             <a:r>
               <a:rPr lang="nl-NL" sz="1800" dirty="0"/>
-              <a:t>Vertellen wat en waar iets fout ging</a:t>
+              <a:t>Vertellen </a:t>
+            </a:r>
+            <a:r>
+              <a:rPr lang="nl-NL" sz="1800" u="sng" dirty="0"/>
+              <a:t>wat</a:t>
+            </a:r>
+            <a:r>
+              <a:rPr lang="nl-NL" sz="1800" dirty="0"/>
+              <a:t> fout ging en </a:t>
+            </a:r>
+            <a:r>
+              <a:rPr lang="nl-NL" sz="1800" u="sng" dirty="0"/>
+              <a:t>waar</a:t>
             </a:r>
             <a:r>
               <a:rPr lang="nl-NL" sz="1800" noProof="0" dirty="0"/>
@@ -23473,10 +24781,10 @@
       </p:grpSpPr>
       <p:sp>
         <p:nvSpPr>
-          <p:cNvPr id="2" name="Title 1">
+          <p:cNvPr id="4" name="Title 3">
             <a:extLst>
               <a:ext uri="{FF2B5EF4-FFF2-40B4-BE49-F238E27FC236}">
-                <a16:creationId xmlns:a16="http://schemas.microsoft.com/office/drawing/2014/main" id="{39A1D606-8DD1-369C-5C09-471CDD551AD5}"/>
+                <a16:creationId xmlns:a16="http://schemas.microsoft.com/office/drawing/2014/main" id="{72C925CA-BCA3-3701-E08E-95652380B32E}"/>
               </a:ext>
             </a:extLst>
           </p:cNvPr>
@@ -23487,31 +24795,24 @@
             <p:ph type="title"/>
           </p:nvPr>
         </p:nvSpPr>
-        <p:spPr>
-          <a:xfrm>
-            <a:off x="838200" y="365126"/>
-            <a:ext cx="10515600" cy="718608"/>
-          </a:xfrm>
-        </p:spPr>
+        <p:spPr/>
         <p:txBody>
-          <a:bodyPr>
-            <a:normAutofit/>
-          </a:bodyPr>
+          <a:bodyPr/>
           <a:lstStyle/>
           <a:p>
             <a:r>
-              <a:rPr lang="nl-NL" sz="3600" noProof="0" dirty="0"/>
-              <a:t>The Zen of Python</a:t>
+              <a:rPr lang="nl-NL" dirty="0"/>
+              <a:t>Leesbaarheid</a:t>
             </a:r>
           </a:p>
         </p:txBody>
       </p:sp>
       <p:sp>
         <p:nvSpPr>
-          <p:cNvPr id="3" name="Content Placeholder 2">
+          <p:cNvPr id="5" name="Text Placeholder 4">
             <a:extLst>
               <a:ext uri="{FF2B5EF4-FFF2-40B4-BE49-F238E27FC236}">
-                <a16:creationId xmlns:a16="http://schemas.microsoft.com/office/drawing/2014/main" id="{F4C2D286-E049-0AAB-1360-B7157E11AD7E}"/>
+                <a16:creationId xmlns:a16="http://schemas.microsoft.com/office/drawing/2014/main" id="{1AB31C95-91AF-DF13-FB58-0DA5F2D9F6F7}"/>
               </a:ext>
             </a:extLst>
           </p:cNvPr>
@@ -23519,864 +24820,22 @@
             <a:spLocks noGrp="1"/>
           </p:cNvSpPr>
           <p:nvPr>
-            <p:ph idx="1"/>
+            <p:ph type="body" idx="1"/>
           </p:nvPr>
         </p:nvSpPr>
-        <p:spPr>
-          <a:xfrm>
-            <a:off x="838200" y="1456267"/>
-            <a:ext cx="4571999" cy="4720696"/>
-          </a:xfrm>
-        </p:spPr>
+        <p:spPr/>
         <p:txBody>
-          <a:bodyPr>
-            <a:noAutofit/>
-          </a:bodyPr>
+          <a:bodyPr/>
           <a:lstStyle/>
           <a:p>
-            <a:pPr marL="0" indent="0">
-              <a:buNone/>
-            </a:pPr>
-            <a:r>
-              <a:rPr lang="nl-NL" sz="1600" dirty="0"/>
-              <a:t>Programmeren is een creatief proces!</a:t>
-            </a:r>
-          </a:p>
-          <a:p>
-            <a:pPr marL="0" indent="0">
-              <a:buNone/>
-            </a:pPr>
-            <a:endParaRPr lang="nl-NL" sz="1600" dirty="0"/>
-          </a:p>
-          <a:p>
-            <a:pPr marL="0" indent="0">
-              <a:buNone/>
-            </a:pPr>
-            <a:r>
-              <a:rPr lang="nl-NL" sz="1600" dirty="0"/>
-              <a:t>Niet altijd één goede oplossing:</a:t>
-            </a:r>
-          </a:p>
-          <a:p>
-            <a:pPr>
-              <a:buFontTx/>
-              <a:buChar char="-"/>
-            </a:pPr>
-            <a:r>
-              <a:rPr lang="nl-NL" sz="1600" dirty="0"/>
-              <a:t>Werkt het?</a:t>
-            </a:r>
-          </a:p>
-          <a:p>
-            <a:pPr>
-              <a:buFontTx/>
-              <a:buChar char="-"/>
-            </a:pPr>
-            <a:r>
-              <a:rPr lang="nl-NL" sz="1600" dirty="0"/>
-              <a:t>Werkt het efficiënt?</a:t>
-            </a:r>
-          </a:p>
-          <a:p>
-            <a:pPr>
-              <a:buFontTx/>
-              <a:buChar char="-"/>
-            </a:pPr>
-            <a:r>
-              <a:rPr lang="nl-NL" sz="1600" dirty="0"/>
-              <a:t>Werkt het zo eenvoudig mogelijk?</a:t>
-            </a:r>
-          </a:p>
-          <a:p>
-            <a:pPr marL="0" indent="0">
-              <a:buNone/>
-            </a:pPr>
-            <a:endParaRPr lang="nl-NL" sz="1600" dirty="0"/>
-          </a:p>
-          <a:p>
-            <a:pPr marL="0" indent="0">
-              <a:buNone/>
-            </a:pPr>
-            <a:r>
-              <a:rPr lang="nl-NL" sz="1600" dirty="0"/>
-              <a:t>Principes om betere code te schrijven:</a:t>
-            </a:r>
-          </a:p>
-          <a:p>
-            <a:pPr>
-              <a:buFontTx/>
-              <a:buChar char="-"/>
-            </a:pPr>
-            <a:r>
-              <a:rPr lang="nl-NL" sz="1600" dirty="0"/>
-              <a:t>Leesbaar.</a:t>
-            </a:r>
-          </a:p>
-          <a:p>
-            <a:pPr>
-              <a:buFontTx/>
-              <a:buChar char="-"/>
-            </a:pPr>
-            <a:r>
-              <a:rPr lang="nl-NL" sz="1600" dirty="0"/>
-              <a:t>Overzichtelijk gestructureerd.</a:t>
-            </a:r>
-          </a:p>
-          <a:p>
-            <a:pPr>
-              <a:buFontTx/>
-              <a:buChar char="-"/>
-            </a:pPr>
-            <a:r>
-              <a:rPr lang="nl-NL" sz="1600" dirty="0"/>
-              <a:t>Zo eenvoudig mogelijk.</a:t>
-            </a:r>
-          </a:p>
-          <a:p>
-            <a:pPr>
-              <a:buFontTx/>
-              <a:buChar char="-"/>
-            </a:pPr>
-            <a:r>
-              <a:rPr lang="nl-NL" sz="1600" dirty="0"/>
-              <a:t>Expliciet in wat het doet.</a:t>
-            </a:r>
-          </a:p>
-        </p:txBody>
-      </p:sp>
-      <p:sp>
-        <p:nvSpPr>
-          <p:cNvPr id="4" name="Content Placeholder 2">
-            <a:extLst>
-              <a:ext uri="{FF2B5EF4-FFF2-40B4-BE49-F238E27FC236}">
-                <a16:creationId xmlns:a16="http://schemas.microsoft.com/office/drawing/2014/main" id="{98EFE1E9-4D56-5081-678F-F94DE9C3DCC6}"/>
-              </a:ext>
-            </a:extLst>
-          </p:cNvPr>
-          <p:cNvSpPr txBox="1">
-            <a:spLocks/>
-          </p:cNvSpPr>
-          <p:nvPr/>
-        </p:nvSpPr>
-        <p:spPr>
-          <a:xfrm>
-            <a:off x="5985936" y="1462617"/>
-            <a:ext cx="5552013" cy="4802716"/>
-          </a:xfrm>
-          <a:prstGeom prst="rect">
-            <a:avLst/>
-          </a:prstGeom>
-          <a:solidFill>
-            <a:schemeClr val="tx1"/>
-          </a:solidFill>
-        </p:spPr>
-        <p:txBody>
-          <a:bodyPr vert="horz" lIns="91440" tIns="45720" rIns="91440" bIns="45720" rtlCol="0">
-            <a:noAutofit/>
-          </a:bodyPr>
-          <a:lstStyle>
-            <a:lvl1pPr marL="228600" indent="-228600" algn="l" defTabSz="914400" rtl="0" eaLnBrk="1" latinLnBrk="0" hangingPunct="1">
-              <a:lnSpc>
-                <a:spcPct val="90000"/>
-              </a:lnSpc>
-              <a:spcBef>
-                <a:spcPts val="1000"/>
-              </a:spcBef>
-              <a:buFont typeface="Arial" panose="020B0604020202020204" pitchFamily="34" charset="0"/>
-              <a:buChar char="•"/>
-              <a:defRPr sz="2800" kern="1200">
-                <a:solidFill>
-                  <a:schemeClr val="tx1"/>
-                </a:solidFill>
-                <a:latin typeface="+mn-lt"/>
-                <a:ea typeface="+mn-ea"/>
-                <a:cs typeface="+mn-cs"/>
-              </a:defRPr>
-            </a:lvl1pPr>
-            <a:lvl2pPr marL="685800" indent="-228600" algn="l" defTabSz="914400" rtl="0" eaLnBrk="1" latinLnBrk="0" hangingPunct="1">
-              <a:lnSpc>
-                <a:spcPct val="90000"/>
-              </a:lnSpc>
-              <a:spcBef>
-                <a:spcPts val="500"/>
-              </a:spcBef>
-              <a:buFont typeface="Arial" panose="020B0604020202020204" pitchFamily="34" charset="0"/>
-              <a:buChar char="•"/>
-              <a:defRPr sz="2400" kern="1200">
-                <a:solidFill>
-                  <a:schemeClr val="tx1"/>
-                </a:solidFill>
-                <a:latin typeface="+mn-lt"/>
-                <a:ea typeface="+mn-ea"/>
-                <a:cs typeface="+mn-cs"/>
-              </a:defRPr>
-            </a:lvl2pPr>
-            <a:lvl3pPr marL="1143000" indent="-228600" algn="l" defTabSz="914400" rtl="0" eaLnBrk="1" latinLnBrk="0" hangingPunct="1">
-              <a:lnSpc>
-                <a:spcPct val="90000"/>
-              </a:lnSpc>
-              <a:spcBef>
-                <a:spcPts val="500"/>
-              </a:spcBef>
-              <a:buFont typeface="Arial" panose="020B0604020202020204" pitchFamily="34" charset="0"/>
-              <a:buChar char="•"/>
-              <a:defRPr sz="2000" kern="1200">
-                <a:solidFill>
-                  <a:schemeClr val="tx1"/>
-                </a:solidFill>
-                <a:latin typeface="+mn-lt"/>
-                <a:ea typeface="+mn-ea"/>
-                <a:cs typeface="+mn-cs"/>
-              </a:defRPr>
-            </a:lvl3pPr>
-            <a:lvl4pPr marL="1600200" indent="-228600" algn="l" defTabSz="914400" rtl="0" eaLnBrk="1" latinLnBrk="0" hangingPunct="1">
-              <a:lnSpc>
-                <a:spcPct val="90000"/>
-              </a:lnSpc>
-              <a:spcBef>
-                <a:spcPts val="500"/>
-              </a:spcBef>
-              <a:buFont typeface="Arial" panose="020B0604020202020204" pitchFamily="34" charset="0"/>
-              <a:buChar char="•"/>
-              <a:defRPr sz="1800" kern="1200">
-                <a:solidFill>
-                  <a:schemeClr val="tx1"/>
-                </a:solidFill>
-                <a:latin typeface="+mn-lt"/>
-                <a:ea typeface="+mn-ea"/>
-                <a:cs typeface="+mn-cs"/>
-              </a:defRPr>
-            </a:lvl4pPr>
-            <a:lvl5pPr marL="2057400" indent="-228600" algn="l" defTabSz="914400" rtl="0" eaLnBrk="1" latinLnBrk="0" hangingPunct="1">
-              <a:lnSpc>
-                <a:spcPct val="90000"/>
-              </a:lnSpc>
-              <a:spcBef>
-                <a:spcPts val="500"/>
-              </a:spcBef>
-              <a:buFont typeface="Arial" panose="020B0604020202020204" pitchFamily="34" charset="0"/>
-              <a:buChar char="•"/>
-              <a:defRPr sz="1800" kern="1200">
-                <a:solidFill>
-                  <a:schemeClr val="tx1"/>
-                </a:solidFill>
-                <a:latin typeface="+mn-lt"/>
-                <a:ea typeface="+mn-ea"/>
-                <a:cs typeface="+mn-cs"/>
-              </a:defRPr>
-            </a:lvl5pPr>
-            <a:lvl6pPr marL="2514600" indent="-228600" algn="l" defTabSz="914400" rtl="0" eaLnBrk="1" latinLnBrk="0" hangingPunct="1">
-              <a:lnSpc>
-                <a:spcPct val="90000"/>
-              </a:lnSpc>
-              <a:spcBef>
-                <a:spcPts val="500"/>
-              </a:spcBef>
-              <a:buFont typeface="Arial" panose="020B0604020202020204" pitchFamily="34" charset="0"/>
-              <a:buChar char="•"/>
-              <a:defRPr sz="1800" kern="1200">
-                <a:solidFill>
-                  <a:schemeClr val="tx1"/>
-                </a:solidFill>
-                <a:latin typeface="+mn-lt"/>
-                <a:ea typeface="+mn-ea"/>
-                <a:cs typeface="+mn-cs"/>
-              </a:defRPr>
-            </a:lvl6pPr>
-            <a:lvl7pPr marL="2971800" indent="-228600" algn="l" defTabSz="914400" rtl="0" eaLnBrk="1" latinLnBrk="0" hangingPunct="1">
-              <a:lnSpc>
-                <a:spcPct val="90000"/>
-              </a:lnSpc>
-              <a:spcBef>
-                <a:spcPts val="500"/>
-              </a:spcBef>
-              <a:buFont typeface="Arial" panose="020B0604020202020204" pitchFamily="34" charset="0"/>
-              <a:buChar char="•"/>
-              <a:defRPr sz="1800" kern="1200">
-                <a:solidFill>
-                  <a:schemeClr val="tx1"/>
-                </a:solidFill>
-                <a:latin typeface="+mn-lt"/>
-                <a:ea typeface="+mn-ea"/>
-                <a:cs typeface="+mn-cs"/>
-              </a:defRPr>
-            </a:lvl7pPr>
-            <a:lvl8pPr marL="3429000" indent="-228600" algn="l" defTabSz="914400" rtl="0" eaLnBrk="1" latinLnBrk="0" hangingPunct="1">
-              <a:lnSpc>
-                <a:spcPct val="90000"/>
-              </a:lnSpc>
-              <a:spcBef>
-                <a:spcPts val="500"/>
-              </a:spcBef>
-              <a:buFont typeface="Arial" panose="020B0604020202020204" pitchFamily="34" charset="0"/>
-              <a:buChar char="•"/>
-              <a:defRPr sz="1800" kern="1200">
-                <a:solidFill>
-                  <a:schemeClr val="tx1"/>
-                </a:solidFill>
-                <a:latin typeface="+mn-lt"/>
-                <a:ea typeface="+mn-ea"/>
-                <a:cs typeface="+mn-cs"/>
-              </a:defRPr>
-            </a:lvl8pPr>
-            <a:lvl9pPr marL="3886200" indent="-228600" algn="l" defTabSz="914400" rtl="0" eaLnBrk="1" latinLnBrk="0" hangingPunct="1">
-              <a:lnSpc>
-                <a:spcPct val="90000"/>
-              </a:lnSpc>
-              <a:spcBef>
-                <a:spcPts val="500"/>
-              </a:spcBef>
-              <a:buFont typeface="Arial" panose="020B0604020202020204" pitchFamily="34" charset="0"/>
-              <a:buChar char="•"/>
-              <a:defRPr sz="1800" kern="1200">
-                <a:solidFill>
-                  <a:schemeClr val="tx1"/>
-                </a:solidFill>
-                <a:latin typeface="+mn-lt"/>
-                <a:ea typeface="+mn-ea"/>
-                <a:cs typeface="+mn-cs"/>
-              </a:defRPr>
-            </a:lvl9pPr>
-          </a:lstStyle>
-          <a:p>
-            <a:pPr marL="0" indent="0">
-              <a:lnSpc>
-                <a:spcPct val="100000"/>
-              </a:lnSpc>
-              <a:spcBef>
-                <a:spcPts val="600"/>
-              </a:spcBef>
-              <a:buNone/>
-            </a:pPr>
-            <a:endParaRPr lang="en-GB" sz="1000" dirty="0">
-              <a:solidFill>
-                <a:schemeClr val="bg1"/>
-              </a:solidFill>
-              <a:latin typeface="Courier New" panose="02070309020205020404" pitchFamily="49" charset="0"/>
-              <a:cs typeface="Courier New" panose="02070309020205020404" pitchFamily="49" charset="0"/>
-            </a:endParaRPr>
-          </a:p>
-          <a:p>
-            <a:pPr marL="0" indent="0">
-              <a:lnSpc>
-                <a:spcPct val="100000"/>
-              </a:lnSpc>
-              <a:spcBef>
-                <a:spcPts val="600"/>
-              </a:spcBef>
-              <a:buNone/>
-            </a:pPr>
-            <a:r>
-              <a:rPr lang="en-GB" sz="1000" dirty="0">
-                <a:solidFill>
-                  <a:schemeClr val="bg1"/>
-                </a:solidFill>
-                <a:latin typeface="Courier New" panose="02070309020205020404" pitchFamily="49" charset="0"/>
-                <a:cs typeface="Courier New" panose="02070309020205020404" pitchFamily="49" charset="0"/>
-              </a:rPr>
-              <a:t>Beautiful is better than ugly.</a:t>
-            </a:r>
-          </a:p>
-          <a:p>
-            <a:pPr marL="0" indent="0">
-              <a:lnSpc>
-                <a:spcPct val="100000"/>
-              </a:lnSpc>
-              <a:spcBef>
-                <a:spcPts val="600"/>
-              </a:spcBef>
-              <a:buNone/>
-            </a:pPr>
-            <a:r>
-              <a:rPr lang="en-GB" sz="1000" dirty="0">
-                <a:solidFill>
-                  <a:schemeClr val="bg1"/>
-                </a:solidFill>
-                <a:latin typeface="Courier New" panose="02070309020205020404" pitchFamily="49" charset="0"/>
-                <a:cs typeface="Courier New" panose="02070309020205020404" pitchFamily="49" charset="0"/>
-              </a:rPr>
-              <a:t>Explicit is better than implicit.</a:t>
-            </a:r>
-          </a:p>
-          <a:p>
-            <a:pPr marL="0" indent="0">
-              <a:lnSpc>
-                <a:spcPct val="100000"/>
-              </a:lnSpc>
-              <a:spcBef>
-                <a:spcPts val="600"/>
-              </a:spcBef>
-              <a:buNone/>
-            </a:pPr>
-            <a:r>
-              <a:rPr lang="en-GB" sz="1000" dirty="0">
-                <a:solidFill>
-                  <a:schemeClr val="bg1"/>
-                </a:solidFill>
-                <a:latin typeface="Courier New" panose="02070309020205020404" pitchFamily="49" charset="0"/>
-                <a:cs typeface="Courier New" panose="02070309020205020404" pitchFamily="49" charset="0"/>
-              </a:rPr>
-              <a:t>Simple is better than complex.</a:t>
-            </a:r>
-          </a:p>
-          <a:p>
-            <a:pPr marL="0" indent="0">
-              <a:lnSpc>
-                <a:spcPct val="100000"/>
-              </a:lnSpc>
-              <a:spcBef>
-                <a:spcPts val="600"/>
-              </a:spcBef>
-              <a:buNone/>
-            </a:pPr>
-            <a:r>
-              <a:rPr lang="en-GB" sz="1000" dirty="0">
-                <a:solidFill>
-                  <a:schemeClr val="bg1"/>
-                </a:solidFill>
-                <a:latin typeface="Courier New" panose="02070309020205020404" pitchFamily="49" charset="0"/>
-                <a:cs typeface="Courier New" panose="02070309020205020404" pitchFamily="49" charset="0"/>
-              </a:rPr>
-              <a:t>Complex is better than complicated.</a:t>
-            </a:r>
-          </a:p>
-          <a:p>
-            <a:pPr marL="0" indent="0">
-              <a:lnSpc>
-                <a:spcPct val="100000"/>
-              </a:lnSpc>
-              <a:spcBef>
-                <a:spcPts val="600"/>
-              </a:spcBef>
-              <a:buNone/>
-            </a:pPr>
-            <a:r>
-              <a:rPr lang="en-GB" sz="1000" dirty="0">
-                <a:solidFill>
-                  <a:schemeClr val="bg1"/>
-                </a:solidFill>
-                <a:latin typeface="Courier New" panose="02070309020205020404" pitchFamily="49" charset="0"/>
-                <a:cs typeface="Courier New" panose="02070309020205020404" pitchFamily="49" charset="0"/>
-              </a:rPr>
-              <a:t>Flat is better than nested.</a:t>
-            </a:r>
-          </a:p>
-          <a:p>
-            <a:pPr marL="0" indent="0">
-              <a:lnSpc>
-                <a:spcPct val="100000"/>
-              </a:lnSpc>
-              <a:spcBef>
-                <a:spcPts val="600"/>
-              </a:spcBef>
-              <a:buNone/>
-            </a:pPr>
-            <a:r>
-              <a:rPr lang="en-GB" sz="1000" dirty="0">
-                <a:solidFill>
-                  <a:schemeClr val="bg1"/>
-                </a:solidFill>
-                <a:latin typeface="Courier New" panose="02070309020205020404" pitchFamily="49" charset="0"/>
-                <a:cs typeface="Courier New" panose="02070309020205020404" pitchFamily="49" charset="0"/>
-              </a:rPr>
-              <a:t>Sparse is better than dense.</a:t>
-            </a:r>
-          </a:p>
-          <a:p>
-            <a:pPr marL="0" indent="0">
-              <a:lnSpc>
-                <a:spcPct val="100000"/>
-              </a:lnSpc>
-              <a:spcBef>
-                <a:spcPts val="600"/>
-              </a:spcBef>
-              <a:buNone/>
-            </a:pPr>
-            <a:r>
-              <a:rPr lang="en-GB" sz="1000" dirty="0">
-                <a:solidFill>
-                  <a:schemeClr val="bg1"/>
-                </a:solidFill>
-                <a:latin typeface="Courier New" panose="02070309020205020404" pitchFamily="49" charset="0"/>
-                <a:cs typeface="Courier New" panose="02070309020205020404" pitchFamily="49" charset="0"/>
-              </a:rPr>
-              <a:t>Readability counts.</a:t>
-            </a:r>
-          </a:p>
-          <a:p>
-            <a:pPr marL="0" indent="0">
-              <a:lnSpc>
-                <a:spcPct val="100000"/>
-              </a:lnSpc>
-              <a:spcBef>
-                <a:spcPts val="600"/>
-              </a:spcBef>
-              <a:buNone/>
-            </a:pPr>
-            <a:r>
-              <a:rPr lang="en-GB" sz="1000" dirty="0">
-                <a:solidFill>
-                  <a:schemeClr val="bg1"/>
-                </a:solidFill>
-                <a:latin typeface="Courier New" panose="02070309020205020404" pitchFamily="49" charset="0"/>
-                <a:cs typeface="Courier New" panose="02070309020205020404" pitchFamily="49" charset="0"/>
-              </a:rPr>
-              <a:t>Special cases aren't special enough to break the rules.</a:t>
-            </a:r>
-          </a:p>
-          <a:p>
-            <a:pPr marL="0" indent="0">
-              <a:lnSpc>
-                <a:spcPct val="100000"/>
-              </a:lnSpc>
-              <a:spcBef>
-                <a:spcPts val="600"/>
-              </a:spcBef>
-              <a:buNone/>
-            </a:pPr>
-            <a:r>
-              <a:rPr lang="en-GB" sz="1000" dirty="0">
-                <a:solidFill>
-                  <a:schemeClr val="bg1"/>
-                </a:solidFill>
-                <a:latin typeface="Courier New" panose="02070309020205020404" pitchFamily="49" charset="0"/>
-                <a:cs typeface="Courier New" panose="02070309020205020404" pitchFamily="49" charset="0"/>
-              </a:rPr>
-              <a:t>Although practicality beats purity.</a:t>
-            </a:r>
-          </a:p>
-          <a:p>
-            <a:pPr marL="0" indent="0">
-              <a:lnSpc>
-                <a:spcPct val="100000"/>
-              </a:lnSpc>
-              <a:spcBef>
-                <a:spcPts val="600"/>
-              </a:spcBef>
-              <a:buNone/>
-            </a:pPr>
-            <a:r>
-              <a:rPr lang="en-GB" sz="1000" dirty="0">
-                <a:solidFill>
-                  <a:schemeClr val="bg1"/>
-                </a:solidFill>
-                <a:latin typeface="Courier New" panose="02070309020205020404" pitchFamily="49" charset="0"/>
-                <a:cs typeface="Courier New" panose="02070309020205020404" pitchFamily="49" charset="0"/>
-              </a:rPr>
-              <a:t>Errors should never pass silently.</a:t>
-            </a:r>
-          </a:p>
-          <a:p>
-            <a:pPr marL="0" indent="0">
-              <a:lnSpc>
-                <a:spcPct val="100000"/>
-              </a:lnSpc>
-              <a:spcBef>
-                <a:spcPts val="600"/>
-              </a:spcBef>
-              <a:buNone/>
-            </a:pPr>
-            <a:r>
-              <a:rPr lang="en-GB" sz="1000" dirty="0">
-                <a:solidFill>
-                  <a:schemeClr val="bg1"/>
-                </a:solidFill>
-                <a:latin typeface="Courier New" panose="02070309020205020404" pitchFamily="49" charset="0"/>
-                <a:cs typeface="Courier New" panose="02070309020205020404" pitchFamily="49" charset="0"/>
-              </a:rPr>
-              <a:t>Unless explicitly silenced.</a:t>
-            </a:r>
-          </a:p>
-          <a:p>
-            <a:pPr marL="0" indent="0">
-              <a:lnSpc>
-                <a:spcPct val="100000"/>
-              </a:lnSpc>
-              <a:spcBef>
-                <a:spcPts val="600"/>
-              </a:spcBef>
-              <a:buNone/>
-            </a:pPr>
-            <a:r>
-              <a:rPr lang="en-GB" sz="1000" dirty="0">
-                <a:solidFill>
-                  <a:schemeClr val="bg1"/>
-                </a:solidFill>
-                <a:latin typeface="Courier New" panose="02070309020205020404" pitchFamily="49" charset="0"/>
-                <a:cs typeface="Courier New" panose="02070309020205020404" pitchFamily="49" charset="0"/>
-              </a:rPr>
-              <a:t>In the face of ambiguity, refuse the temptation to guess.</a:t>
-            </a:r>
-          </a:p>
-          <a:p>
-            <a:pPr marL="0" indent="0">
-              <a:lnSpc>
-                <a:spcPct val="100000"/>
-              </a:lnSpc>
-              <a:spcBef>
-                <a:spcPts val="600"/>
-              </a:spcBef>
-              <a:buNone/>
-            </a:pPr>
-            <a:r>
-              <a:rPr lang="en-GB" sz="1000" dirty="0">
-                <a:solidFill>
-                  <a:schemeClr val="bg1"/>
-                </a:solidFill>
-                <a:latin typeface="Courier New" panose="02070309020205020404" pitchFamily="49" charset="0"/>
-                <a:cs typeface="Courier New" panose="02070309020205020404" pitchFamily="49" charset="0"/>
-              </a:rPr>
-              <a:t>There should be one-- and preferably only one --obvious way to do it.</a:t>
-            </a:r>
-          </a:p>
-          <a:p>
-            <a:pPr marL="0" indent="0">
-              <a:lnSpc>
-                <a:spcPct val="100000"/>
-              </a:lnSpc>
-              <a:spcBef>
-                <a:spcPts val="600"/>
-              </a:spcBef>
-              <a:buNone/>
-            </a:pPr>
-            <a:r>
-              <a:rPr lang="en-GB" sz="1000" dirty="0">
-                <a:solidFill>
-                  <a:schemeClr val="bg1"/>
-                </a:solidFill>
-                <a:latin typeface="Courier New" panose="02070309020205020404" pitchFamily="49" charset="0"/>
-                <a:cs typeface="Courier New" panose="02070309020205020404" pitchFamily="49" charset="0"/>
-              </a:rPr>
-              <a:t>Although that way may not be obvious at first unless you're Dutch.</a:t>
-            </a:r>
-          </a:p>
-          <a:p>
-            <a:pPr marL="0" indent="0">
-              <a:lnSpc>
-                <a:spcPct val="100000"/>
-              </a:lnSpc>
-              <a:spcBef>
-                <a:spcPts val="600"/>
-              </a:spcBef>
-              <a:buNone/>
-            </a:pPr>
-            <a:r>
-              <a:rPr lang="en-GB" sz="1000" dirty="0">
-                <a:solidFill>
-                  <a:schemeClr val="bg1"/>
-                </a:solidFill>
-                <a:latin typeface="Courier New" panose="02070309020205020404" pitchFamily="49" charset="0"/>
-                <a:cs typeface="Courier New" panose="02070309020205020404" pitchFamily="49" charset="0"/>
-              </a:rPr>
-              <a:t>Now is better than never.</a:t>
-            </a:r>
-          </a:p>
-          <a:p>
-            <a:pPr marL="0" indent="0">
-              <a:lnSpc>
-                <a:spcPct val="100000"/>
-              </a:lnSpc>
-              <a:spcBef>
-                <a:spcPts val="600"/>
-              </a:spcBef>
-              <a:buNone/>
-            </a:pPr>
-            <a:r>
-              <a:rPr lang="en-GB" sz="1000" dirty="0">
-                <a:solidFill>
-                  <a:schemeClr val="bg1"/>
-                </a:solidFill>
-                <a:latin typeface="Courier New" panose="02070309020205020404" pitchFamily="49" charset="0"/>
-                <a:cs typeface="Courier New" panose="02070309020205020404" pitchFamily="49" charset="0"/>
-              </a:rPr>
-              <a:t>Although never is often better than *right* now.</a:t>
-            </a:r>
-          </a:p>
-          <a:p>
-            <a:pPr marL="0" indent="0">
-              <a:lnSpc>
-                <a:spcPct val="100000"/>
-              </a:lnSpc>
-              <a:spcBef>
-                <a:spcPts val="600"/>
-              </a:spcBef>
-              <a:buNone/>
-            </a:pPr>
-            <a:r>
-              <a:rPr lang="en-GB" sz="1000" dirty="0">
-                <a:solidFill>
-                  <a:schemeClr val="bg1"/>
-                </a:solidFill>
-                <a:latin typeface="Courier New" panose="02070309020205020404" pitchFamily="49" charset="0"/>
-                <a:cs typeface="Courier New" panose="02070309020205020404" pitchFamily="49" charset="0"/>
-              </a:rPr>
-              <a:t>If the implementation is hard to explain, it's a bad idea.</a:t>
-            </a:r>
-          </a:p>
-          <a:p>
-            <a:pPr marL="0" indent="0">
-              <a:lnSpc>
-                <a:spcPct val="100000"/>
-              </a:lnSpc>
-              <a:spcBef>
-                <a:spcPts val="600"/>
-              </a:spcBef>
-              <a:buNone/>
-            </a:pPr>
-            <a:r>
-              <a:rPr lang="en-GB" sz="1000" dirty="0">
-                <a:solidFill>
-                  <a:schemeClr val="bg1"/>
-                </a:solidFill>
-                <a:latin typeface="Courier New" panose="02070309020205020404" pitchFamily="49" charset="0"/>
-                <a:cs typeface="Courier New" panose="02070309020205020404" pitchFamily="49" charset="0"/>
-              </a:rPr>
-              <a:t>If the implementation is easy to explain, it may be a good idea.</a:t>
-            </a:r>
-          </a:p>
-          <a:p>
-            <a:pPr marL="0" indent="0">
-              <a:lnSpc>
-                <a:spcPct val="100000"/>
-              </a:lnSpc>
-              <a:spcBef>
-                <a:spcPts val="600"/>
-              </a:spcBef>
-              <a:buNone/>
-            </a:pPr>
-            <a:r>
-              <a:rPr lang="en-GB" sz="1000" dirty="0">
-                <a:solidFill>
-                  <a:schemeClr val="bg1"/>
-                </a:solidFill>
-                <a:latin typeface="Courier New" panose="02070309020205020404" pitchFamily="49" charset="0"/>
-                <a:cs typeface="Courier New" panose="02070309020205020404" pitchFamily="49" charset="0"/>
-              </a:rPr>
-              <a:t>Namespaces are one honking great idea -- let's do more of those!</a:t>
-            </a:r>
-            <a:endParaRPr lang="nl-NL" sz="1000" dirty="0">
-              <a:solidFill>
-                <a:schemeClr val="bg1"/>
-              </a:solidFill>
-              <a:latin typeface="Courier New" panose="02070309020205020404" pitchFamily="49" charset="0"/>
-              <a:cs typeface="Courier New" panose="02070309020205020404" pitchFamily="49" charset="0"/>
-            </a:endParaRPr>
-          </a:p>
-          <a:p>
-            <a:pPr marL="0" indent="0">
-              <a:lnSpc>
-                <a:spcPct val="100000"/>
-              </a:lnSpc>
-              <a:spcBef>
-                <a:spcPts val="600"/>
-              </a:spcBef>
-              <a:buNone/>
-            </a:pPr>
-            <a:endParaRPr lang="en-GB" sz="1000" noProof="0" dirty="0">
-              <a:solidFill>
-                <a:schemeClr val="bg1"/>
-              </a:solidFill>
-              <a:latin typeface="Courier New" panose="02070309020205020404" pitchFamily="49" charset="0"/>
-              <a:cs typeface="Courier New" panose="02070309020205020404" pitchFamily="49" charset="0"/>
-            </a:endParaRPr>
-          </a:p>
-        </p:txBody>
-      </p:sp>
-      <p:cxnSp>
-        <p:nvCxnSpPr>
-          <p:cNvPr id="6" name="Straight Connector 5">
-            <a:extLst>
-              <a:ext uri="{FF2B5EF4-FFF2-40B4-BE49-F238E27FC236}">
-                <a16:creationId xmlns:a16="http://schemas.microsoft.com/office/drawing/2014/main" id="{7F162173-AD9E-1ED9-F92B-186066229DD6}"/>
-              </a:ext>
-            </a:extLst>
-          </p:cNvPr>
-          <p:cNvCxnSpPr>
-            <a:cxnSpLocks/>
-          </p:cNvCxnSpPr>
-          <p:nvPr/>
-        </p:nvCxnSpPr>
-        <p:spPr>
-          <a:xfrm>
-            <a:off x="5655733" y="1456267"/>
-            <a:ext cx="0" cy="4809066"/>
-          </a:xfrm>
-          <a:prstGeom prst="line">
-            <a:avLst/>
-          </a:prstGeom>
-        </p:spPr>
-        <p:style>
-          <a:lnRef idx="3">
-            <a:schemeClr val="dk1"/>
-          </a:lnRef>
-          <a:fillRef idx="0">
-            <a:schemeClr val="dk1"/>
-          </a:fillRef>
-          <a:effectRef idx="2">
-            <a:schemeClr val="dk1"/>
-          </a:effectRef>
-          <a:fontRef idx="minor">
-            <a:schemeClr val="tx1"/>
-          </a:fontRef>
-        </p:style>
-      </p:cxnSp>
-      <p:sp>
-        <p:nvSpPr>
-          <p:cNvPr id="5" name="TextBox 4">
-            <a:extLst>
-              <a:ext uri="{FF2B5EF4-FFF2-40B4-BE49-F238E27FC236}">
-                <a16:creationId xmlns:a16="http://schemas.microsoft.com/office/drawing/2014/main" id="{AAAAABA8-783C-B32D-3397-2C7F8BEB01FD}"/>
-              </a:ext>
-            </a:extLst>
-          </p:cNvPr>
-          <p:cNvSpPr txBox="1"/>
-          <p:nvPr/>
-        </p:nvSpPr>
-        <p:spPr>
-          <a:xfrm>
-            <a:off x="9569450" y="1532467"/>
-            <a:ext cx="1907118" cy="307777"/>
-          </a:xfrm>
-          <a:prstGeom prst="rect">
-            <a:avLst/>
-          </a:prstGeom>
-        </p:spPr>
-        <p:style>
-          <a:lnRef idx="2">
-            <a:schemeClr val="dk1">
-              <a:shade val="50000"/>
-            </a:schemeClr>
-          </a:lnRef>
-          <a:fillRef idx="1">
-            <a:schemeClr val="dk1"/>
-          </a:fillRef>
-          <a:effectRef idx="0">
-            <a:schemeClr val="dk1"/>
-          </a:effectRef>
-          <a:fontRef idx="minor">
-            <a:schemeClr val="lt1"/>
-          </a:fontRef>
-        </p:style>
-        <p:txBody>
-          <a:bodyPr wrap="square" rtlCol="0">
-            <a:spAutoFit/>
-          </a:bodyPr>
-          <a:lstStyle/>
-          <a:p>
-            <a:r>
-              <a:rPr lang="en-US" sz="1400" dirty="0">
-                <a:latin typeface="Courier New" panose="02070309020205020404" pitchFamily="49" charset="0"/>
-                <a:cs typeface="Courier New" panose="02070309020205020404" pitchFamily="49" charset="0"/>
-              </a:rPr>
-              <a:t>&gt;&gt;&gt; import this</a:t>
-            </a:r>
+            <a:endParaRPr lang="en-NL"/>
           </a:p>
         </p:txBody>
       </p:sp>
     </p:spTree>
     <p:extLst>
       <p:ext uri="{BB962C8B-B14F-4D97-AF65-F5344CB8AC3E}">
-        <p14:creationId xmlns:p14="http://schemas.microsoft.com/office/powerpoint/2010/main" val="1662243917"/>
+        <p14:creationId xmlns:p14="http://schemas.microsoft.com/office/powerpoint/2010/main" val="530448944"/>
       </p:ext>
     </p:extLst>
   </p:cSld>
@@ -27572,26 +28031,6 @@
               <a:buFont typeface="Arial" panose="020B0604020202020204" pitchFamily="34" charset="0"/>
               <a:buNone/>
             </a:pPr>
-            <a:endParaRPr lang="en-US" sz="1600" b="1" dirty="0">
-              <a:latin typeface="Courier New" panose="02070309020205020404" pitchFamily="49" charset="0"/>
-              <a:cs typeface="Courier New" panose="02070309020205020404" pitchFamily="49" charset="0"/>
-            </a:endParaRPr>
-          </a:p>
-          <a:p>
-            <a:pPr marL="0" indent="0">
-              <a:buFont typeface="Arial" panose="020B0604020202020204" pitchFamily="34" charset="0"/>
-              <a:buNone/>
-            </a:pPr>
-            <a:endParaRPr lang="en-US" sz="1600" dirty="0">
-              <a:latin typeface="Courier New" panose="02070309020205020404" pitchFamily="49" charset="0"/>
-              <a:cs typeface="Courier New" panose="02070309020205020404" pitchFamily="49" charset="0"/>
-            </a:endParaRPr>
-          </a:p>
-          <a:p>
-            <a:pPr marL="0" indent="0">
-              <a:buFont typeface="Arial" panose="020B0604020202020204" pitchFamily="34" charset="0"/>
-              <a:buNone/>
-            </a:pPr>
             <a:r>
               <a:rPr lang="en-US" sz="1600" dirty="0">
                 <a:latin typeface="Courier New" panose="02070309020205020404" pitchFamily="49" charset="0"/>
@@ -27933,7 +28372,7 @@
           <a:p>
             <a:r>
               <a:rPr lang="nl-NL" sz="3600" noProof="0" dirty="0"/>
-              <a:t>Python afsluiten</a:t>
+              <a:t>Python zelf afsluiten</a:t>
             </a:r>
           </a:p>
         </p:txBody>
@@ -29419,7 +29858,7 @@
             <a:pPr lvl="1"/>
             <a:r>
               <a:rPr lang="nl-NL" sz="2000" noProof="0" dirty="0"/>
-              <a:t>Welke specifieke </a:t>
+              <a:t>Welk type </a:t>
             </a:r>
             <a:r>
               <a:rPr lang="nl-NL" sz="2000" noProof="0" dirty="0" err="1">
@@ -29484,7 +29923,7 @@
                 <a:latin typeface="Courier New" panose="02070309020205020404" pitchFamily="49" charset="0"/>
                 <a:cs typeface="Courier New" panose="02070309020205020404" pitchFamily="49" charset="0"/>
               </a:rPr>
-              <a:t>ValueError</a:t>
+              <a:t>RuntimeError</a:t>
             </a:r>
             <a:r>
               <a:rPr lang="nl-NL" sz="2000" dirty="0"/>
@@ -30573,14 +31012,14 @@
             <a:pPr lvl="1"/>
             <a:r>
               <a:rPr lang="nl-NL" sz="1600" dirty="0"/>
-              <a:t>Unit tests draai je tijdens het ontwikkelen van je code!</a:t>
+              <a:t>Unit tests draai je tijdens de ontwikkeling van je code!</a:t>
             </a:r>
           </a:p>
           <a:p>
             <a:pPr lvl="1"/>
             <a:r>
               <a:rPr lang="nl-NL" sz="1600" dirty="0"/>
-              <a:t>Geen bescherming voor de gebruiker van je code.</a:t>
+              <a:t>Bedoeld voor ontwikkelaars, niet voor gebruikers.</a:t>
             </a:r>
           </a:p>
           <a:p>
@@ -31092,7 +31531,7 @@
             </a:pPr>
             <a:r>
               <a:rPr lang="nl-NL" sz="1700" b="1" dirty="0"/>
-              <a:t>Importeren:</a:t>
+              <a:t>Import:</a:t>
             </a:r>
           </a:p>
           <a:p>
@@ -31132,7 +31571,7 @@
             </a:pPr>
             <a:r>
               <a:rPr lang="nl-NL" sz="1700" dirty="0"/>
-              <a:t>Eigen code.</a:t>
+              <a:t>Eigen packages.</a:t>
             </a:r>
           </a:p>
           <a:p>
@@ -31864,7 +32303,7 @@
                 <a:latin typeface="Courier New" panose="02070309020205020404" pitchFamily="49" charset="0"/>
                 <a:cs typeface="Courier New" panose="02070309020205020404" pitchFamily="49" charset="0"/>
               </a:rPr>
-              <a:t>test_&lt;module naam&gt;.</a:t>
+              <a:t>test_&lt;module&gt;.</a:t>
             </a:r>
             <a:r>
               <a:rPr lang="nl-NL" sz="2000" dirty="0" err="1">
@@ -31894,7 +32333,7 @@
                 <a:latin typeface="Courier New" panose="02070309020205020404" pitchFamily="49" charset="0"/>
                 <a:cs typeface="Courier New" panose="02070309020205020404" pitchFamily="49" charset="0"/>
               </a:rPr>
-              <a:t>test_&lt;functie&gt;_&lt;omschrijving scenario&gt;.</a:t>
+              <a:t>test_&lt;functie&gt;_&lt;scenario&gt;.</a:t>
             </a:r>
             <a:endParaRPr lang="nl-NL" sz="2000" dirty="0"/>
           </a:p>
@@ -31925,7 +32364,7 @@
             </a:pPr>
             <a:r>
               <a:rPr lang="nl-NL" sz="2000" dirty="0"/>
-              <a:t>Test slechts één aspect: 1 </a:t>
+              <a:t>Test één aspect tegelijk: 1 </a:t>
             </a:r>
             <a:r>
               <a:rPr lang="nl-NL" sz="2000" dirty="0" err="1">
@@ -31936,7 +32375,7 @@
             </a:r>
             <a:r>
               <a:rPr lang="nl-NL" sz="2000" dirty="0"/>
-              <a:t> statement per test.</a:t>
+              <a:t> per test.</a:t>
             </a:r>
           </a:p>
         </p:txBody>
@@ -36425,16 +36864,43 @@
               </a:rPr>
               <a:t>	=&gt;	Minder strikt, mist wel eens iets…</a:t>
             </a:r>
+          </a:p>
+          <a:p>
+            <a:pPr marL="0" indent="0">
+              <a:buNone/>
+            </a:pPr>
+            <a:r>
+              <a:rPr lang="nl-NL" sz="2000" noProof="0" dirty="0" err="1">
+                <a:latin typeface="Courier New" panose="02070309020205020404" pitchFamily="49" charset="0"/>
+                <a:cs typeface="Courier New" panose="02070309020205020404" pitchFamily="49" charset="0"/>
+              </a:rPr>
+              <a:t>ruff</a:t>
+            </a:r>
+            <a:r>
+              <a:rPr lang="nl-NL" sz="2000" dirty="0">
+                <a:cs typeface="Courier New" panose="02070309020205020404" pitchFamily="49" charset="0"/>
+              </a:rPr>
+              <a:t>		=&gt;	Lijkt op </a:t>
+            </a:r>
+            <a:r>
+              <a:rPr lang="nl-NL" sz="2000" dirty="0" err="1">
+                <a:cs typeface="Courier New" panose="02070309020205020404" pitchFamily="49" charset="0"/>
+              </a:rPr>
+              <a:t>pylint</a:t>
+            </a:r>
+            <a:r>
+              <a:rPr lang="nl-NL" sz="2000" dirty="0">
+                <a:cs typeface="Courier New" panose="02070309020205020404" pitchFamily="49" charset="0"/>
+              </a:rPr>
+              <a:t>, maar een stuk sneller!</a:t>
+            </a:r>
+          </a:p>
+          <a:p>
+            <a:pPr marL="0" indent="0">
+              <a:buNone/>
+            </a:pPr>
             <a:endParaRPr lang="nl-NL" sz="2000" noProof="0" dirty="0">
               <a:latin typeface="Courier New" panose="02070309020205020404" pitchFamily="49" charset="0"/>
-              <a:cs typeface="Courier New" panose="02070309020205020404" pitchFamily="49" charset="0"/>
-            </a:endParaRPr>
-          </a:p>
-          <a:p>
-            <a:pPr marL="0" indent="0">
-              <a:buNone/>
-            </a:pPr>
-            <a:endParaRPr lang="nl-NL" sz="2000" dirty="0">
               <a:cs typeface="Courier New" panose="02070309020205020404" pitchFamily="49" charset="0"/>
             </a:endParaRPr>
           </a:p>
@@ -39429,7 +39895,7 @@
           <p:nvPr/>
         </p:nvPicPr>
         <p:blipFill>
-          <a:blip r:embed="rId2"/>
+          <a:blip r:embed="rId3"/>
           <a:stretch>
             <a:fillRect/>
           </a:stretch>

</xml_diff>